<commit_message>
Changed first 3 slides - Introduction , Goal
</commit_message>
<xml_diff>
--- a/documents/Outline for Presentation.pptx
+++ b/documents/Outline for Presentation.pptx
@@ -125,6 +125,10 @@
 </p:presentation>
 </file>
 
+<file path=ppt/revisionInfo.xml><?xml version="1.0" encoding="utf-8"?>
+<p1510:revInfo xmlns:a="http://schemas.openxmlformats.org/drawingml/2006/main" xmlns:r="http://schemas.openxmlformats.org/officeDocument/2006/relationships" xmlns:p1510="http://schemas.microsoft.com/office/powerpoint/2015/10/main"/>
+</file>
+
 <file path=ppt/notesMasters/notesMaster1.xml><?xml version="1.0" encoding="utf-8"?>
 <p:notesMaster xmlns:a="http://schemas.openxmlformats.org/drawingml/2006/main" xmlns:r="http://schemas.openxmlformats.org/officeDocument/2006/relationships" xmlns:p="http://schemas.openxmlformats.org/presentationml/2006/main">
   <p:cSld>
@@ -207,7 +211,7 @@
           <a:p>
             <a:fld id="{7731B268-C9FF-4089-8ABA-723CED188B46}" type="datetimeFigureOut">
               <a:rPr lang="en-US" smtClean="0"/>
-              <a:t>6/9/18</a:t>
+              <a:t>6/9/2018</a:t>
             </a:fld>
             <a:endParaRPr lang="en-US"/>
           </a:p>
@@ -862,7 +866,7 @@
           <a:p>
             <a:fld id="{9881B753-FD06-4893-9BB6-752E512FD133}" type="datetimeFigureOut">
               <a:rPr lang="en-US" smtClean="0"/>
-              <a:t>6/9/18</a:t>
+              <a:t>6/9/2018</a:t>
             </a:fld>
             <a:endParaRPr lang="en-US"/>
           </a:p>
@@ -1137,7 +1141,7 @@
           <a:p>
             <a:fld id="{9881B753-FD06-4893-9BB6-752E512FD133}" type="datetimeFigureOut">
               <a:rPr lang="en-US" smtClean="0"/>
-              <a:t>6/9/18</a:t>
+              <a:t>6/9/2018</a:t>
             </a:fld>
             <a:endParaRPr lang="en-US"/>
           </a:p>
@@ -1331,7 +1335,7 @@
           <a:p>
             <a:fld id="{9881B753-FD06-4893-9BB6-752E512FD133}" type="datetimeFigureOut">
               <a:rPr lang="en-US" smtClean="0"/>
-              <a:t>6/9/18</a:t>
+              <a:t>6/9/2018</a:t>
             </a:fld>
             <a:endParaRPr lang="en-US"/>
           </a:p>
@@ -1604,7 +1608,7 @@
           <a:p>
             <a:fld id="{9881B753-FD06-4893-9BB6-752E512FD133}" type="datetimeFigureOut">
               <a:rPr lang="en-US" smtClean="0"/>
-              <a:t>6/9/18</a:t>
+              <a:t>6/9/2018</a:t>
             </a:fld>
             <a:endParaRPr lang="en-US"/>
           </a:p>
@@ -1945,7 +1949,7 @@
           <a:p>
             <a:fld id="{9881B753-FD06-4893-9BB6-752E512FD133}" type="datetimeFigureOut">
               <a:rPr lang="en-US" smtClean="0"/>
-              <a:t>6/9/18</a:t>
+              <a:t>6/9/2018</a:t>
             </a:fld>
             <a:endParaRPr lang="en-US"/>
           </a:p>
@@ -2568,7 +2572,7 @@
           <a:p>
             <a:fld id="{9881B753-FD06-4893-9BB6-752E512FD133}" type="datetimeFigureOut">
               <a:rPr lang="en-US" smtClean="0"/>
-              <a:t>6/9/18</a:t>
+              <a:t>6/9/2018</a:t>
             </a:fld>
             <a:endParaRPr lang="en-US"/>
           </a:p>
@@ -3428,7 +3432,7 @@
           <a:p>
             <a:fld id="{9881B753-FD06-4893-9BB6-752E512FD133}" type="datetimeFigureOut">
               <a:rPr lang="en-US" smtClean="0"/>
-              <a:t>6/9/18</a:t>
+              <a:t>6/9/2018</a:t>
             </a:fld>
             <a:endParaRPr lang="en-US"/>
           </a:p>
@@ -3598,7 +3602,7 @@
           <a:p>
             <a:fld id="{9881B753-FD06-4893-9BB6-752E512FD133}" type="datetimeFigureOut">
               <a:rPr lang="en-US" smtClean="0"/>
-              <a:t>6/9/18</a:t>
+              <a:t>6/9/2018</a:t>
             </a:fld>
             <a:endParaRPr lang="en-US"/>
           </a:p>
@@ -3778,7 +3782,7 @@
           <a:p>
             <a:fld id="{9881B753-FD06-4893-9BB6-752E512FD133}" type="datetimeFigureOut">
               <a:rPr lang="en-US" smtClean="0"/>
-              <a:t>6/9/18</a:t>
+              <a:t>6/9/2018</a:t>
             </a:fld>
             <a:endParaRPr lang="en-US"/>
           </a:p>
@@ -3948,7 +3952,7 @@
           <a:p>
             <a:fld id="{9881B753-FD06-4893-9BB6-752E512FD133}" type="datetimeFigureOut">
               <a:rPr lang="en-US" smtClean="0"/>
-              <a:t>6/9/18</a:t>
+              <a:t>6/9/2018</a:t>
             </a:fld>
             <a:endParaRPr lang="en-US"/>
           </a:p>
@@ -4195,7 +4199,7 @@
           <a:p>
             <a:fld id="{9881B753-FD06-4893-9BB6-752E512FD133}" type="datetimeFigureOut">
               <a:rPr lang="en-US" smtClean="0"/>
-              <a:t>6/9/18</a:t>
+              <a:t>6/9/2018</a:t>
             </a:fld>
             <a:endParaRPr lang="en-US"/>
           </a:p>
@@ -4487,7 +4491,7 @@
           <a:p>
             <a:fld id="{9881B753-FD06-4893-9BB6-752E512FD133}" type="datetimeFigureOut">
               <a:rPr lang="en-US" smtClean="0"/>
-              <a:t>6/9/18</a:t>
+              <a:t>6/9/2018</a:t>
             </a:fld>
             <a:endParaRPr lang="en-US"/>
           </a:p>
@@ -4931,7 +4935,7 @@
           <a:p>
             <a:fld id="{9881B753-FD06-4893-9BB6-752E512FD133}" type="datetimeFigureOut">
               <a:rPr lang="en-US" smtClean="0"/>
-              <a:t>6/9/18</a:t>
+              <a:t>6/9/2018</a:t>
             </a:fld>
             <a:endParaRPr lang="en-US"/>
           </a:p>
@@ -5049,7 +5053,7 @@
           <a:p>
             <a:fld id="{9881B753-FD06-4893-9BB6-752E512FD133}" type="datetimeFigureOut">
               <a:rPr lang="en-US" smtClean="0"/>
-              <a:t>6/9/18</a:t>
+              <a:t>6/9/2018</a:t>
             </a:fld>
             <a:endParaRPr lang="en-US"/>
           </a:p>
@@ -5144,7 +5148,7 @@
           <a:p>
             <a:fld id="{9881B753-FD06-4893-9BB6-752E512FD133}" type="datetimeFigureOut">
               <a:rPr lang="en-US" smtClean="0"/>
-              <a:t>6/9/18</a:t>
+              <a:t>6/9/2018</a:t>
             </a:fld>
             <a:endParaRPr lang="en-US"/>
           </a:p>
@@ -5423,7 +5427,7 @@
           <a:p>
             <a:fld id="{9881B753-FD06-4893-9BB6-752E512FD133}" type="datetimeFigureOut">
               <a:rPr lang="en-US" smtClean="0"/>
-              <a:t>6/9/18</a:t>
+              <a:t>6/9/2018</a:t>
             </a:fld>
             <a:endParaRPr lang="en-US"/>
           </a:p>
@@ -5698,7 +5702,7 @@
           <a:p>
             <a:fld id="{9881B753-FD06-4893-9BB6-752E512FD133}" type="datetimeFigureOut">
               <a:rPr lang="en-US" smtClean="0"/>
-              <a:t>6/9/18</a:t>
+              <a:t>6/9/2018</a:t>
             </a:fld>
             <a:endParaRPr lang="en-US"/>
           </a:p>
@@ -6127,7 +6131,7 @@
           <a:p>
             <a:fld id="{9881B753-FD06-4893-9BB6-752E512FD133}" type="datetimeFigureOut">
               <a:rPr lang="en-US" smtClean="0"/>
-              <a:t>6/9/18</a:t>
+              <a:t>6/9/2018</a:t>
             </a:fld>
             <a:endParaRPr lang="en-US"/>
           </a:p>
@@ -7076,8 +7080,8 @@
         </p:nvSpPr>
         <p:spPr>
           <a:xfrm>
-            <a:off x="646111" y="452717"/>
-            <a:ext cx="9404723" cy="2078211"/>
+            <a:off x="646111" y="811946"/>
+            <a:ext cx="9404723" cy="1000526"/>
           </a:xfrm>
         </p:spPr>
         <p:txBody>
@@ -7086,7 +7090,7 @@
           <a:p>
             <a:r>
               <a:rPr lang="en-US" dirty="0"/>
-              <a:t>How to decide what data is consuming or in what situation power will get consumed more?</a:t>
+              <a:t>Hypothesis &amp; Decision</a:t>
             </a:r>
           </a:p>
         </p:txBody>
@@ -7109,7 +7113,7 @@
         </p:nvSpPr>
         <p:spPr>
           <a:xfrm>
-            <a:off x="646111" y="2890157"/>
+            <a:off x="646111" y="2193474"/>
             <a:ext cx="8946541" cy="4195481"/>
           </a:xfrm>
         </p:spPr>
@@ -7119,24 +7123,13 @@
           <a:p>
             <a:r>
               <a:rPr lang="en-US" dirty="0"/>
-              <a:t>Briefly explain about what you decided to take as a benchmark and why?</a:t>
+              <a:t>Assumed that power consumption increases with the increase in data movement and makes code less efficient with degradation in performance.</a:t>
             </a:r>
           </a:p>
           <a:p>
             <a:r>
               <a:rPr lang="en-US" dirty="0"/>
-              <a:t>Write like some things you expect to be data consuming but it turns out to be power consuming with very less contact of memory while some vice versa. – </a:t>
-            </a:r>
-            <a:r>
-              <a:rPr lang="en-US"/>
-              <a:t>basically hypothesis</a:t>
-            </a:r>
-            <a:endParaRPr lang="en-US" dirty="0"/>
-          </a:p>
-          <a:p>
-            <a:r>
-              <a:rPr lang="en-US" dirty="0"/>
-              <a:t>We can also discuss here the options what we had thought and then say what we ended up with.</a:t>
+              <a:t>Well, How to measure?</a:t>
             </a:r>
           </a:p>
         </p:txBody>

</xml_diff>

<commit_message>
Updated PPT for Methodology
</commit_message>
<xml_diff>
--- a/documents/Outline for Presentation.pptx
+++ b/documents/Outline for Presentation.pptx
@@ -5,20 +5,22 @@
     <p:sldMasterId id="2147483762" r:id="rId1"/>
   </p:sldMasterIdLst>
   <p:notesMasterIdLst>
-    <p:notesMasterId r:id="rId13"/>
+    <p:notesMasterId r:id="rId15"/>
   </p:notesMasterIdLst>
   <p:sldIdLst>
     <p:sldId id="256" r:id="rId2"/>
     <p:sldId id="257" r:id="rId3"/>
     <p:sldId id="259" r:id="rId4"/>
-    <p:sldId id="260" r:id="rId5"/>
-    <p:sldId id="263" r:id="rId6"/>
-    <p:sldId id="262" r:id="rId7"/>
+    <p:sldId id="263" r:id="rId5"/>
+    <p:sldId id="262" r:id="rId6"/>
+    <p:sldId id="268" r:id="rId7"/>
     <p:sldId id="267" r:id="rId8"/>
     <p:sldId id="261" r:id="rId9"/>
     <p:sldId id="264" r:id="rId10"/>
     <p:sldId id="265" r:id="rId11"/>
     <p:sldId id="266" r:id="rId12"/>
+    <p:sldId id="270" r:id="rId13"/>
+    <p:sldId id="260" r:id="rId14"/>
   </p:sldIdLst>
   <p:sldSz cx="12192000" cy="6858000"/>
   <p:notesSz cx="6858000" cy="9144000"/>
@@ -125,10 +127,6 @@
 </p:presentation>
 </file>
 
-<file path=ppt/revisionInfo.xml><?xml version="1.0" encoding="utf-8"?>
-<p1510:revInfo xmlns:a="http://schemas.openxmlformats.org/drawingml/2006/main" xmlns:r="http://schemas.openxmlformats.org/officeDocument/2006/relationships" xmlns:p1510="http://schemas.microsoft.com/office/powerpoint/2015/10/main"/>
-</file>
-
 <file path=ppt/notesMasters/notesMaster1.xml><?xml version="1.0" encoding="utf-8"?>
 <p:notesMaster xmlns:a="http://schemas.openxmlformats.org/drawingml/2006/main" xmlns:r="http://schemas.openxmlformats.org/officeDocument/2006/relationships" xmlns:p="http://schemas.openxmlformats.org/presentationml/2006/main">
   <p:cSld>
@@ -211,7 +209,7 @@
           <a:p>
             <a:fld id="{7731B268-C9FF-4089-8ABA-723CED188B46}" type="datetimeFigureOut">
               <a:rPr lang="en-US" smtClean="0"/>
-              <a:t>6/9/2018</a:t>
+              <a:t>6/10/18</a:t>
             </a:fld>
             <a:endParaRPr lang="en-US"/>
           </a:p>
@@ -680,6 +678,90 @@
 </p:notes>
 </file>
 
+<file path=ppt/notesSlides/notesSlide2.xml><?xml version="1.0" encoding="utf-8"?>
+<p:notes xmlns:a="http://schemas.openxmlformats.org/drawingml/2006/main" xmlns:r="http://schemas.openxmlformats.org/officeDocument/2006/relationships" xmlns:p="http://schemas.openxmlformats.org/presentationml/2006/main">
+  <p:cSld>
+    <p:spTree>
+      <p:nvGrpSpPr>
+        <p:cNvPr id="1" name=""/>
+        <p:cNvGrpSpPr/>
+        <p:nvPr/>
+      </p:nvGrpSpPr>
+      <p:grpSpPr>
+        <a:xfrm>
+          <a:off x="0" y="0"/>
+          <a:ext cx="0" cy="0"/>
+          <a:chOff x="0" y="0"/>
+          <a:chExt cx="0" cy="0"/>
+        </a:xfrm>
+      </p:grpSpPr>
+      <p:sp>
+        <p:nvSpPr>
+          <p:cNvPr id="2" name="Slide Image Placeholder 1"/>
+          <p:cNvSpPr>
+            <a:spLocks noGrp="1" noRot="1" noChangeAspect="1"/>
+          </p:cNvSpPr>
+          <p:nvPr>
+            <p:ph type="sldImg"/>
+          </p:nvPr>
+        </p:nvSpPr>
+        <p:spPr/>
+      </p:sp>
+      <p:sp>
+        <p:nvSpPr>
+          <p:cNvPr id="3" name="Notes Placeholder 2"/>
+          <p:cNvSpPr>
+            <a:spLocks noGrp="1"/>
+          </p:cNvSpPr>
+          <p:nvPr>
+            <p:ph type="body" idx="1"/>
+          </p:nvPr>
+        </p:nvSpPr>
+        <p:spPr/>
+        <p:txBody>
+          <a:bodyPr/>
+          <a:lstStyle/>
+          <a:p>
+            <a:endParaRPr lang="en-US" dirty="0"/>
+          </a:p>
+        </p:txBody>
+      </p:sp>
+      <p:sp>
+        <p:nvSpPr>
+          <p:cNvPr id="4" name="Slide Number Placeholder 3"/>
+          <p:cNvSpPr>
+            <a:spLocks noGrp="1"/>
+          </p:cNvSpPr>
+          <p:nvPr>
+            <p:ph type="sldNum" sz="quarter" idx="10"/>
+          </p:nvPr>
+        </p:nvSpPr>
+        <p:spPr/>
+        <p:txBody>
+          <a:bodyPr/>
+          <a:lstStyle/>
+          <a:p>
+            <a:fld id="{94D3E167-3ED7-47DE-A306-F708F42BD9C6}" type="slidenum">
+              <a:rPr lang="en-US" smtClean="0"/>
+              <a:t>13</a:t>
+            </a:fld>
+            <a:endParaRPr lang="en-US"/>
+          </a:p>
+        </p:txBody>
+      </p:sp>
+    </p:spTree>
+    <p:extLst>
+      <p:ext uri="{BB962C8B-B14F-4D97-AF65-F5344CB8AC3E}">
+        <p14:creationId xmlns:p14="http://schemas.microsoft.com/office/powerpoint/2010/main" val="801306509"/>
+      </p:ext>
+    </p:extLst>
+  </p:cSld>
+  <p:clrMapOvr>
+    <a:masterClrMapping/>
+  </p:clrMapOvr>
+</p:notes>
+</file>
+
 <file path=ppt/slideLayouts/slideLayout1.xml><?xml version="1.0" encoding="utf-8"?>
 <p:sldLayout xmlns:a="http://schemas.openxmlformats.org/drawingml/2006/main" xmlns:r="http://schemas.openxmlformats.org/officeDocument/2006/relationships" xmlns:p="http://schemas.openxmlformats.org/presentationml/2006/main" type="title" preserve="1">
   <p:cSld name="Title Slide">
@@ -866,7 +948,7 @@
           <a:p>
             <a:fld id="{9881B753-FD06-4893-9BB6-752E512FD133}" type="datetimeFigureOut">
               <a:rPr lang="en-US" smtClean="0"/>
-              <a:t>6/9/2018</a:t>
+              <a:t>6/10/18</a:t>
             </a:fld>
             <a:endParaRPr lang="en-US"/>
           </a:p>
@@ -1141,7 +1223,7 @@
           <a:p>
             <a:fld id="{9881B753-FD06-4893-9BB6-752E512FD133}" type="datetimeFigureOut">
               <a:rPr lang="en-US" smtClean="0"/>
-              <a:t>6/9/2018</a:t>
+              <a:t>6/10/18</a:t>
             </a:fld>
             <a:endParaRPr lang="en-US"/>
           </a:p>
@@ -1335,7 +1417,7 @@
           <a:p>
             <a:fld id="{9881B753-FD06-4893-9BB6-752E512FD133}" type="datetimeFigureOut">
               <a:rPr lang="en-US" smtClean="0"/>
-              <a:t>6/9/2018</a:t>
+              <a:t>6/10/18</a:t>
             </a:fld>
             <a:endParaRPr lang="en-US"/>
           </a:p>
@@ -1608,7 +1690,7 @@
           <a:p>
             <a:fld id="{9881B753-FD06-4893-9BB6-752E512FD133}" type="datetimeFigureOut">
               <a:rPr lang="en-US" smtClean="0"/>
-              <a:t>6/9/2018</a:t>
+              <a:t>6/10/18</a:t>
             </a:fld>
             <a:endParaRPr lang="en-US"/>
           </a:p>
@@ -1949,7 +2031,7 @@
           <a:p>
             <a:fld id="{9881B753-FD06-4893-9BB6-752E512FD133}" type="datetimeFigureOut">
               <a:rPr lang="en-US" smtClean="0"/>
-              <a:t>6/9/2018</a:t>
+              <a:t>6/10/18</a:t>
             </a:fld>
             <a:endParaRPr lang="en-US"/>
           </a:p>
@@ -2572,7 +2654,7 @@
           <a:p>
             <a:fld id="{9881B753-FD06-4893-9BB6-752E512FD133}" type="datetimeFigureOut">
               <a:rPr lang="en-US" smtClean="0"/>
-              <a:t>6/9/2018</a:t>
+              <a:t>6/10/18</a:t>
             </a:fld>
             <a:endParaRPr lang="en-US"/>
           </a:p>
@@ -3432,7 +3514,7 @@
           <a:p>
             <a:fld id="{9881B753-FD06-4893-9BB6-752E512FD133}" type="datetimeFigureOut">
               <a:rPr lang="en-US" smtClean="0"/>
-              <a:t>6/9/2018</a:t>
+              <a:t>6/10/18</a:t>
             </a:fld>
             <a:endParaRPr lang="en-US"/>
           </a:p>
@@ -3602,7 +3684,7 @@
           <a:p>
             <a:fld id="{9881B753-FD06-4893-9BB6-752E512FD133}" type="datetimeFigureOut">
               <a:rPr lang="en-US" smtClean="0"/>
-              <a:t>6/9/2018</a:t>
+              <a:t>6/10/18</a:t>
             </a:fld>
             <a:endParaRPr lang="en-US"/>
           </a:p>
@@ -3782,7 +3864,7 @@
           <a:p>
             <a:fld id="{9881B753-FD06-4893-9BB6-752E512FD133}" type="datetimeFigureOut">
               <a:rPr lang="en-US" smtClean="0"/>
-              <a:t>6/9/2018</a:t>
+              <a:t>6/10/18</a:t>
             </a:fld>
             <a:endParaRPr lang="en-US"/>
           </a:p>
@@ -3952,7 +4034,7 @@
           <a:p>
             <a:fld id="{9881B753-FD06-4893-9BB6-752E512FD133}" type="datetimeFigureOut">
               <a:rPr lang="en-US" smtClean="0"/>
-              <a:t>6/9/2018</a:t>
+              <a:t>6/10/18</a:t>
             </a:fld>
             <a:endParaRPr lang="en-US"/>
           </a:p>
@@ -4199,7 +4281,7 @@
           <a:p>
             <a:fld id="{9881B753-FD06-4893-9BB6-752E512FD133}" type="datetimeFigureOut">
               <a:rPr lang="en-US" smtClean="0"/>
-              <a:t>6/9/2018</a:t>
+              <a:t>6/10/18</a:t>
             </a:fld>
             <a:endParaRPr lang="en-US"/>
           </a:p>
@@ -4491,7 +4573,7 @@
           <a:p>
             <a:fld id="{9881B753-FD06-4893-9BB6-752E512FD133}" type="datetimeFigureOut">
               <a:rPr lang="en-US" smtClean="0"/>
-              <a:t>6/9/2018</a:t>
+              <a:t>6/10/18</a:t>
             </a:fld>
             <a:endParaRPr lang="en-US"/>
           </a:p>
@@ -4935,7 +5017,7 @@
           <a:p>
             <a:fld id="{9881B753-FD06-4893-9BB6-752E512FD133}" type="datetimeFigureOut">
               <a:rPr lang="en-US" smtClean="0"/>
-              <a:t>6/9/2018</a:t>
+              <a:t>6/10/18</a:t>
             </a:fld>
             <a:endParaRPr lang="en-US"/>
           </a:p>
@@ -5053,7 +5135,7 @@
           <a:p>
             <a:fld id="{9881B753-FD06-4893-9BB6-752E512FD133}" type="datetimeFigureOut">
               <a:rPr lang="en-US" smtClean="0"/>
-              <a:t>6/9/2018</a:t>
+              <a:t>6/10/18</a:t>
             </a:fld>
             <a:endParaRPr lang="en-US"/>
           </a:p>
@@ -5148,7 +5230,7 @@
           <a:p>
             <a:fld id="{9881B753-FD06-4893-9BB6-752E512FD133}" type="datetimeFigureOut">
               <a:rPr lang="en-US" smtClean="0"/>
-              <a:t>6/9/2018</a:t>
+              <a:t>6/10/18</a:t>
             </a:fld>
             <a:endParaRPr lang="en-US"/>
           </a:p>
@@ -5427,7 +5509,7 @@
           <a:p>
             <a:fld id="{9881B753-FD06-4893-9BB6-752E512FD133}" type="datetimeFigureOut">
               <a:rPr lang="en-US" smtClean="0"/>
-              <a:t>6/9/2018</a:t>
+              <a:t>6/10/18</a:t>
             </a:fld>
             <a:endParaRPr lang="en-US"/>
           </a:p>
@@ -5702,7 +5784,7 @@
           <a:p>
             <a:fld id="{9881B753-FD06-4893-9BB6-752E512FD133}" type="datetimeFigureOut">
               <a:rPr lang="en-US" smtClean="0"/>
-              <a:t>6/9/2018</a:t>
+              <a:t>6/10/18</a:t>
             </a:fld>
             <a:endParaRPr lang="en-US"/>
           </a:p>
@@ -6131,7 +6213,7 @@
           <a:p>
             <a:fld id="{9881B753-FD06-4893-9BB6-752E512FD133}" type="datetimeFigureOut">
               <a:rPr lang="en-US" smtClean="0"/>
-              <a:t>6/9/2018</a:t>
+              <a:t>6/10/18</a:t>
             </a:fld>
             <a:endParaRPr lang="en-US"/>
           </a:p>
@@ -6943,6 +7025,271 @@
 </p:sld>
 </file>
 
+<file path=ppt/slides/slide12.xml><?xml version="1.0" encoding="utf-8"?>
+<p:sld xmlns:a="http://schemas.openxmlformats.org/drawingml/2006/main" xmlns:r="http://schemas.openxmlformats.org/officeDocument/2006/relationships" xmlns:p="http://schemas.openxmlformats.org/presentationml/2006/main">
+  <p:cSld>
+    <p:spTree>
+      <p:nvGrpSpPr>
+        <p:cNvPr id="1" name=""/>
+        <p:cNvGrpSpPr/>
+        <p:nvPr/>
+      </p:nvGrpSpPr>
+      <p:grpSpPr>
+        <a:xfrm>
+          <a:off x="0" y="0"/>
+          <a:ext cx="0" cy="0"/>
+          <a:chOff x="0" y="0"/>
+          <a:chExt cx="0" cy="0"/>
+        </a:xfrm>
+      </p:grpSpPr>
+      <p:sp>
+        <p:nvSpPr>
+          <p:cNvPr id="2" name="Title 1">
+            <a:extLst>
+              <a:ext uri="{FF2B5EF4-FFF2-40B4-BE49-F238E27FC236}">
+                <a16:creationId xmlns:a16="http://schemas.microsoft.com/office/drawing/2014/main" id="{A0430DB5-B319-634D-9829-F3B2DAE623E5}"/>
+              </a:ext>
+            </a:extLst>
+          </p:cNvPr>
+          <p:cNvSpPr>
+            <a:spLocks noGrp="1"/>
+          </p:cNvSpPr>
+          <p:nvPr>
+            <p:ph type="title"/>
+          </p:nvPr>
+        </p:nvSpPr>
+        <p:spPr/>
+        <p:txBody>
+          <a:bodyPr/>
+          <a:lstStyle/>
+          <a:p>
+            <a:r>
+              <a:rPr lang="en-US" dirty="0"/>
+              <a:t>Back up slides</a:t>
+            </a:r>
+          </a:p>
+        </p:txBody>
+      </p:sp>
+    </p:spTree>
+    <p:extLst>
+      <p:ext uri="{BB962C8B-B14F-4D97-AF65-F5344CB8AC3E}">
+        <p14:creationId xmlns:p14="http://schemas.microsoft.com/office/powerpoint/2010/main" val="1410350036"/>
+      </p:ext>
+    </p:extLst>
+  </p:cSld>
+  <p:clrMapOvr>
+    <a:masterClrMapping/>
+  </p:clrMapOvr>
+</p:sld>
+</file>
+
+<file path=ppt/slides/slide13.xml><?xml version="1.0" encoding="utf-8"?>
+<p:sld xmlns:a="http://schemas.openxmlformats.org/drawingml/2006/main" xmlns:r="http://schemas.openxmlformats.org/officeDocument/2006/relationships" xmlns:p="http://schemas.openxmlformats.org/presentationml/2006/main">
+  <p:cSld>
+    <p:spTree>
+      <p:nvGrpSpPr>
+        <p:cNvPr id="1" name=""/>
+        <p:cNvGrpSpPr/>
+        <p:nvPr/>
+      </p:nvGrpSpPr>
+      <p:grpSpPr>
+        <a:xfrm>
+          <a:off x="0" y="0"/>
+          <a:ext cx="0" cy="0"/>
+          <a:chOff x="0" y="0"/>
+          <a:chExt cx="0" cy="0"/>
+        </a:xfrm>
+      </p:grpSpPr>
+      <p:sp>
+        <p:nvSpPr>
+          <p:cNvPr id="2" name="Title 1">
+            <a:extLst>
+              <a:ext uri="{FF2B5EF4-FFF2-40B4-BE49-F238E27FC236}">
+                <a16:creationId xmlns:a16="http://schemas.microsoft.com/office/drawing/2014/main" id="{F103EEE6-BDA6-48B8-88A8-61A88D34266F}"/>
+              </a:ext>
+            </a:extLst>
+          </p:cNvPr>
+          <p:cNvSpPr>
+            <a:spLocks noGrp="1"/>
+          </p:cNvSpPr>
+          <p:nvPr>
+            <p:ph type="title"/>
+          </p:nvPr>
+        </p:nvSpPr>
+        <p:spPr/>
+        <p:txBody>
+          <a:bodyPr/>
+          <a:lstStyle/>
+          <a:p>
+            <a:r>
+              <a:rPr lang="en-US" dirty="0"/>
+              <a:t>Raspberry Pi 3 </a:t>
+            </a:r>
+          </a:p>
+        </p:txBody>
+      </p:sp>
+      <p:sp>
+        <p:nvSpPr>
+          <p:cNvPr id="3" name="Content Placeholder 2">
+            <a:extLst>
+              <a:ext uri="{FF2B5EF4-FFF2-40B4-BE49-F238E27FC236}">
+                <a16:creationId xmlns:a16="http://schemas.microsoft.com/office/drawing/2014/main" id="{4317C9BA-EE68-4589-9677-ED852D1CA005}"/>
+              </a:ext>
+            </a:extLst>
+          </p:cNvPr>
+          <p:cNvSpPr>
+            <a:spLocks noGrp="1"/>
+          </p:cNvSpPr>
+          <p:nvPr>
+            <p:ph idx="1"/>
+          </p:nvPr>
+        </p:nvSpPr>
+        <p:spPr>
+          <a:xfrm>
+            <a:off x="754970" y="1544918"/>
+            <a:ext cx="6110287" cy="4195481"/>
+          </a:xfrm>
+        </p:spPr>
+        <p:txBody>
+          <a:bodyPr>
+            <a:normAutofit fontScale="92500" lnSpcReduction="20000"/>
+          </a:bodyPr>
+          <a:lstStyle/>
+          <a:p>
+            <a:pPr>
+              <a:buClr>
+                <a:schemeClr val="tx1"/>
+              </a:buClr>
+              <a:buFont typeface="Arial" panose="020B0604020202020204" pitchFamily="34" charset="0"/>
+              <a:buChar char="•"/>
+            </a:pPr>
+            <a:r>
+              <a:rPr lang="en-US" sz="3200" dirty="0">
+                <a:latin typeface="+mn-lt"/>
+                <a:ea typeface="+mn-ea"/>
+                <a:cs typeface="+mn-cs"/>
+              </a:rPr>
+              <a:t>Why did we use a Raspberry Pi 3?</a:t>
+            </a:r>
+          </a:p>
+          <a:p>
+            <a:pPr lvl="1">
+              <a:buClr>
+                <a:schemeClr val="tx1"/>
+              </a:buClr>
+              <a:buFont typeface="Arial" panose="020B0604020202020204" pitchFamily="34" charset="0"/>
+              <a:buChar char="•"/>
+            </a:pPr>
+            <a:r>
+              <a:rPr lang="en-US" sz="3200" dirty="0">
+                <a:latin typeface="+mn-lt"/>
+                <a:ea typeface="+mn-ea"/>
+                <a:cs typeface="+mn-cs"/>
+              </a:rPr>
+              <a:t>Ease of use</a:t>
+            </a:r>
+          </a:p>
+          <a:p>
+            <a:pPr lvl="2">
+              <a:buClr>
+                <a:schemeClr val="tx1"/>
+              </a:buClr>
+              <a:buFont typeface="Arial" panose="020B0604020202020204" pitchFamily="34" charset="0"/>
+              <a:buChar char="•"/>
+            </a:pPr>
+            <a:r>
+              <a:rPr lang="en-US" sz="3200" dirty="0">
+                <a:latin typeface="+mn-lt"/>
+                <a:ea typeface="+mn-ea"/>
+                <a:cs typeface="+mn-cs"/>
+              </a:rPr>
+              <a:t>Easy Access</a:t>
+            </a:r>
+          </a:p>
+          <a:p>
+            <a:pPr lvl="2">
+              <a:buClr>
+                <a:schemeClr val="tx1"/>
+              </a:buClr>
+              <a:buFont typeface="Arial" panose="020B0604020202020204" pitchFamily="34" charset="0"/>
+              <a:buChar char="•"/>
+            </a:pPr>
+            <a:r>
+              <a:rPr lang="en-US" sz="3200" dirty="0">
+                <a:latin typeface="+mn-lt"/>
+                <a:ea typeface="+mn-ea"/>
+                <a:cs typeface="+mn-cs"/>
+              </a:rPr>
+              <a:t>Easy Configuration</a:t>
+            </a:r>
+          </a:p>
+          <a:p>
+            <a:pPr lvl="1">
+              <a:buClr>
+                <a:schemeClr val="tx1"/>
+              </a:buClr>
+              <a:buFont typeface="Arial" panose="020B0604020202020204" pitchFamily="34" charset="0"/>
+              <a:buChar char="•"/>
+            </a:pPr>
+            <a:r>
+              <a:rPr lang="en-US" sz="3200" dirty="0">
+                <a:latin typeface="+mn-lt"/>
+                <a:ea typeface="+mn-ea"/>
+                <a:cs typeface="+mn-cs"/>
+              </a:rPr>
+              <a:t>Power measurement through USB power supply</a:t>
+            </a:r>
+          </a:p>
+          <a:p>
+            <a:pPr>
+              <a:buClr>
+                <a:schemeClr val="tx1"/>
+              </a:buClr>
+              <a:buFont typeface="Arial" panose="020B0604020202020204" pitchFamily="34" charset="0"/>
+              <a:buChar char="•"/>
+            </a:pPr>
+            <a:endParaRPr lang="en-US" sz="3200" dirty="0">
+              <a:latin typeface="+mn-lt"/>
+              <a:ea typeface="+mn-ea"/>
+              <a:cs typeface="+mn-cs"/>
+            </a:endParaRPr>
+          </a:p>
+          <a:p>
+            <a:pPr>
+              <a:buClr>
+                <a:schemeClr val="tx1"/>
+              </a:buClr>
+              <a:buFont typeface="Arial" panose="020B0604020202020204" pitchFamily="34" charset="0"/>
+              <a:buChar char="•"/>
+            </a:pPr>
+            <a:r>
+              <a:rPr lang="en-US" sz="3200" dirty="0">
+                <a:latin typeface="+mn-lt"/>
+                <a:ea typeface="+mn-ea"/>
+                <a:cs typeface="+mn-cs"/>
+              </a:rPr>
+              <a:t>Was it a good decision?</a:t>
+            </a:r>
+          </a:p>
+          <a:p>
+            <a:pPr lvl="1"/>
+            <a:endParaRPr lang="en-US" dirty="0"/>
+          </a:p>
+        </p:txBody>
+      </p:sp>
+    </p:spTree>
+    <p:extLst>
+      <p:ext uri="{BB962C8B-B14F-4D97-AF65-F5344CB8AC3E}">
+        <p14:creationId xmlns:p14="http://schemas.microsoft.com/office/powerpoint/2010/main" val="2354792876"/>
+      </p:ext>
+    </p:extLst>
+  </p:cSld>
+  <p:clrMapOvr>
+    <a:masterClrMapping/>
+  </p:clrMapOvr>
+</p:sld>
+</file>
+
 <file path=ppt/slides/slide2.xml><?xml version="1.0" encoding="utf-8"?>
 <p:sld xmlns:a="http://schemas.openxmlformats.org/drawingml/2006/main" xmlns:r="http://schemas.openxmlformats.org/officeDocument/2006/relationships" xmlns:p="http://schemas.openxmlformats.org/presentationml/2006/main">
   <p:cSld>
@@ -7169,7 +7516,7 @@
           <p:cNvPr id="2" name="Title 1">
             <a:extLst>
               <a:ext uri="{FF2B5EF4-FFF2-40B4-BE49-F238E27FC236}">
-                <a16:creationId xmlns:a16="http://schemas.microsoft.com/office/drawing/2014/main" id="{F103EEE6-BDA6-48B8-88A8-61A88D34266F}"/>
+                <a16:creationId xmlns:a16="http://schemas.microsoft.com/office/drawing/2014/main" id="{5018CCFD-B1FF-4D91-A563-C93632FDB979}"/>
               </a:ext>
             </a:extLst>
           </p:cNvPr>
@@ -7180,96 +7527,165 @@
             <p:ph type="title"/>
           </p:nvPr>
         </p:nvSpPr>
-        <p:spPr/>
+        <p:spPr>
+          <a:xfrm>
+            <a:off x="414355" y="249516"/>
+            <a:ext cx="3940403" cy="810025"/>
+          </a:xfrm>
+        </p:spPr>
         <p:txBody>
           <a:bodyPr/>
           <a:lstStyle/>
           <a:p>
             <a:r>
               <a:rPr lang="en-US" dirty="0"/>
-              <a:t>Raspberry Pi 3 </a:t>
-            </a:r>
-          </a:p>
-        </p:txBody>
-      </p:sp>
-      <p:sp>
-        <p:nvSpPr>
-          <p:cNvPr id="3" name="Content Placeholder 2">
+              <a:t>Methodology</a:t>
+            </a:r>
+          </a:p>
+        </p:txBody>
+      </p:sp>
+      <p:pic>
+        <p:nvPicPr>
+          <p:cNvPr id="4" name="Content Placeholder 3">
             <a:extLst>
               <a:ext uri="{FF2B5EF4-FFF2-40B4-BE49-F238E27FC236}">
-                <a16:creationId xmlns:a16="http://schemas.microsoft.com/office/drawing/2014/main" id="{4317C9BA-EE68-4589-9677-ED852D1CA005}"/>
+                <a16:creationId xmlns:a16="http://schemas.microsoft.com/office/drawing/2014/main" id="{3D6E1FED-47BC-4C1C-B0A3-2867CE4BEB6B}"/>
               </a:ext>
             </a:extLst>
           </p:cNvPr>
-          <p:cNvSpPr>
-            <a:spLocks noGrp="1"/>
-          </p:cNvSpPr>
+          <p:cNvPicPr>
+            <a:picLocks noGrp="1" noChangeAspect="1"/>
+          </p:cNvPicPr>
           <p:nvPr>
             <p:ph idx="1"/>
           </p:nvPr>
-        </p:nvSpPr>
+        </p:nvPicPr>
+        <p:blipFill>
+          <a:blip r:embed="rId2"/>
+          <a:stretch>
+            <a:fillRect/>
+          </a:stretch>
+        </p:blipFill>
         <p:spPr>
           <a:xfrm>
-            <a:off x="1103313" y="2052918"/>
-            <a:ext cx="6328002" cy="4195481"/>
+            <a:off x="5703168" y="1059541"/>
+            <a:ext cx="6457978" cy="5123545"/>
           </a:xfrm>
+          <a:prstGeom prst="rect">
+            <a:avLst/>
+          </a:prstGeom>
         </p:spPr>
-        <p:txBody>
-          <a:bodyPr/>
-          <a:lstStyle/>
-          <a:p>
-            <a:r>
-              <a:rPr lang="en-US" dirty="0"/>
-              <a:t>Why did we use a Raspberry Pi 3?</a:t>
+      </p:pic>
+      <p:sp>
+        <p:nvSpPr>
+          <p:cNvPr id="3" name="TextBox 2">
+            <a:extLst>
+              <a:ext uri="{FF2B5EF4-FFF2-40B4-BE49-F238E27FC236}">
+                <a16:creationId xmlns:a16="http://schemas.microsoft.com/office/drawing/2014/main" id="{22365DD9-9575-AF41-A61C-89BD43EAEA0F}"/>
+              </a:ext>
+            </a:extLst>
+          </p:cNvPr>
+          <p:cNvSpPr txBox="1"/>
+          <p:nvPr/>
+        </p:nvSpPr>
+        <p:spPr>
+          <a:xfrm>
+            <a:off x="414355" y="1378846"/>
+            <a:ext cx="5057057" cy="5139869"/>
+          </a:xfrm>
+          <a:prstGeom prst="rect">
+            <a:avLst/>
+          </a:prstGeom>
+          <a:noFill/>
+        </p:spPr>
+        <p:txBody>
+          <a:bodyPr wrap="square" rtlCol="0">
+            <a:spAutoFit/>
+          </a:bodyPr>
+          <a:lstStyle/>
+          <a:p>
+            <a:r>
+              <a:rPr lang="en-US" sz="3200" dirty="0"/>
+              <a:t>Three Cases</a:t>
+            </a:r>
+          </a:p>
+          <a:p>
+            <a:endParaRPr lang="en-US" sz="3200" dirty="0"/>
+          </a:p>
+          <a:p>
+            <a:pPr marL="285750" indent="-285750">
+              <a:buFont typeface="Arial" panose="020B0604020202020204" pitchFamily="34" charset="0"/>
+              <a:buChar char="•"/>
+            </a:pPr>
+            <a:r>
+              <a:rPr lang="en-US" sz="2400" dirty="0"/>
+              <a:t>Baseline(red line)</a:t>
+            </a:r>
+          </a:p>
+          <a:p>
+            <a:pPr marL="742950" lvl="1" indent="-285750">
+              <a:buFont typeface="Arial" panose="020B0604020202020204" pitchFamily="34" charset="0"/>
+              <a:buChar char="•"/>
+            </a:pPr>
+            <a:r>
+              <a:rPr lang="en-US" sz="2400" dirty="0"/>
+              <a:t>Load data into core and operate</a:t>
             </a:r>
           </a:p>
           <a:p>
             <a:pPr lvl="1"/>
-            <a:r>
-              <a:rPr lang="en-US" dirty="0"/>
-              <a:t>Ease of use</a:t>
-            </a:r>
-          </a:p>
-          <a:p>
-            <a:pPr lvl="2"/>
-            <a:r>
-              <a:rPr lang="en-US" dirty="0"/>
-              <a:t>Easy Access</a:t>
-            </a:r>
-          </a:p>
-          <a:p>
-            <a:pPr lvl="2"/>
-            <a:r>
-              <a:rPr lang="en-US" dirty="0"/>
-              <a:t>Easy Configuration</a:t>
+            <a:endParaRPr lang="en-US" sz="2400" dirty="0"/>
+          </a:p>
+          <a:p>
+            <a:pPr marL="285750" indent="-285750">
+              <a:buFont typeface="Arial" panose="020B0604020202020204" pitchFamily="34" charset="0"/>
+              <a:buChar char="•"/>
+            </a:pPr>
+            <a:r>
+              <a:rPr lang="en-US" sz="2400" dirty="0"/>
+              <a:t>L1 Cache Loads(orange line)</a:t>
+            </a:r>
+          </a:p>
+          <a:p>
+            <a:pPr marL="742950" lvl="1" indent="-285750">
+              <a:buFont typeface="Arial" panose="020B0604020202020204" pitchFamily="34" charset="0"/>
+              <a:buChar char="•"/>
+            </a:pPr>
+            <a:r>
+              <a:rPr lang="en-US" sz="2400" dirty="0"/>
+              <a:t>On each operation, load data from L1 to core</a:t>
             </a:r>
           </a:p>
           <a:p>
             <a:pPr lvl="1"/>
-            <a:r>
-              <a:rPr lang="en-US" dirty="0"/>
-              <a:t>Power measurement through USB power supply</a:t>
-            </a:r>
-          </a:p>
-          <a:p>
-            <a:endParaRPr lang="en-US" dirty="0"/>
-          </a:p>
-          <a:p>
-            <a:r>
-              <a:rPr lang="en-US" dirty="0"/>
-              <a:t>Was it a good decision?</a:t>
-            </a:r>
-          </a:p>
-          <a:p>
-            <a:pPr lvl="1"/>
-            <a:endParaRPr lang="en-US" dirty="0"/>
+            <a:endParaRPr lang="en-US" sz="2400" dirty="0"/>
+          </a:p>
+          <a:p>
+            <a:pPr marL="285750" indent="-285750">
+              <a:buFont typeface="Arial" panose="020B0604020202020204" pitchFamily="34" charset="0"/>
+              <a:buChar char="•"/>
+            </a:pPr>
+            <a:r>
+              <a:rPr lang="en-US" sz="2400" dirty="0"/>
+              <a:t>LLC Cache Loads(green line)</a:t>
+            </a:r>
+          </a:p>
+          <a:p>
+            <a:pPr marL="742950" lvl="1" indent="-285750">
+              <a:buFont typeface="Arial" panose="020B0604020202020204" pitchFamily="34" charset="0"/>
+              <a:buChar char="•"/>
+            </a:pPr>
+            <a:r>
+              <a:rPr lang="en-US" sz="2400" dirty="0"/>
+              <a:t>On each operation, load data from LLC to L1 to core</a:t>
+            </a:r>
           </a:p>
         </p:txBody>
       </p:sp>
     </p:spTree>
     <p:extLst>
       <p:ext uri="{BB962C8B-B14F-4D97-AF65-F5344CB8AC3E}">
-        <p14:creationId xmlns:p14="http://schemas.microsoft.com/office/powerpoint/2010/main" val="2354792876"/>
+        <p14:creationId xmlns:p14="http://schemas.microsoft.com/office/powerpoint/2010/main" val="1176215958"/>
       </p:ext>
     </p:extLst>
   </p:cSld>
@@ -7301,7 +7717,7 @@
           <p:cNvPr id="2" name="Title 1">
             <a:extLst>
               <a:ext uri="{FF2B5EF4-FFF2-40B4-BE49-F238E27FC236}">
-                <a16:creationId xmlns:a16="http://schemas.microsoft.com/office/drawing/2014/main" id="{5018CCFD-B1FF-4D91-A563-C93632FDB979}"/>
+                <a16:creationId xmlns:a16="http://schemas.microsoft.com/office/drawing/2014/main" id="{E2BE379B-4655-4044-A1F2-34F653CF73B3}"/>
               </a:ext>
             </a:extLst>
           </p:cNvPr>
@@ -7312,146 +7728,247 @@
             <p:ph type="title"/>
           </p:nvPr>
         </p:nvSpPr>
-        <p:spPr>
-          <a:xfrm>
-            <a:off x="1299254" y="249516"/>
-            <a:ext cx="3940403" cy="810025"/>
-          </a:xfrm>
-        </p:spPr>
+        <p:spPr/>
         <p:txBody>
           <a:bodyPr/>
           <a:lstStyle/>
           <a:p>
             <a:r>
               <a:rPr lang="en-US" dirty="0"/>
-              <a:t>Methodology</a:t>
-            </a:r>
-          </a:p>
-        </p:txBody>
-      </p:sp>
-      <p:pic>
-        <p:nvPicPr>
-          <p:cNvPr id="4" name="Content Placeholder 3">
+              <a:t>Data Movement</a:t>
+            </a:r>
+          </a:p>
+        </p:txBody>
+      </p:sp>
+      <p:sp>
+        <p:nvSpPr>
+          <p:cNvPr id="3" name="Content Placeholder 2">
             <a:extLst>
               <a:ext uri="{FF2B5EF4-FFF2-40B4-BE49-F238E27FC236}">
-                <a16:creationId xmlns:a16="http://schemas.microsoft.com/office/drawing/2014/main" id="{3D6E1FED-47BC-4C1C-B0A3-2867CE4BEB6B}"/>
+                <a16:creationId xmlns:a16="http://schemas.microsoft.com/office/drawing/2014/main" id="{F55A6D9C-C48C-4E5D-B173-66A30B25BC7B}"/>
               </a:ext>
             </a:extLst>
           </p:cNvPr>
-          <p:cNvPicPr>
-            <a:picLocks noGrp="1" noChangeAspect="1"/>
-          </p:cNvPicPr>
+          <p:cNvSpPr>
+            <a:spLocks noGrp="1"/>
+          </p:cNvSpPr>
           <p:nvPr>
             <p:ph idx="1"/>
           </p:nvPr>
-        </p:nvPicPr>
-        <p:blipFill>
-          <a:blip r:embed="rId2"/>
-          <a:stretch>
-            <a:fillRect/>
-          </a:stretch>
-        </p:blipFill>
+        </p:nvSpPr>
         <p:spPr>
           <a:xfrm>
-            <a:off x="5703168" y="1059541"/>
-            <a:ext cx="5731741" cy="4547373"/>
+            <a:off x="1103312" y="1407886"/>
+            <a:ext cx="8946541" cy="4840513"/>
           </a:xfrm>
-          <a:prstGeom prst="rect">
-            <a:avLst/>
-          </a:prstGeom>
         </p:spPr>
-      </p:pic>
-      <p:sp>
-        <p:nvSpPr>
-          <p:cNvPr id="3" name="TextBox 2">
-            <a:extLst>
-              <a:ext uri="{FF2B5EF4-FFF2-40B4-BE49-F238E27FC236}">
-                <a16:creationId xmlns:a16="http://schemas.microsoft.com/office/drawing/2014/main" id="{22365DD9-9575-AF41-A61C-89BD43EAEA0F}"/>
-              </a:ext>
-            </a:extLst>
-          </p:cNvPr>
-          <p:cNvSpPr txBox="1"/>
-          <p:nvPr/>
-        </p:nvSpPr>
-        <p:spPr>
-          <a:xfrm>
-            <a:off x="646111" y="1161143"/>
-            <a:ext cx="4593546" cy="5386090"/>
-          </a:xfrm>
-          <a:prstGeom prst="rect">
-            <a:avLst/>
-          </a:prstGeom>
-          <a:noFill/>
-        </p:spPr>
-        <p:txBody>
-          <a:bodyPr wrap="square" rtlCol="0">
-            <a:spAutoFit/>
+        <p:txBody>
+          <a:bodyPr>
+            <a:normAutofit fontScale="70000" lnSpcReduction="20000"/>
           </a:bodyPr>
           <a:lstStyle/>
           <a:p>
-            <a:r>
-              <a:rPr lang="en-US" sz="3200" dirty="0"/>
-              <a:t>Three Test Cases</a:t>
-            </a:r>
-          </a:p>
-          <a:p>
-            <a:pPr marL="285750" indent="-285750">
+            <a:pPr>
+              <a:buClr>
+                <a:schemeClr val="tx1"/>
+              </a:buClr>
               <a:buFont typeface="Arial" panose="020B0604020202020204" pitchFamily="34" charset="0"/>
               <a:buChar char="•"/>
             </a:pPr>
             <a:r>
-              <a:rPr lang="en-US" sz="2400" dirty="0"/>
-              <a:t>Baseline(red line)</a:t>
-            </a:r>
-          </a:p>
-          <a:p>
-            <a:pPr marL="742950" lvl="1" indent="-285750">
+              <a:rPr lang="en-US" sz="3200" dirty="0">
+                <a:latin typeface="+mn-lt"/>
+                <a:ea typeface="+mn-ea"/>
+                <a:cs typeface="+mn-cs"/>
+              </a:rPr>
+              <a:t>Initialization</a:t>
+            </a:r>
+          </a:p>
+          <a:p>
+            <a:pPr lvl="1">
+              <a:buClr>
+                <a:schemeClr val="tx1"/>
+              </a:buClr>
               <a:buFont typeface="Arial" panose="020B0604020202020204" pitchFamily="34" charset="0"/>
               <a:buChar char="•"/>
             </a:pPr>
             <a:r>
-              <a:rPr lang="en-US" sz="2400" dirty="0"/>
-              <a:t>Load data into core and operate</a:t>
-            </a:r>
-          </a:p>
-          <a:p>
-            <a:pPr marL="285750" indent="-285750">
+              <a:rPr lang="en-US" sz="3200" dirty="0">
+                <a:latin typeface="+mn-lt"/>
+                <a:ea typeface="+mn-ea"/>
+                <a:cs typeface="+mn-cs"/>
+              </a:rPr>
+              <a:t>For all cases, we need a consistent configuration cost</a:t>
+            </a:r>
+          </a:p>
+          <a:p>
+            <a:pPr lvl="1">
+              <a:buClr>
+                <a:schemeClr val="tx1"/>
+              </a:buClr>
               <a:buFont typeface="Arial" panose="020B0604020202020204" pitchFamily="34" charset="0"/>
               <a:buChar char="•"/>
             </a:pPr>
             <a:r>
-              <a:rPr lang="en-US" sz="2400" dirty="0"/>
-              <a:t>L1 Cache Loads(orange line)</a:t>
-            </a:r>
-          </a:p>
-          <a:p>
-            <a:pPr marL="742950" lvl="1" indent="-285750">
+              <a:rPr lang="en-US" sz="3200" dirty="0">
+                <a:latin typeface="+mn-lt"/>
+                <a:ea typeface="+mn-ea"/>
+                <a:cs typeface="+mn-cs"/>
+              </a:rPr>
+              <a:t>Memory allocation and initialization</a:t>
+            </a:r>
+          </a:p>
+          <a:p>
+            <a:pPr lvl="1">
+              <a:buClr>
+                <a:schemeClr val="tx1"/>
+              </a:buClr>
               <a:buFont typeface="Arial" panose="020B0604020202020204" pitchFamily="34" charset="0"/>
               <a:buChar char="•"/>
             </a:pPr>
             <a:r>
-              <a:rPr lang="en-US" sz="2400" dirty="0"/>
-              <a:t>On each operation, load data from L1 to core</a:t>
-            </a:r>
-          </a:p>
-          <a:p>
-            <a:pPr marL="285750" indent="-285750">
+              <a:rPr lang="en-US" sz="3200" dirty="0">
+                <a:latin typeface="+mn-lt"/>
+                <a:ea typeface="+mn-ea"/>
+                <a:cs typeface="+mn-cs"/>
+              </a:rPr>
+              <a:t>Array size == 2X L1 Cache Size</a:t>
+            </a:r>
+          </a:p>
+          <a:p>
+            <a:pPr>
+              <a:buClr>
+                <a:schemeClr val="tx1"/>
+              </a:buClr>
               <a:buFont typeface="Arial" panose="020B0604020202020204" pitchFamily="34" charset="0"/>
               <a:buChar char="•"/>
             </a:pPr>
             <a:r>
-              <a:rPr lang="en-US" sz="2400" dirty="0"/>
-              <a:t>LLC Cache Loads(green line)</a:t>
-            </a:r>
-          </a:p>
-          <a:p>
-            <a:pPr marL="742950" lvl="1" indent="-285750">
+              <a:rPr lang="en-US" sz="3200" dirty="0">
+                <a:latin typeface="+mn-lt"/>
+                <a:ea typeface="+mn-ea"/>
+                <a:cs typeface="+mn-cs"/>
+              </a:rPr>
+              <a:t>Baseline</a:t>
+            </a:r>
+          </a:p>
+          <a:p>
+            <a:pPr lvl="1">
+              <a:buClr>
+                <a:schemeClr val="tx1"/>
+              </a:buClr>
               <a:buFont typeface="Arial" panose="020B0604020202020204" pitchFamily="34" charset="0"/>
               <a:buChar char="•"/>
             </a:pPr>
             <a:r>
-              <a:rPr lang="en-US" sz="2400" dirty="0"/>
-              <a:t>On each operation, load data from LLC to L1 to core</a:t>
+              <a:rPr lang="en-US" sz="3200" dirty="0">
+                <a:latin typeface="+mn-lt"/>
+                <a:ea typeface="+mn-ea"/>
+                <a:cs typeface="+mn-cs"/>
+              </a:rPr>
+              <a:t>Simple operation(addition) on value in core registers</a:t>
+            </a:r>
+          </a:p>
+          <a:p>
+            <a:pPr>
+              <a:buClr>
+                <a:schemeClr val="tx1"/>
+              </a:buClr>
+              <a:buFont typeface="Arial" panose="020B0604020202020204" pitchFamily="34" charset="0"/>
+              <a:buChar char="•"/>
+            </a:pPr>
+            <a:r>
+              <a:rPr lang="en-US" sz="3200" dirty="0">
+                <a:latin typeface="+mn-lt"/>
+                <a:ea typeface="+mn-ea"/>
+                <a:cs typeface="+mn-cs"/>
+              </a:rPr>
+              <a:t>L1 Cache</a:t>
+            </a:r>
+          </a:p>
+          <a:p>
+            <a:pPr lvl="1">
+              <a:buClr>
+                <a:schemeClr val="tx1"/>
+              </a:buClr>
+              <a:buFont typeface="Arial" panose="020B0604020202020204" pitchFamily="34" charset="0"/>
+              <a:buChar char="•"/>
+            </a:pPr>
+            <a:r>
+              <a:rPr lang="en-US" sz="3200" dirty="0">
+                <a:latin typeface="+mn-lt"/>
+                <a:ea typeface="+mn-ea"/>
+                <a:cs typeface="+mn-cs"/>
+              </a:rPr>
+              <a:t>Alternate between two L1 cache lines</a:t>
+            </a:r>
+          </a:p>
+          <a:p>
+            <a:pPr>
+              <a:buClr>
+                <a:schemeClr val="tx1"/>
+              </a:buClr>
+              <a:buFont typeface="Arial" panose="020B0604020202020204" pitchFamily="34" charset="0"/>
+              <a:buChar char="•"/>
+            </a:pPr>
+            <a:r>
+              <a:rPr lang="en-US" sz="3200" dirty="0">
+                <a:latin typeface="+mn-lt"/>
+                <a:ea typeface="+mn-ea"/>
+                <a:cs typeface="+mn-cs"/>
+              </a:rPr>
+              <a:t>LLC </a:t>
+            </a:r>
+          </a:p>
+          <a:p>
+            <a:pPr lvl="1">
+              <a:buClr>
+                <a:schemeClr val="tx1"/>
+              </a:buClr>
+              <a:buFont typeface="Arial" panose="020B0604020202020204" pitchFamily="34" charset="0"/>
+              <a:buChar char="•"/>
+            </a:pPr>
+            <a:r>
+              <a:rPr lang="en-US" sz="3200" dirty="0">
+                <a:latin typeface="+mn-lt"/>
+                <a:ea typeface="+mn-ea"/>
+                <a:cs typeface="+mn-cs"/>
+              </a:rPr>
+              <a:t>Load from a new cache line on each access</a:t>
+            </a:r>
+          </a:p>
+          <a:p>
+            <a:pPr lvl="1">
+              <a:buClr>
+                <a:schemeClr val="tx1"/>
+              </a:buClr>
+              <a:buFont typeface="Arial" panose="020B0604020202020204" pitchFamily="34" charset="0"/>
+              <a:buChar char="•"/>
+            </a:pPr>
+            <a:r>
+              <a:rPr lang="en-US" sz="3200" dirty="0">
+                <a:latin typeface="+mn-lt"/>
+                <a:ea typeface="+mn-ea"/>
+                <a:cs typeface="+mn-cs"/>
+              </a:rPr>
+              <a:t>Twice as many cache lines in the array as in L1</a:t>
+            </a:r>
+          </a:p>
+          <a:p>
+            <a:pPr lvl="1">
+              <a:buClr>
+                <a:schemeClr val="tx1"/>
+              </a:buClr>
+              <a:buFont typeface="Arial" panose="020B0604020202020204" pitchFamily="34" charset="0"/>
+              <a:buChar char="•"/>
+            </a:pPr>
+            <a:r>
+              <a:rPr lang="en-US" sz="3200" dirty="0">
+                <a:latin typeface="+mn-lt"/>
+                <a:ea typeface="+mn-ea"/>
+                <a:cs typeface="+mn-cs"/>
+              </a:rPr>
+              <a:t>Guarantees that every load causes a L1 cache miss</a:t>
             </a:r>
           </a:p>
         </p:txBody>
@@ -7459,7 +7976,7 @@
     </p:spTree>
     <p:extLst>
       <p:ext uri="{BB962C8B-B14F-4D97-AF65-F5344CB8AC3E}">
-        <p14:creationId xmlns:p14="http://schemas.microsoft.com/office/powerpoint/2010/main" val="1176215958"/>
+        <p14:creationId xmlns:p14="http://schemas.microsoft.com/office/powerpoint/2010/main" val="3777898840"/>
       </p:ext>
     </p:extLst>
   </p:cSld>
@@ -7491,7 +8008,7 @@
           <p:cNvPr id="2" name="Title 1">
             <a:extLst>
               <a:ext uri="{FF2B5EF4-FFF2-40B4-BE49-F238E27FC236}">
-                <a16:creationId xmlns:a16="http://schemas.microsoft.com/office/drawing/2014/main" id="{E2BE379B-4655-4044-A1F2-34F653CF73B3}"/>
+                <a16:creationId xmlns:a16="http://schemas.microsoft.com/office/drawing/2014/main" id="{A37F778E-F8F5-8E4A-9E0C-B05269E0EB32}"/>
               </a:ext>
             </a:extLst>
           </p:cNvPr>
@@ -7502,118 +8019,118 @@
             <p:ph type="title"/>
           </p:nvPr>
         </p:nvSpPr>
-        <p:spPr/>
+        <p:spPr>
+          <a:xfrm>
+            <a:off x="162018" y="363071"/>
+            <a:ext cx="3621087" cy="1400530"/>
+          </a:xfrm>
+        </p:spPr>
         <p:txBody>
           <a:bodyPr/>
           <a:lstStyle/>
           <a:p>
             <a:r>
               <a:rPr lang="en-US" dirty="0"/>
-              <a:t>Data Movement</a:t>
-            </a:r>
-          </a:p>
-        </p:txBody>
-      </p:sp>
-      <p:sp>
-        <p:nvSpPr>
-          <p:cNvPr id="3" name="Content Placeholder 2">
+              <a:t>Experimental Setup</a:t>
+            </a:r>
+            <a:br>
+              <a:rPr lang="en-US" dirty="0"/>
+            </a:br>
+            <a:endParaRPr lang="en-US" dirty="0"/>
+          </a:p>
+        </p:txBody>
+      </p:sp>
+      <p:pic>
+        <p:nvPicPr>
+          <p:cNvPr id="4" name="Picture 3">
             <a:extLst>
               <a:ext uri="{FF2B5EF4-FFF2-40B4-BE49-F238E27FC236}">
-                <a16:creationId xmlns:a16="http://schemas.microsoft.com/office/drawing/2014/main" id="{F55A6D9C-C48C-4E5D-B173-66A30B25BC7B}"/>
+                <a16:creationId xmlns:a16="http://schemas.microsoft.com/office/drawing/2014/main" id="{AD037173-1CE3-8C41-927C-C5778A3B33D4}"/>
               </a:ext>
             </a:extLst>
           </p:cNvPr>
-          <p:cNvSpPr>
-            <a:spLocks noGrp="1"/>
-          </p:cNvSpPr>
-          <p:nvPr>
-            <p:ph idx="1"/>
-          </p:nvPr>
-        </p:nvSpPr>
-        <p:spPr/>
-        <p:txBody>
-          <a:bodyPr>
-            <a:normAutofit fontScale="92500" lnSpcReduction="20000"/>
+          <p:cNvPicPr>
+            <a:picLocks noChangeAspect="1"/>
+          </p:cNvPicPr>
+          <p:nvPr/>
+        </p:nvPicPr>
+        <p:blipFill>
+          <a:blip r:embed="rId2">
+            <a:extLst>
+              <a:ext uri="{28A0092B-C50C-407E-A947-70E740481C1C}">
+                <a14:useLocalDpi xmlns:a14="http://schemas.microsoft.com/office/drawing/2010/main" val="0"/>
+              </a:ext>
+            </a:extLst>
+          </a:blip>
+          <a:stretch>
+            <a:fillRect/>
+          </a:stretch>
+        </p:blipFill>
+        <p:spPr>
+          <a:xfrm>
+            <a:off x="3783105" y="582706"/>
+            <a:ext cx="7888941" cy="5916706"/>
+          </a:xfrm>
+          <a:prstGeom prst="rect">
+            <a:avLst/>
+          </a:prstGeom>
+        </p:spPr>
+      </p:pic>
+      <p:sp>
+        <p:nvSpPr>
+          <p:cNvPr id="5" name="TextBox 4">
+            <a:extLst>
+              <a:ext uri="{FF2B5EF4-FFF2-40B4-BE49-F238E27FC236}">
+                <a16:creationId xmlns:a16="http://schemas.microsoft.com/office/drawing/2014/main" id="{A579D8C9-561F-8040-A47F-F863A607B0E5}"/>
+              </a:ext>
+            </a:extLst>
+          </p:cNvPr>
+          <p:cNvSpPr txBox="1"/>
+          <p:nvPr/>
+        </p:nvSpPr>
+        <p:spPr>
+          <a:xfrm>
+            <a:off x="367879" y="1763601"/>
+            <a:ext cx="3209366" cy="4832092"/>
+          </a:xfrm>
+          <a:prstGeom prst="rect">
+            <a:avLst/>
+          </a:prstGeom>
+          <a:noFill/>
+        </p:spPr>
+        <p:txBody>
+          <a:bodyPr wrap="square" rtlCol="0">
+            <a:spAutoFit/>
           </a:bodyPr>
           <a:lstStyle/>
           <a:p>
-            <a:r>
-              <a:rPr lang="en-US" dirty="0"/>
-              <a:t>Initialization</a:t>
-            </a:r>
-          </a:p>
-          <a:p>
-            <a:pPr lvl="1"/>
-            <a:r>
-              <a:rPr lang="en-US" dirty="0"/>
-              <a:t>For all cases, we need a consistent configuration cost</a:t>
-            </a:r>
-          </a:p>
-          <a:p>
-            <a:pPr lvl="1"/>
-            <a:r>
-              <a:rPr lang="en-US" dirty="0"/>
-              <a:t>Memory allocation and initialization</a:t>
-            </a:r>
-          </a:p>
-          <a:p>
-            <a:pPr lvl="1"/>
-            <a:r>
-              <a:rPr lang="en-US" dirty="0"/>
-              <a:t>Array size == 2X L1 Cache Size</a:t>
-            </a:r>
-          </a:p>
-          <a:p>
-            <a:r>
-              <a:rPr lang="en-US" dirty="0"/>
-              <a:t>Baseline</a:t>
-            </a:r>
-          </a:p>
-          <a:p>
-            <a:pPr lvl="1"/>
-            <a:r>
-              <a:rPr lang="en-US" dirty="0"/>
-              <a:t>Simple operation(addition) on value in core registers</a:t>
-            </a:r>
-          </a:p>
-          <a:p>
-            <a:r>
-              <a:rPr lang="en-US" dirty="0"/>
-              <a:t>L1 Cache</a:t>
-            </a:r>
-          </a:p>
-          <a:p>
-            <a:pPr lvl="1"/>
-            <a:r>
-              <a:rPr lang="en-US" dirty="0"/>
-              <a:t>Alternate between two L1 cache lines</a:t>
-            </a:r>
-          </a:p>
-          <a:p>
-            <a:r>
-              <a:rPr lang="en-US" dirty="0"/>
-              <a:t>LLC </a:t>
-            </a:r>
-          </a:p>
-          <a:p>
-            <a:pPr lvl="1"/>
-            <a:r>
-              <a:rPr lang="en-US" dirty="0"/>
-              <a:t>Load from a new cache line on each access</a:t>
-            </a:r>
-          </a:p>
-          <a:p>
-            <a:pPr lvl="1"/>
-            <a:r>
-              <a:rPr lang="en-US" dirty="0"/>
-              <a:t>Twice as many cache lines in the array as in L1</a:t>
-            </a:r>
-          </a:p>
-          <a:p>
-            <a:pPr lvl="1"/>
-            <a:r>
-              <a:rPr lang="en-US" dirty="0"/>
-              <a:t>Guarantees that every load causes a L1 cache miss</a:t>
+            <a:pPr marL="285750" indent="-285750">
+              <a:buFont typeface="Arial" panose="020B0604020202020204" pitchFamily="34" charset="0"/>
+              <a:buChar char="•"/>
+            </a:pPr>
+            <a:r>
+              <a:rPr lang="en-US" sz="2800" dirty="0"/>
+              <a:t>Used bash script to run multiple cases</a:t>
+            </a:r>
+          </a:p>
+          <a:p>
+            <a:pPr marL="285750" indent="-285750">
+              <a:buFont typeface="Arial" panose="020B0604020202020204" pitchFamily="34" charset="0"/>
+              <a:buChar char="•"/>
+            </a:pPr>
+            <a:r>
+              <a:rPr lang="en-US" sz="2800" dirty="0"/>
+              <a:t>Took photo of power meter in between each run</a:t>
+            </a:r>
+          </a:p>
+          <a:p>
+            <a:pPr marL="285750" indent="-285750">
+              <a:buFont typeface="Arial" panose="020B0604020202020204" pitchFamily="34" charset="0"/>
+              <a:buChar char="•"/>
+            </a:pPr>
+            <a:r>
+              <a:rPr lang="en-US" sz="2800" dirty="0"/>
+              <a:t>Found good use for Algorithms Textbook</a:t>
             </a:r>
           </a:p>
         </p:txBody>
@@ -7621,7 +8138,7 @@
     </p:spTree>
     <p:extLst>
       <p:ext uri="{BB962C8B-B14F-4D97-AF65-F5344CB8AC3E}">
-        <p14:creationId xmlns:p14="http://schemas.microsoft.com/office/powerpoint/2010/main" val="3777898840"/>
+        <p14:creationId xmlns:p14="http://schemas.microsoft.com/office/powerpoint/2010/main" val="4103123731"/>
       </p:ext>
     </p:extLst>
   </p:cSld>

</xml_diff>

<commit_message>
Added a couple of data slides
</commit_message>
<xml_diff>
--- a/documents/Outline for Presentation.pptx
+++ b/documents/Outline for Presentation.pptx
@@ -5,7 +5,7 @@
     <p:sldMasterId id="2147483762" r:id="rId1"/>
   </p:sldMasterIdLst>
   <p:notesMasterIdLst>
-    <p:notesMasterId r:id="rId15"/>
+    <p:notesMasterId r:id="rId16"/>
   </p:notesMasterIdLst>
   <p:sldIdLst>
     <p:sldId id="256" r:id="rId2"/>
@@ -15,12 +15,13 @@
     <p:sldId id="262" r:id="rId6"/>
     <p:sldId id="268" r:id="rId7"/>
     <p:sldId id="267" r:id="rId8"/>
-    <p:sldId id="261" r:id="rId9"/>
-    <p:sldId id="264" r:id="rId10"/>
-    <p:sldId id="265" r:id="rId11"/>
-    <p:sldId id="266" r:id="rId12"/>
-    <p:sldId id="270" r:id="rId13"/>
-    <p:sldId id="260" r:id="rId14"/>
+    <p:sldId id="271" r:id="rId9"/>
+    <p:sldId id="261" r:id="rId10"/>
+    <p:sldId id="264" r:id="rId11"/>
+    <p:sldId id="265" r:id="rId12"/>
+    <p:sldId id="266" r:id="rId13"/>
+    <p:sldId id="270" r:id="rId14"/>
+    <p:sldId id="260" r:id="rId15"/>
   </p:sldIdLst>
   <p:sldSz cx="12192000" cy="6858000"/>
   <p:notesSz cx="6858000" cy="9144000"/>
@@ -125,6 +126,3370 @@
     </p:ext>
   </p:extLst>
 </p:presentation>
+</file>
+
+<file path=ppt/charts/chart1.xml><?xml version="1.0" encoding="utf-8"?>
+<c:chartSpace xmlns:c="http://schemas.openxmlformats.org/drawingml/2006/chart" xmlns:a="http://schemas.openxmlformats.org/drawingml/2006/main" xmlns:r="http://schemas.openxmlformats.org/officeDocument/2006/relationships" xmlns:c16r2="http://schemas.microsoft.com/office/drawing/2015/06/chart">
+  <c:date1904 val="0"/>
+  <c:lang val="en-US"/>
+  <c:roundedCorners val="0"/>
+  <mc:AlternateContent xmlns:mc="http://schemas.openxmlformats.org/markup-compatibility/2006">
+    <mc:Choice xmlns:c14="http://schemas.microsoft.com/office/drawing/2007/8/2/chart" Requires="c14">
+      <c14:style val="102"/>
+    </mc:Choice>
+    <mc:Fallback>
+      <c:style val="2"/>
+    </mc:Fallback>
+  </mc:AlternateContent>
+  <c:pivotSource>
+    <c:name>[simple_data_move_data.csv]Sheet1!PivotTable4</c:name>
+    <c:fmtId val="5"/>
+  </c:pivotSource>
+  <c:chart>
+    <c:autoTitleDeleted val="0"/>
+    <c:pivotFmts>
+      <c:pivotFmt>
+        <c:idx val="0"/>
+        <c:spPr>
+          <a:solidFill>
+            <a:schemeClr val="accent1"/>
+          </a:solidFill>
+          <a:ln>
+            <a:noFill/>
+          </a:ln>
+          <a:effectLst/>
+        </c:spPr>
+        <c:marker>
+          <c:symbol val="none"/>
+        </c:marker>
+      </c:pivotFmt>
+      <c:pivotFmt>
+        <c:idx val="1"/>
+        <c:spPr>
+          <a:solidFill>
+            <a:schemeClr val="accent1"/>
+          </a:solidFill>
+          <a:ln>
+            <a:noFill/>
+          </a:ln>
+          <a:effectLst/>
+        </c:spPr>
+        <c:marker>
+          <c:symbol val="none"/>
+        </c:marker>
+      </c:pivotFmt>
+      <c:pivotFmt>
+        <c:idx val="2"/>
+        <c:spPr>
+          <a:solidFill>
+            <a:schemeClr val="accent1"/>
+          </a:solidFill>
+          <a:ln>
+            <a:noFill/>
+          </a:ln>
+          <a:effectLst/>
+        </c:spPr>
+        <c:marker>
+          <c:symbol val="none"/>
+        </c:marker>
+      </c:pivotFmt>
+      <c:pivotFmt>
+        <c:idx val="3"/>
+        <c:spPr>
+          <a:solidFill>
+            <a:schemeClr val="accent1"/>
+          </a:solidFill>
+          <a:ln>
+            <a:noFill/>
+          </a:ln>
+          <a:effectLst/>
+        </c:spPr>
+        <c:marker>
+          <c:symbol val="none"/>
+        </c:marker>
+      </c:pivotFmt>
+      <c:pivotFmt>
+        <c:idx val="4"/>
+        <c:spPr>
+          <a:solidFill>
+            <a:schemeClr val="accent1"/>
+          </a:solidFill>
+          <a:ln>
+            <a:noFill/>
+          </a:ln>
+          <a:effectLst/>
+        </c:spPr>
+        <c:marker>
+          <c:symbol val="none"/>
+        </c:marker>
+      </c:pivotFmt>
+      <c:pivotFmt>
+        <c:idx val="5"/>
+        <c:spPr>
+          <a:solidFill>
+            <a:schemeClr val="accent1"/>
+          </a:solidFill>
+          <a:ln>
+            <a:noFill/>
+          </a:ln>
+          <a:effectLst/>
+        </c:spPr>
+        <c:marker>
+          <c:symbol val="none"/>
+        </c:marker>
+      </c:pivotFmt>
+      <c:pivotFmt>
+        <c:idx val="6"/>
+        <c:spPr>
+          <a:solidFill>
+            <a:schemeClr val="accent1"/>
+          </a:solidFill>
+          <a:ln>
+            <a:noFill/>
+          </a:ln>
+          <a:effectLst/>
+        </c:spPr>
+        <c:marker>
+          <c:symbol val="none"/>
+        </c:marker>
+      </c:pivotFmt>
+      <c:pivotFmt>
+        <c:idx val="7"/>
+        <c:spPr>
+          <a:solidFill>
+            <a:schemeClr val="accent1"/>
+          </a:solidFill>
+          <a:ln>
+            <a:noFill/>
+          </a:ln>
+          <a:effectLst/>
+        </c:spPr>
+        <c:marker>
+          <c:symbol val="none"/>
+        </c:marker>
+      </c:pivotFmt>
+      <c:pivotFmt>
+        <c:idx val="8"/>
+        <c:spPr>
+          <a:solidFill>
+            <a:schemeClr val="accent1"/>
+          </a:solidFill>
+          <a:ln>
+            <a:noFill/>
+          </a:ln>
+          <a:effectLst/>
+        </c:spPr>
+        <c:marker>
+          <c:symbol val="none"/>
+        </c:marker>
+      </c:pivotFmt>
+      <c:pivotFmt>
+        <c:idx val="9"/>
+        <c:spPr>
+          <a:solidFill>
+            <a:schemeClr val="accent1"/>
+          </a:solidFill>
+          <a:ln w="28575" cap="rnd">
+            <a:solidFill>
+              <a:schemeClr val="accent1"/>
+            </a:solidFill>
+            <a:round/>
+          </a:ln>
+          <a:effectLst/>
+        </c:spPr>
+        <c:marker>
+          <c:symbol val="none"/>
+        </c:marker>
+      </c:pivotFmt>
+      <c:pivotFmt>
+        <c:idx val="10"/>
+        <c:spPr>
+          <a:solidFill>
+            <a:schemeClr val="accent1"/>
+          </a:solidFill>
+          <a:ln w="28575" cap="rnd">
+            <a:solidFill>
+              <a:schemeClr val="accent1"/>
+            </a:solidFill>
+            <a:round/>
+          </a:ln>
+          <a:effectLst/>
+        </c:spPr>
+        <c:marker>
+          <c:symbol val="none"/>
+        </c:marker>
+      </c:pivotFmt>
+      <c:pivotFmt>
+        <c:idx val="11"/>
+        <c:spPr>
+          <a:solidFill>
+            <a:schemeClr val="accent1"/>
+          </a:solidFill>
+          <a:ln w="28575" cap="rnd">
+            <a:solidFill>
+              <a:schemeClr val="accent1"/>
+            </a:solidFill>
+            <a:round/>
+          </a:ln>
+          <a:effectLst/>
+        </c:spPr>
+        <c:marker>
+          <c:symbol val="none"/>
+        </c:marker>
+      </c:pivotFmt>
+      <c:pivotFmt>
+        <c:idx val="12"/>
+        <c:spPr>
+          <a:solidFill>
+            <a:schemeClr val="accent1"/>
+          </a:solidFill>
+          <a:ln>
+            <a:noFill/>
+          </a:ln>
+          <a:effectLst/>
+        </c:spPr>
+        <c:marker>
+          <c:symbol val="none"/>
+        </c:marker>
+      </c:pivotFmt>
+      <c:pivotFmt>
+        <c:idx val="13"/>
+        <c:spPr>
+          <a:solidFill>
+            <a:schemeClr val="accent1"/>
+          </a:solidFill>
+          <a:ln>
+            <a:noFill/>
+          </a:ln>
+          <a:effectLst/>
+        </c:spPr>
+        <c:marker>
+          <c:symbol val="none"/>
+        </c:marker>
+      </c:pivotFmt>
+      <c:pivotFmt>
+        <c:idx val="14"/>
+        <c:spPr>
+          <a:solidFill>
+            <a:schemeClr val="accent1"/>
+          </a:solidFill>
+          <a:ln>
+            <a:noFill/>
+          </a:ln>
+          <a:effectLst/>
+        </c:spPr>
+        <c:marker>
+          <c:symbol val="none"/>
+        </c:marker>
+      </c:pivotFmt>
+      <c:pivotFmt>
+        <c:idx val="15"/>
+        <c:spPr>
+          <a:solidFill>
+            <a:schemeClr val="accent1"/>
+          </a:solidFill>
+          <a:ln w="28575" cap="rnd">
+            <a:solidFill>
+              <a:schemeClr val="accent1"/>
+            </a:solidFill>
+            <a:round/>
+          </a:ln>
+          <a:effectLst/>
+        </c:spPr>
+        <c:marker>
+          <c:symbol val="none"/>
+        </c:marker>
+      </c:pivotFmt>
+      <c:pivotFmt>
+        <c:idx val="16"/>
+        <c:spPr>
+          <a:solidFill>
+            <a:schemeClr val="accent1"/>
+          </a:solidFill>
+          <a:ln w="28575" cap="rnd">
+            <a:solidFill>
+              <a:schemeClr val="accent1"/>
+            </a:solidFill>
+            <a:round/>
+          </a:ln>
+          <a:effectLst/>
+        </c:spPr>
+        <c:marker>
+          <c:symbol val="none"/>
+        </c:marker>
+      </c:pivotFmt>
+      <c:pivotFmt>
+        <c:idx val="17"/>
+        <c:spPr>
+          <a:solidFill>
+            <a:schemeClr val="accent1"/>
+          </a:solidFill>
+          <a:ln w="28575" cap="rnd">
+            <a:solidFill>
+              <a:schemeClr val="accent1"/>
+            </a:solidFill>
+            <a:round/>
+          </a:ln>
+          <a:effectLst/>
+        </c:spPr>
+        <c:marker>
+          <c:symbol val="none"/>
+        </c:marker>
+      </c:pivotFmt>
+      <c:pivotFmt>
+        <c:idx val="18"/>
+        <c:spPr>
+          <a:solidFill>
+            <a:schemeClr val="accent1"/>
+          </a:solidFill>
+          <a:ln>
+            <a:noFill/>
+          </a:ln>
+          <a:effectLst/>
+        </c:spPr>
+        <c:marker>
+          <c:symbol val="none"/>
+        </c:marker>
+      </c:pivotFmt>
+      <c:pivotFmt>
+        <c:idx val="19"/>
+        <c:spPr>
+          <a:solidFill>
+            <a:schemeClr val="accent1"/>
+          </a:solidFill>
+          <a:ln>
+            <a:noFill/>
+          </a:ln>
+          <a:effectLst/>
+        </c:spPr>
+        <c:marker>
+          <c:symbol val="none"/>
+        </c:marker>
+      </c:pivotFmt>
+      <c:pivotFmt>
+        <c:idx val="20"/>
+        <c:spPr>
+          <a:solidFill>
+            <a:schemeClr val="accent1"/>
+          </a:solidFill>
+          <a:ln>
+            <a:noFill/>
+          </a:ln>
+          <a:effectLst/>
+        </c:spPr>
+        <c:marker>
+          <c:symbol val="none"/>
+        </c:marker>
+      </c:pivotFmt>
+      <c:pivotFmt>
+        <c:idx val="21"/>
+        <c:spPr>
+          <a:solidFill>
+            <a:schemeClr val="accent1"/>
+          </a:solidFill>
+          <a:ln w="28575" cap="rnd">
+            <a:solidFill>
+              <a:schemeClr val="accent1"/>
+            </a:solidFill>
+            <a:round/>
+          </a:ln>
+          <a:effectLst/>
+        </c:spPr>
+        <c:marker>
+          <c:symbol val="none"/>
+        </c:marker>
+      </c:pivotFmt>
+      <c:pivotFmt>
+        <c:idx val="22"/>
+        <c:spPr>
+          <a:solidFill>
+            <a:schemeClr val="accent1"/>
+          </a:solidFill>
+          <a:ln w="28575" cap="rnd">
+            <a:solidFill>
+              <a:schemeClr val="accent1"/>
+            </a:solidFill>
+            <a:round/>
+          </a:ln>
+          <a:effectLst/>
+        </c:spPr>
+        <c:marker>
+          <c:symbol val="none"/>
+        </c:marker>
+      </c:pivotFmt>
+      <c:pivotFmt>
+        <c:idx val="23"/>
+        <c:spPr>
+          <a:solidFill>
+            <a:schemeClr val="accent1"/>
+          </a:solidFill>
+          <a:ln w="28575" cap="rnd">
+            <a:solidFill>
+              <a:schemeClr val="accent1"/>
+            </a:solidFill>
+            <a:round/>
+          </a:ln>
+          <a:effectLst/>
+        </c:spPr>
+        <c:marker>
+          <c:symbol val="none"/>
+        </c:marker>
+      </c:pivotFmt>
+    </c:pivotFmts>
+    <c:plotArea>
+      <c:layout>
+        <c:manualLayout>
+          <c:layoutTarget val="inner"/>
+          <c:xMode val="edge"/>
+          <c:yMode val="edge"/>
+          <c:x val="4.8899662155761858E-2"/>
+          <c:y val="6.1273897440482089E-2"/>
+          <c:w val="0.71589040098311407"/>
+          <c:h val="0.85720973813555146"/>
+        </c:manualLayout>
+      </c:layout>
+      <c:barChart>
+        <c:barDir val="col"/>
+        <c:grouping val="clustered"/>
+        <c:varyColors val="0"/>
+        <c:ser>
+          <c:idx val="0"/>
+          <c:order val="0"/>
+          <c:tx>
+            <c:strRef>
+              <c:f>Sheet1!$B$59:$B$61</c:f>
+              <c:strCache>
+                <c:ptCount val="1"/>
+                <c:pt idx="0">
+                  <c:v>out_case1 - Sum of Power_per_L1Load</c:v>
+                </c:pt>
+              </c:strCache>
+            </c:strRef>
+          </c:tx>
+          <c:spPr>
+            <a:solidFill>
+              <a:schemeClr val="accent1"/>
+            </a:solidFill>
+            <a:ln>
+              <a:noFill/>
+            </a:ln>
+            <a:effectLst/>
+          </c:spPr>
+          <c:invertIfNegative val="0"/>
+          <c:cat>
+            <c:strRef>
+              <c:f>Sheet1!$A$62:$A$66</c:f>
+              <c:strCache>
+                <c:ptCount val="4"/>
+                <c:pt idx="0">
+                  <c:v>800</c:v>
+                </c:pt>
+                <c:pt idx="1">
+                  <c:v>1600</c:v>
+                </c:pt>
+                <c:pt idx="2">
+                  <c:v>3200</c:v>
+                </c:pt>
+                <c:pt idx="3">
+                  <c:v>6400</c:v>
+                </c:pt>
+              </c:strCache>
+            </c:strRef>
+          </c:cat>
+          <c:val>
+            <c:numRef>
+              <c:f>Sheet1!$B$62:$B$66</c:f>
+              <c:numCache>
+                <c:formatCode>General</c:formatCode>
+                <c:ptCount val="4"/>
+                <c:pt idx="0">
+                  <c:v>2.61058542272637E-10</c:v>
+                </c:pt>
+                <c:pt idx="1">
+                  <c:v>2.3911779503415692E-10</c:v>
+                </c:pt>
+                <c:pt idx="2">
+                  <c:v>2.3033266298944767E-10</c:v>
+                </c:pt>
+                <c:pt idx="3">
+                  <c:v>2.186233871165153E-10</c:v>
+                </c:pt>
+              </c:numCache>
+            </c:numRef>
+          </c:val>
+          <c:extLst>
+            <c:ext xmlns:c16="http://schemas.microsoft.com/office/drawing/2014/chart" uri="{C3380CC4-5D6E-409C-BE32-E72D297353CC}">
+              <c16:uniqueId val="{00000000-B366-174B-8BD9-4E7E26D9FF61}"/>
+            </c:ext>
+          </c:extLst>
+        </c:ser>
+        <c:ser>
+          <c:idx val="2"/>
+          <c:order val="2"/>
+          <c:tx>
+            <c:strRef>
+              <c:f>Sheet1!$D$59:$D$61</c:f>
+              <c:strCache>
+                <c:ptCount val="1"/>
+                <c:pt idx="0">
+                  <c:v>out_case2 - Sum of Power_per_L1Load</c:v>
+                </c:pt>
+              </c:strCache>
+            </c:strRef>
+          </c:tx>
+          <c:spPr>
+            <a:solidFill>
+              <a:schemeClr val="accent3"/>
+            </a:solidFill>
+            <a:ln>
+              <a:noFill/>
+            </a:ln>
+            <a:effectLst/>
+          </c:spPr>
+          <c:invertIfNegative val="0"/>
+          <c:cat>
+            <c:strRef>
+              <c:f>Sheet1!$A$62:$A$66</c:f>
+              <c:strCache>
+                <c:ptCount val="4"/>
+                <c:pt idx="0">
+                  <c:v>800</c:v>
+                </c:pt>
+                <c:pt idx="1">
+                  <c:v>1600</c:v>
+                </c:pt>
+                <c:pt idx="2">
+                  <c:v>3200</c:v>
+                </c:pt>
+                <c:pt idx="3">
+                  <c:v>6400</c:v>
+                </c:pt>
+              </c:strCache>
+            </c:strRef>
+          </c:cat>
+          <c:val>
+            <c:numRef>
+              <c:f>Sheet1!$D$62:$D$66</c:f>
+              <c:numCache>
+                <c:formatCode>General</c:formatCode>
+                <c:ptCount val="4"/>
+                <c:pt idx="0">
+                  <c:v>4.3939876795775502E-10</c:v>
+                </c:pt>
+                <c:pt idx="1">
+                  <c:v>3.8801839853367655E-10</c:v>
+                </c:pt>
+                <c:pt idx="2">
+                  <c:v>3.4772828302639479E-10</c:v>
+                </c:pt>
+                <c:pt idx="3">
+                  <c:v>3.4935348430342454E-10</c:v>
+                </c:pt>
+              </c:numCache>
+            </c:numRef>
+          </c:val>
+          <c:extLst>
+            <c:ext xmlns:c16="http://schemas.microsoft.com/office/drawing/2014/chart" uri="{C3380CC4-5D6E-409C-BE32-E72D297353CC}">
+              <c16:uniqueId val="{00000001-B366-174B-8BD9-4E7E26D9FF61}"/>
+            </c:ext>
+          </c:extLst>
+        </c:ser>
+        <c:ser>
+          <c:idx val="4"/>
+          <c:order val="4"/>
+          <c:tx>
+            <c:strRef>
+              <c:f>Sheet1!$F$59:$F$61</c:f>
+              <c:strCache>
+                <c:ptCount val="1"/>
+                <c:pt idx="0">
+                  <c:v>out_case3 - Sum of Power_per_L1Load</c:v>
+                </c:pt>
+              </c:strCache>
+            </c:strRef>
+          </c:tx>
+          <c:spPr>
+            <a:solidFill>
+              <a:schemeClr val="accent5"/>
+            </a:solidFill>
+            <a:ln>
+              <a:noFill/>
+            </a:ln>
+            <a:effectLst/>
+          </c:spPr>
+          <c:invertIfNegative val="0"/>
+          <c:cat>
+            <c:strRef>
+              <c:f>Sheet1!$A$62:$A$66</c:f>
+              <c:strCache>
+                <c:ptCount val="4"/>
+                <c:pt idx="0">
+                  <c:v>800</c:v>
+                </c:pt>
+                <c:pt idx="1">
+                  <c:v>1600</c:v>
+                </c:pt>
+                <c:pt idx="2">
+                  <c:v>3200</c:v>
+                </c:pt>
+                <c:pt idx="3">
+                  <c:v>6400</c:v>
+                </c:pt>
+              </c:strCache>
+            </c:strRef>
+          </c:cat>
+          <c:val>
+            <c:numRef>
+              <c:f>Sheet1!$F$62:$F$66</c:f>
+              <c:numCache>
+                <c:formatCode>General</c:formatCode>
+                <c:ptCount val="4"/>
+                <c:pt idx="0">
+                  <c:v>4.0419751256776795E-10</c:v>
+                </c:pt>
+                <c:pt idx="1">
+                  <c:v>4.1509077237475957E-10</c:v>
+                </c:pt>
+                <c:pt idx="2">
+                  <c:v>4.0425916206203883E-10</c:v>
+                </c:pt>
+                <c:pt idx="3">
+                  <c:v>4.1886744060415979E-10</c:v>
+                </c:pt>
+              </c:numCache>
+            </c:numRef>
+          </c:val>
+          <c:extLst>
+            <c:ext xmlns:c16="http://schemas.microsoft.com/office/drawing/2014/chart" uri="{C3380CC4-5D6E-409C-BE32-E72D297353CC}">
+              <c16:uniqueId val="{00000002-B366-174B-8BD9-4E7E26D9FF61}"/>
+            </c:ext>
+          </c:extLst>
+        </c:ser>
+        <c:dLbls>
+          <c:showLegendKey val="0"/>
+          <c:showVal val="0"/>
+          <c:showCatName val="0"/>
+          <c:showSerName val="0"/>
+          <c:showPercent val="0"/>
+          <c:showBubbleSize val="0"/>
+        </c:dLbls>
+        <c:gapWidth val="219"/>
+        <c:overlap val="-27"/>
+        <c:axId val="156071695"/>
+        <c:axId val="156328095"/>
+      </c:barChart>
+      <c:lineChart>
+        <c:grouping val="standard"/>
+        <c:varyColors val="0"/>
+        <c:ser>
+          <c:idx val="1"/>
+          <c:order val="1"/>
+          <c:tx>
+            <c:strRef>
+              <c:f>Sheet1!$C$59:$C$61</c:f>
+              <c:strCache>
+                <c:ptCount val="1"/>
+                <c:pt idx="0">
+                  <c:v>out_case1 - Sum of  L1-dcache-loads</c:v>
+                </c:pt>
+              </c:strCache>
+            </c:strRef>
+          </c:tx>
+          <c:spPr>
+            <a:ln w="28575" cap="rnd">
+              <a:solidFill>
+                <a:schemeClr val="accent2"/>
+              </a:solidFill>
+              <a:round/>
+            </a:ln>
+            <a:effectLst/>
+          </c:spPr>
+          <c:marker>
+            <c:symbol val="none"/>
+          </c:marker>
+          <c:cat>
+            <c:strRef>
+              <c:f>Sheet1!$A$62:$A$66</c:f>
+              <c:strCache>
+                <c:ptCount val="4"/>
+                <c:pt idx="0">
+                  <c:v>800</c:v>
+                </c:pt>
+                <c:pt idx="1">
+                  <c:v>1600</c:v>
+                </c:pt>
+                <c:pt idx="2">
+                  <c:v>3200</c:v>
+                </c:pt>
+                <c:pt idx="3">
+                  <c:v>6400</c:v>
+                </c:pt>
+              </c:strCache>
+            </c:strRef>
+          </c:cat>
+          <c:val>
+            <c:numRef>
+              <c:f>Sheet1!$C$62:$C$66</c:f>
+              <c:numCache>
+                <c:formatCode>General</c:formatCode>
+                <c:ptCount val="4"/>
+                <c:pt idx="0">
+                  <c:v>22983350584</c:v>
+                </c:pt>
+                <c:pt idx="1">
+                  <c:v>92004863113</c:v>
+                </c:pt>
+                <c:pt idx="2">
+                  <c:v>369031464738</c:v>
+                </c:pt>
+                <c:pt idx="3">
+                  <c:v>1472852489603</c:v>
+                </c:pt>
+              </c:numCache>
+            </c:numRef>
+          </c:val>
+          <c:smooth val="0"/>
+          <c:extLst>
+            <c:ext xmlns:c16="http://schemas.microsoft.com/office/drawing/2014/chart" uri="{C3380CC4-5D6E-409C-BE32-E72D297353CC}">
+              <c16:uniqueId val="{00000003-B366-174B-8BD9-4E7E26D9FF61}"/>
+            </c:ext>
+          </c:extLst>
+        </c:ser>
+        <c:ser>
+          <c:idx val="3"/>
+          <c:order val="3"/>
+          <c:tx>
+            <c:strRef>
+              <c:f>Sheet1!$E$59:$E$61</c:f>
+              <c:strCache>
+                <c:ptCount val="1"/>
+                <c:pt idx="0">
+                  <c:v>out_case2 - Sum of  L1-dcache-loads</c:v>
+                </c:pt>
+              </c:strCache>
+            </c:strRef>
+          </c:tx>
+          <c:spPr>
+            <a:ln w="28575" cap="rnd">
+              <a:solidFill>
+                <a:schemeClr val="accent4"/>
+              </a:solidFill>
+              <a:round/>
+            </a:ln>
+            <a:effectLst/>
+          </c:spPr>
+          <c:marker>
+            <c:symbol val="none"/>
+          </c:marker>
+          <c:cat>
+            <c:strRef>
+              <c:f>Sheet1!$A$62:$A$66</c:f>
+              <c:strCache>
+                <c:ptCount val="4"/>
+                <c:pt idx="0">
+                  <c:v>800</c:v>
+                </c:pt>
+                <c:pt idx="1">
+                  <c:v>1600</c:v>
+                </c:pt>
+                <c:pt idx="2">
+                  <c:v>3200</c:v>
+                </c:pt>
+                <c:pt idx="3">
+                  <c:v>6400</c:v>
+                </c:pt>
+              </c:strCache>
+            </c:strRef>
+          </c:cat>
+          <c:val>
+            <c:numRef>
+              <c:f>Sheet1!$E$62:$E$66</c:f>
+              <c:numCache>
+                <c:formatCode>General</c:formatCode>
+                <c:ptCount val="4"/>
+                <c:pt idx="0">
+                  <c:v>29585881773</c:v>
+                </c:pt>
+                <c:pt idx="1">
+                  <c:v>118551079469</c:v>
+                </c:pt>
+                <c:pt idx="2">
+                  <c:v>474508425268</c:v>
+                </c:pt>
+                <c:pt idx="3">
+                  <c:v>1894928860721</c:v>
+                </c:pt>
+              </c:numCache>
+            </c:numRef>
+          </c:val>
+          <c:smooth val="0"/>
+          <c:extLst>
+            <c:ext xmlns:c16="http://schemas.microsoft.com/office/drawing/2014/chart" uri="{C3380CC4-5D6E-409C-BE32-E72D297353CC}">
+              <c16:uniqueId val="{00000004-B366-174B-8BD9-4E7E26D9FF61}"/>
+            </c:ext>
+          </c:extLst>
+        </c:ser>
+        <c:ser>
+          <c:idx val="5"/>
+          <c:order val="5"/>
+          <c:tx>
+            <c:strRef>
+              <c:f>Sheet1!$G$59:$G$61</c:f>
+              <c:strCache>
+                <c:ptCount val="1"/>
+                <c:pt idx="0">
+                  <c:v>out_case3 - Sum of  L1-dcache-loads</c:v>
+                </c:pt>
+              </c:strCache>
+            </c:strRef>
+          </c:tx>
+          <c:spPr>
+            <a:ln w="28575" cap="rnd">
+              <a:solidFill>
+                <a:schemeClr val="accent6"/>
+              </a:solidFill>
+              <a:round/>
+            </a:ln>
+            <a:effectLst/>
+          </c:spPr>
+          <c:marker>
+            <c:symbol val="none"/>
+          </c:marker>
+          <c:cat>
+            <c:strRef>
+              <c:f>Sheet1!$A$62:$A$66</c:f>
+              <c:strCache>
+                <c:ptCount val="4"/>
+                <c:pt idx="0">
+                  <c:v>800</c:v>
+                </c:pt>
+                <c:pt idx="1">
+                  <c:v>1600</c:v>
+                </c:pt>
+                <c:pt idx="2">
+                  <c:v>3200</c:v>
+                </c:pt>
+                <c:pt idx="3">
+                  <c:v>6400</c:v>
+                </c:pt>
+              </c:strCache>
+            </c:strRef>
+          </c:cat>
+          <c:val>
+            <c:numRef>
+              <c:f>Sheet1!$G$62:$G$66</c:f>
+              <c:numCache>
+                <c:formatCode>General</c:formatCode>
+                <c:ptCount val="4"/>
+                <c:pt idx="0">
+                  <c:v>49480759723</c:v>
+                </c:pt>
+                <c:pt idx="1">
+                  <c:v>197547152231</c:v>
+                </c:pt>
+                <c:pt idx="2">
+                  <c:v>791571422569</c:v>
+                </c:pt>
+                <c:pt idx="3">
+                  <c:v>3163291942885</c:v>
+                </c:pt>
+              </c:numCache>
+            </c:numRef>
+          </c:val>
+          <c:smooth val="0"/>
+          <c:extLst>
+            <c:ext xmlns:c16="http://schemas.microsoft.com/office/drawing/2014/chart" uri="{C3380CC4-5D6E-409C-BE32-E72D297353CC}">
+              <c16:uniqueId val="{00000005-B366-174B-8BD9-4E7E26D9FF61}"/>
+            </c:ext>
+          </c:extLst>
+        </c:ser>
+        <c:dLbls>
+          <c:showLegendKey val="0"/>
+          <c:showVal val="0"/>
+          <c:showCatName val="0"/>
+          <c:showSerName val="0"/>
+          <c:showPercent val="0"/>
+          <c:showBubbleSize val="0"/>
+        </c:dLbls>
+        <c:marker val="1"/>
+        <c:smooth val="0"/>
+        <c:axId val="213019919"/>
+        <c:axId val="212913791"/>
+      </c:lineChart>
+      <c:catAx>
+        <c:axId val="156071695"/>
+        <c:scaling>
+          <c:orientation val="minMax"/>
+        </c:scaling>
+        <c:delete val="0"/>
+        <c:axPos val="b"/>
+        <c:numFmt formatCode="General" sourceLinked="1"/>
+        <c:majorTickMark val="none"/>
+        <c:minorTickMark val="none"/>
+        <c:tickLblPos val="nextTo"/>
+        <c:spPr>
+          <a:noFill/>
+          <a:ln w="9525" cap="flat" cmpd="sng" algn="ctr">
+            <a:solidFill>
+              <a:schemeClr val="tx1">
+                <a:lumMod val="15000"/>
+                <a:lumOff val="85000"/>
+              </a:schemeClr>
+            </a:solidFill>
+            <a:round/>
+          </a:ln>
+          <a:effectLst/>
+        </c:spPr>
+        <c:txPr>
+          <a:bodyPr rot="-60000000" spcFirstLastPara="1" vertOverflow="ellipsis" vert="horz" wrap="square" anchor="ctr" anchorCtr="1"/>
+          <a:lstStyle/>
+          <a:p>
+            <a:pPr>
+              <a:defRPr sz="900" b="0" i="0" u="none" strike="noStrike" kern="1200" baseline="0">
+                <a:solidFill>
+                  <a:schemeClr val="tx1">
+                    <a:lumMod val="65000"/>
+                    <a:lumOff val="35000"/>
+                  </a:schemeClr>
+                </a:solidFill>
+                <a:latin typeface="+mn-lt"/>
+                <a:ea typeface="+mn-ea"/>
+                <a:cs typeface="+mn-cs"/>
+              </a:defRPr>
+            </a:pPr>
+            <a:endParaRPr lang="en-US"/>
+          </a:p>
+        </c:txPr>
+        <c:crossAx val="156328095"/>
+        <c:crosses val="autoZero"/>
+        <c:auto val="1"/>
+        <c:lblAlgn val="ctr"/>
+        <c:lblOffset val="100"/>
+        <c:noMultiLvlLbl val="0"/>
+      </c:catAx>
+      <c:valAx>
+        <c:axId val="156328095"/>
+        <c:scaling>
+          <c:orientation val="minMax"/>
+        </c:scaling>
+        <c:delete val="0"/>
+        <c:axPos val="l"/>
+        <c:majorGridlines>
+          <c:spPr>
+            <a:ln w="9525" cap="flat" cmpd="sng" algn="ctr">
+              <a:solidFill>
+                <a:schemeClr val="tx1">
+                  <a:lumMod val="15000"/>
+                  <a:lumOff val="85000"/>
+                </a:schemeClr>
+              </a:solidFill>
+              <a:round/>
+            </a:ln>
+            <a:effectLst/>
+          </c:spPr>
+        </c:majorGridlines>
+        <c:numFmt formatCode="General" sourceLinked="1"/>
+        <c:majorTickMark val="none"/>
+        <c:minorTickMark val="none"/>
+        <c:tickLblPos val="nextTo"/>
+        <c:spPr>
+          <a:noFill/>
+          <a:ln>
+            <a:noFill/>
+          </a:ln>
+          <a:effectLst/>
+        </c:spPr>
+        <c:txPr>
+          <a:bodyPr rot="-60000000" spcFirstLastPara="1" vertOverflow="ellipsis" vert="horz" wrap="square" anchor="ctr" anchorCtr="1"/>
+          <a:lstStyle/>
+          <a:p>
+            <a:pPr>
+              <a:defRPr sz="900" b="0" i="0" u="none" strike="noStrike" kern="1200" baseline="0">
+                <a:solidFill>
+                  <a:schemeClr val="tx1">
+                    <a:lumMod val="65000"/>
+                    <a:lumOff val="35000"/>
+                  </a:schemeClr>
+                </a:solidFill>
+                <a:latin typeface="+mn-lt"/>
+                <a:ea typeface="+mn-ea"/>
+                <a:cs typeface="+mn-cs"/>
+              </a:defRPr>
+            </a:pPr>
+            <a:endParaRPr lang="en-US"/>
+          </a:p>
+        </c:txPr>
+        <c:crossAx val="156071695"/>
+        <c:crosses val="autoZero"/>
+        <c:crossBetween val="between"/>
+      </c:valAx>
+      <c:valAx>
+        <c:axId val="212913791"/>
+        <c:scaling>
+          <c:orientation val="minMax"/>
+        </c:scaling>
+        <c:delete val="0"/>
+        <c:axPos val="r"/>
+        <c:numFmt formatCode="General" sourceLinked="1"/>
+        <c:majorTickMark val="out"/>
+        <c:minorTickMark val="none"/>
+        <c:tickLblPos val="nextTo"/>
+        <c:spPr>
+          <a:noFill/>
+          <a:ln>
+            <a:noFill/>
+          </a:ln>
+          <a:effectLst/>
+        </c:spPr>
+        <c:txPr>
+          <a:bodyPr rot="-60000000" spcFirstLastPara="1" vertOverflow="ellipsis" vert="horz" wrap="square" anchor="ctr" anchorCtr="1"/>
+          <a:lstStyle/>
+          <a:p>
+            <a:pPr>
+              <a:defRPr sz="900" b="0" i="0" u="none" strike="noStrike" kern="1200" baseline="0">
+                <a:solidFill>
+                  <a:schemeClr val="tx1">
+                    <a:lumMod val="65000"/>
+                    <a:lumOff val="35000"/>
+                  </a:schemeClr>
+                </a:solidFill>
+                <a:latin typeface="+mn-lt"/>
+                <a:ea typeface="+mn-ea"/>
+                <a:cs typeface="+mn-cs"/>
+              </a:defRPr>
+            </a:pPr>
+            <a:endParaRPr lang="en-US"/>
+          </a:p>
+        </c:txPr>
+        <c:crossAx val="213019919"/>
+        <c:crosses val="max"/>
+        <c:crossBetween val="between"/>
+      </c:valAx>
+      <c:catAx>
+        <c:axId val="213019919"/>
+        <c:scaling>
+          <c:orientation val="minMax"/>
+        </c:scaling>
+        <c:delete val="1"/>
+        <c:axPos val="b"/>
+        <c:numFmt formatCode="General" sourceLinked="1"/>
+        <c:majorTickMark val="out"/>
+        <c:minorTickMark val="none"/>
+        <c:tickLblPos val="nextTo"/>
+        <c:crossAx val="212913791"/>
+        <c:crosses val="autoZero"/>
+        <c:auto val="1"/>
+        <c:lblAlgn val="ctr"/>
+        <c:lblOffset val="100"/>
+        <c:noMultiLvlLbl val="0"/>
+      </c:catAx>
+      <c:spPr>
+        <a:noFill/>
+        <a:ln>
+          <a:noFill/>
+        </a:ln>
+        <a:effectLst/>
+      </c:spPr>
+    </c:plotArea>
+    <c:legend>
+      <c:legendPos val="r"/>
+      <c:overlay val="0"/>
+      <c:spPr>
+        <a:noFill/>
+        <a:ln>
+          <a:noFill/>
+        </a:ln>
+        <a:effectLst/>
+      </c:spPr>
+      <c:txPr>
+        <a:bodyPr rot="0" spcFirstLastPara="1" vertOverflow="ellipsis" vert="horz" wrap="square" anchor="ctr" anchorCtr="1"/>
+        <a:lstStyle/>
+        <a:p>
+          <a:pPr>
+            <a:defRPr sz="900" b="0" i="0" u="none" strike="noStrike" kern="1200" baseline="0">
+              <a:solidFill>
+                <a:schemeClr val="tx1">
+                  <a:lumMod val="65000"/>
+                  <a:lumOff val="35000"/>
+                </a:schemeClr>
+              </a:solidFill>
+              <a:latin typeface="+mn-lt"/>
+              <a:ea typeface="+mn-ea"/>
+              <a:cs typeface="+mn-cs"/>
+            </a:defRPr>
+          </a:pPr>
+          <a:endParaRPr lang="en-US"/>
+        </a:p>
+      </c:txPr>
+    </c:legend>
+    <c:plotVisOnly val="1"/>
+    <c:dispBlanksAs val="gap"/>
+    <c:extLst>
+      <c:ext xmlns:c16r3="http://schemas.microsoft.com/office/drawing/2017/03/chart" uri="{56B9EC1D-385E-4148-901F-78D8002777C0}">
+        <c16r3:dataDisplayOptions16>
+          <c16r3:dispNaAsBlank val="1"/>
+        </c16r3:dataDisplayOptions16>
+      </c:ext>
+    </c:extLst>
+    <c:showDLblsOverMax val="0"/>
+  </c:chart>
+  <c:spPr>
+    <a:noFill/>
+    <a:ln>
+      <a:noFill/>
+    </a:ln>
+    <a:effectLst/>
+  </c:spPr>
+  <c:txPr>
+    <a:bodyPr/>
+    <a:lstStyle/>
+    <a:p>
+      <a:pPr>
+        <a:defRPr/>
+      </a:pPr>
+      <a:endParaRPr lang="en-US"/>
+    </a:p>
+  </c:txPr>
+  <c:externalData r:id="rId3">
+    <c:autoUpdate val="0"/>
+  </c:externalData>
+  <c:extLst>
+    <c:ext xmlns:c14="http://schemas.microsoft.com/office/drawing/2007/8/2/chart" uri="{781A3756-C4B2-4CAC-9D66-4F8BD8637D16}">
+      <c14:pivotOptions>
+        <c14:dropZoneFilter val="1"/>
+        <c14:dropZoneCategories val="1"/>
+        <c14:dropZoneData val="1"/>
+        <c14:dropZoneSeries val="1"/>
+        <c14:dropZonesVisible val="1"/>
+      </c14:pivotOptions>
+    </c:ext>
+    <c:ext xmlns:c16="http://schemas.microsoft.com/office/drawing/2014/chart" uri="{E28EC0CA-F0BB-4C9C-879D-F8772B89E7AC}">
+      <c16:pivotOptions16>
+        <c16:showExpandCollapseFieldButtons val="1"/>
+      </c16:pivotOptions16>
+    </c:ext>
+  </c:extLst>
+</c:chartSpace>
+</file>
+
+<file path=ppt/charts/chart2.xml><?xml version="1.0" encoding="utf-8"?>
+<c:chartSpace xmlns:c="http://schemas.openxmlformats.org/drawingml/2006/chart" xmlns:a="http://schemas.openxmlformats.org/drawingml/2006/main" xmlns:r="http://schemas.openxmlformats.org/officeDocument/2006/relationships" xmlns:c16r2="http://schemas.microsoft.com/office/drawing/2015/06/chart">
+  <c:date1904 val="0"/>
+  <c:lang val="en-US"/>
+  <c:roundedCorners val="0"/>
+  <mc:AlternateContent xmlns:mc="http://schemas.openxmlformats.org/markup-compatibility/2006">
+    <mc:Choice xmlns:c14="http://schemas.microsoft.com/office/drawing/2007/8/2/chart" Requires="c14">
+      <c14:style val="102"/>
+    </mc:Choice>
+    <mc:Fallback>
+      <c:style val="2"/>
+    </mc:Fallback>
+  </mc:AlternateContent>
+  <c:pivotSource>
+    <c:name>[simple_data_move_data.csv]Sheet1!PivotTable5</c:name>
+    <c:fmtId val="6"/>
+  </c:pivotSource>
+  <c:chart>
+    <c:autoTitleDeleted val="0"/>
+    <c:pivotFmts>
+      <c:pivotFmt>
+        <c:idx val="0"/>
+        <c:spPr>
+          <a:solidFill>
+            <a:schemeClr val="accent1"/>
+          </a:solidFill>
+          <a:ln>
+            <a:noFill/>
+          </a:ln>
+          <a:effectLst/>
+        </c:spPr>
+        <c:marker>
+          <c:symbol val="none"/>
+        </c:marker>
+      </c:pivotFmt>
+      <c:pivotFmt>
+        <c:idx val="1"/>
+        <c:spPr>
+          <a:solidFill>
+            <a:schemeClr val="accent1"/>
+          </a:solidFill>
+          <a:ln>
+            <a:noFill/>
+          </a:ln>
+          <a:effectLst/>
+        </c:spPr>
+        <c:marker>
+          <c:symbol val="none"/>
+        </c:marker>
+      </c:pivotFmt>
+      <c:pivotFmt>
+        <c:idx val="2"/>
+        <c:spPr>
+          <a:solidFill>
+            <a:schemeClr val="accent1"/>
+          </a:solidFill>
+          <a:ln>
+            <a:noFill/>
+          </a:ln>
+          <a:effectLst/>
+        </c:spPr>
+        <c:marker>
+          <c:symbol val="none"/>
+        </c:marker>
+      </c:pivotFmt>
+      <c:pivotFmt>
+        <c:idx val="3"/>
+        <c:spPr>
+          <a:solidFill>
+            <a:schemeClr val="accent1"/>
+          </a:solidFill>
+          <a:ln>
+            <a:noFill/>
+          </a:ln>
+          <a:effectLst/>
+        </c:spPr>
+        <c:marker>
+          <c:symbol val="none"/>
+        </c:marker>
+      </c:pivotFmt>
+      <c:pivotFmt>
+        <c:idx val="4"/>
+        <c:spPr>
+          <a:solidFill>
+            <a:schemeClr val="accent1"/>
+          </a:solidFill>
+          <a:ln>
+            <a:noFill/>
+          </a:ln>
+          <a:effectLst/>
+        </c:spPr>
+        <c:marker>
+          <c:symbol val="none"/>
+        </c:marker>
+      </c:pivotFmt>
+      <c:pivotFmt>
+        <c:idx val="5"/>
+        <c:spPr>
+          <a:solidFill>
+            <a:schemeClr val="accent1"/>
+          </a:solidFill>
+          <a:ln>
+            <a:noFill/>
+          </a:ln>
+          <a:effectLst/>
+        </c:spPr>
+        <c:marker>
+          <c:symbol val="none"/>
+        </c:marker>
+      </c:pivotFmt>
+      <c:pivotFmt>
+        <c:idx val="6"/>
+        <c:spPr>
+          <a:solidFill>
+            <a:schemeClr val="accent1"/>
+          </a:solidFill>
+          <a:ln>
+            <a:noFill/>
+          </a:ln>
+          <a:effectLst/>
+        </c:spPr>
+        <c:marker>
+          <c:symbol val="none"/>
+        </c:marker>
+      </c:pivotFmt>
+      <c:pivotFmt>
+        <c:idx val="7"/>
+        <c:spPr>
+          <a:solidFill>
+            <a:schemeClr val="accent1"/>
+          </a:solidFill>
+          <a:ln>
+            <a:noFill/>
+          </a:ln>
+          <a:effectLst/>
+        </c:spPr>
+        <c:marker>
+          <c:symbol val="none"/>
+        </c:marker>
+      </c:pivotFmt>
+      <c:pivotFmt>
+        <c:idx val="8"/>
+        <c:spPr>
+          <a:solidFill>
+            <a:schemeClr val="accent1"/>
+          </a:solidFill>
+          <a:ln>
+            <a:noFill/>
+          </a:ln>
+          <a:effectLst/>
+        </c:spPr>
+        <c:marker>
+          <c:symbol val="none"/>
+        </c:marker>
+      </c:pivotFmt>
+      <c:pivotFmt>
+        <c:idx val="9"/>
+        <c:spPr>
+          <a:solidFill>
+            <a:schemeClr val="accent1"/>
+          </a:solidFill>
+          <a:ln w="28575" cap="rnd">
+            <a:solidFill>
+              <a:schemeClr val="accent1"/>
+            </a:solidFill>
+            <a:round/>
+          </a:ln>
+          <a:effectLst/>
+        </c:spPr>
+        <c:marker>
+          <c:symbol val="none"/>
+        </c:marker>
+      </c:pivotFmt>
+      <c:pivotFmt>
+        <c:idx val="10"/>
+        <c:spPr>
+          <a:solidFill>
+            <a:schemeClr val="accent1"/>
+          </a:solidFill>
+          <a:ln w="28575" cap="rnd">
+            <a:solidFill>
+              <a:schemeClr val="accent1"/>
+            </a:solidFill>
+            <a:round/>
+          </a:ln>
+          <a:effectLst/>
+        </c:spPr>
+        <c:marker>
+          <c:symbol val="none"/>
+        </c:marker>
+      </c:pivotFmt>
+      <c:pivotFmt>
+        <c:idx val="11"/>
+        <c:spPr>
+          <a:solidFill>
+            <a:schemeClr val="accent1"/>
+          </a:solidFill>
+          <a:ln w="28575" cap="rnd">
+            <a:solidFill>
+              <a:schemeClr val="accent1"/>
+            </a:solidFill>
+            <a:round/>
+          </a:ln>
+          <a:effectLst/>
+        </c:spPr>
+        <c:marker>
+          <c:symbol val="none"/>
+        </c:marker>
+      </c:pivotFmt>
+      <c:pivotFmt>
+        <c:idx val="12"/>
+        <c:spPr>
+          <a:solidFill>
+            <a:schemeClr val="accent1"/>
+          </a:solidFill>
+          <a:ln>
+            <a:noFill/>
+          </a:ln>
+          <a:effectLst/>
+        </c:spPr>
+        <c:marker>
+          <c:symbol val="none"/>
+        </c:marker>
+      </c:pivotFmt>
+      <c:pivotFmt>
+        <c:idx val="13"/>
+        <c:spPr>
+          <a:solidFill>
+            <a:schemeClr val="accent1"/>
+          </a:solidFill>
+          <a:ln>
+            <a:noFill/>
+          </a:ln>
+          <a:effectLst/>
+        </c:spPr>
+        <c:marker>
+          <c:symbol val="none"/>
+        </c:marker>
+      </c:pivotFmt>
+      <c:pivotFmt>
+        <c:idx val="14"/>
+        <c:spPr>
+          <a:solidFill>
+            <a:schemeClr val="accent1"/>
+          </a:solidFill>
+          <a:ln>
+            <a:noFill/>
+          </a:ln>
+          <a:effectLst/>
+        </c:spPr>
+        <c:marker>
+          <c:symbol val="none"/>
+        </c:marker>
+      </c:pivotFmt>
+      <c:pivotFmt>
+        <c:idx val="15"/>
+        <c:spPr>
+          <a:solidFill>
+            <a:schemeClr val="accent1"/>
+          </a:solidFill>
+          <a:ln w="28575" cap="rnd">
+            <a:solidFill>
+              <a:schemeClr val="accent1"/>
+            </a:solidFill>
+            <a:round/>
+          </a:ln>
+          <a:effectLst/>
+        </c:spPr>
+        <c:marker>
+          <c:symbol val="none"/>
+        </c:marker>
+      </c:pivotFmt>
+      <c:pivotFmt>
+        <c:idx val="16"/>
+        <c:spPr>
+          <a:solidFill>
+            <a:schemeClr val="accent1"/>
+          </a:solidFill>
+          <a:ln w="28575" cap="rnd">
+            <a:solidFill>
+              <a:schemeClr val="accent1"/>
+            </a:solidFill>
+            <a:round/>
+          </a:ln>
+          <a:effectLst/>
+        </c:spPr>
+        <c:marker>
+          <c:symbol val="none"/>
+        </c:marker>
+      </c:pivotFmt>
+      <c:pivotFmt>
+        <c:idx val="17"/>
+        <c:spPr>
+          <a:solidFill>
+            <a:schemeClr val="accent1"/>
+          </a:solidFill>
+          <a:ln w="28575" cap="rnd">
+            <a:solidFill>
+              <a:schemeClr val="accent1"/>
+            </a:solidFill>
+            <a:round/>
+          </a:ln>
+          <a:effectLst/>
+        </c:spPr>
+        <c:marker>
+          <c:symbol val="none"/>
+        </c:marker>
+      </c:pivotFmt>
+      <c:pivotFmt>
+        <c:idx val="18"/>
+        <c:spPr>
+          <a:solidFill>
+            <a:schemeClr val="accent1"/>
+          </a:solidFill>
+          <a:ln>
+            <a:noFill/>
+          </a:ln>
+          <a:effectLst/>
+        </c:spPr>
+        <c:marker>
+          <c:symbol val="none"/>
+        </c:marker>
+      </c:pivotFmt>
+      <c:pivotFmt>
+        <c:idx val="19"/>
+        <c:spPr>
+          <a:solidFill>
+            <a:schemeClr val="accent1"/>
+          </a:solidFill>
+          <a:ln>
+            <a:noFill/>
+          </a:ln>
+          <a:effectLst/>
+        </c:spPr>
+        <c:marker>
+          <c:symbol val="none"/>
+        </c:marker>
+      </c:pivotFmt>
+      <c:pivotFmt>
+        <c:idx val="20"/>
+        <c:spPr>
+          <a:solidFill>
+            <a:schemeClr val="accent1"/>
+          </a:solidFill>
+          <a:ln>
+            <a:noFill/>
+          </a:ln>
+          <a:effectLst/>
+        </c:spPr>
+        <c:marker>
+          <c:symbol val="none"/>
+        </c:marker>
+      </c:pivotFmt>
+      <c:pivotFmt>
+        <c:idx val="21"/>
+        <c:spPr>
+          <a:solidFill>
+            <a:schemeClr val="accent1"/>
+          </a:solidFill>
+          <a:ln w="28575" cap="rnd">
+            <a:solidFill>
+              <a:schemeClr val="accent1"/>
+            </a:solidFill>
+            <a:round/>
+          </a:ln>
+          <a:effectLst/>
+        </c:spPr>
+        <c:marker>
+          <c:symbol val="none"/>
+        </c:marker>
+      </c:pivotFmt>
+      <c:pivotFmt>
+        <c:idx val="22"/>
+        <c:spPr>
+          <a:solidFill>
+            <a:schemeClr val="accent1"/>
+          </a:solidFill>
+          <a:ln w="28575" cap="rnd">
+            <a:solidFill>
+              <a:schemeClr val="accent1"/>
+            </a:solidFill>
+            <a:round/>
+          </a:ln>
+          <a:effectLst/>
+        </c:spPr>
+        <c:marker>
+          <c:symbol val="none"/>
+        </c:marker>
+      </c:pivotFmt>
+      <c:pivotFmt>
+        <c:idx val="23"/>
+        <c:spPr>
+          <a:solidFill>
+            <a:schemeClr val="accent1"/>
+          </a:solidFill>
+          <a:ln w="28575" cap="rnd">
+            <a:solidFill>
+              <a:schemeClr val="accent1"/>
+            </a:solidFill>
+            <a:round/>
+          </a:ln>
+          <a:effectLst/>
+        </c:spPr>
+        <c:marker>
+          <c:symbol val="none"/>
+        </c:marker>
+      </c:pivotFmt>
+    </c:pivotFmts>
+    <c:plotArea>
+      <c:layout/>
+      <c:barChart>
+        <c:barDir val="col"/>
+        <c:grouping val="clustered"/>
+        <c:varyColors val="0"/>
+        <c:ser>
+          <c:idx val="0"/>
+          <c:order val="0"/>
+          <c:tx>
+            <c:strRef>
+              <c:f>Sheet1!$B$76:$B$78</c:f>
+              <c:strCache>
+                <c:ptCount val="1"/>
+                <c:pt idx="0">
+                  <c:v>out_case1 - Sum of Power_per_LLCLoad</c:v>
+                </c:pt>
+              </c:strCache>
+            </c:strRef>
+          </c:tx>
+          <c:spPr>
+            <a:solidFill>
+              <a:schemeClr val="accent1"/>
+            </a:solidFill>
+            <a:ln>
+              <a:noFill/>
+            </a:ln>
+            <a:effectLst/>
+          </c:spPr>
+          <c:invertIfNegative val="0"/>
+          <c:cat>
+            <c:strRef>
+              <c:f>Sheet1!$A$79:$A$83</c:f>
+              <c:strCache>
+                <c:ptCount val="4"/>
+                <c:pt idx="0">
+                  <c:v>800</c:v>
+                </c:pt>
+                <c:pt idx="1">
+                  <c:v>1600</c:v>
+                </c:pt>
+                <c:pt idx="2">
+                  <c:v>3200</c:v>
+                </c:pt>
+                <c:pt idx="3">
+                  <c:v>6400</c:v>
+                </c:pt>
+              </c:strCache>
+            </c:strRef>
+          </c:cat>
+          <c:val>
+            <c:numRef>
+              <c:f>Sheet1!$B$79:$B$83</c:f>
+              <c:numCache>
+                <c:formatCode>General</c:formatCode>
+                <c:ptCount val="4"/>
+                <c:pt idx="0">
+                  <c:v>9.7153027676954517E-7</c:v>
+                </c:pt>
+                <c:pt idx="1">
+                  <c:v>1.7570163051911766E-6</c:v>
+                </c:pt>
+                <c:pt idx="2">
+                  <c:v>1.1609596213599853E-6</c:v>
+                </c:pt>
+                <c:pt idx="3">
+                  <c:v>2.1022527649226619E-6</c:v>
+                </c:pt>
+              </c:numCache>
+            </c:numRef>
+          </c:val>
+          <c:extLst>
+            <c:ext xmlns:c16="http://schemas.microsoft.com/office/drawing/2014/chart" uri="{C3380CC4-5D6E-409C-BE32-E72D297353CC}">
+              <c16:uniqueId val="{00000000-12E3-5847-94B7-1E4FD1201F13}"/>
+            </c:ext>
+          </c:extLst>
+        </c:ser>
+        <c:ser>
+          <c:idx val="2"/>
+          <c:order val="2"/>
+          <c:tx>
+            <c:strRef>
+              <c:f>Sheet1!$D$76:$D$78</c:f>
+              <c:strCache>
+                <c:ptCount val="1"/>
+                <c:pt idx="0">
+                  <c:v>out_case2 - Sum of Power_per_LLCLoad</c:v>
+                </c:pt>
+              </c:strCache>
+            </c:strRef>
+          </c:tx>
+          <c:spPr>
+            <a:solidFill>
+              <a:schemeClr val="accent3"/>
+            </a:solidFill>
+            <a:ln>
+              <a:noFill/>
+            </a:ln>
+            <a:effectLst/>
+          </c:spPr>
+          <c:invertIfNegative val="0"/>
+          <c:cat>
+            <c:strRef>
+              <c:f>Sheet1!$A$79:$A$83</c:f>
+              <c:strCache>
+                <c:ptCount val="4"/>
+                <c:pt idx="0">
+                  <c:v>800</c:v>
+                </c:pt>
+                <c:pt idx="1">
+                  <c:v>1600</c:v>
+                </c:pt>
+                <c:pt idx="2">
+                  <c:v>3200</c:v>
+                </c:pt>
+                <c:pt idx="3">
+                  <c:v>6400</c:v>
+                </c:pt>
+              </c:strCache>
+            </c:strRef>
+          </c:cat>
+          <c:val>
+            <c:numRef>
+              <c:f>Sheet1!$D$79:$D$83</c:f>
+              <c:numCache>
+                <c:formatCode>General</c:formatCode>
+                <c:ptCount val="4"/>
+                <c:pt idx="0">
+                  <c:v>1.5427809599942656E-6</c:v>
+                </c:pt>
+                <c:pt idx="1">
+                  <c:v>1.8875144774412066E-6</c:v>
+                </c:pt>
+                <c:pt idx="2">
+                  <c:v>1.6752953175049131E-6</c:v>
+                </c:pt>
+                <c:pt idx="3">
+                  <c:v>2.1506307634346119E-6</c:v>
+                </c:pt>
+              </c:numCache>
+            </c:numRef>
+          </c:val>
+          <c:extLst>
+            <c:ext xmlns:c16="http://schemas.microsoft.com/office/drawing/2014/chart" uri="{C3380CC4-5D6E-409C-BE32-E72D297353CC}">
+              <c16:uniqueId val="{00000001-12E3-5847-94B7-1E4FD1201F13}"/>
+            </c:ext>
+          </c:extLst>
+        </c:ser>
+        <c:ser>
+          <c:idx val="4"/>
+          <c:order val="4"/>
+          <c:tx>
+            <c:strRef>
+              <c:f>Sheet1!$F$76:$F$78</c:f>
+              <c:strCache>
+                <c:ptCount val="1"/>
+                <c:pt idx="0">
+                  <c:v>out_case3 - Sum of Power_per_LLCLoad</c:v>
+                </c:pt>
+              </c:strCache>
+            </c:strRef>
+          </c:tx>
+          <c:spPr>
+            <a:solidFill>
+              <a:schemeClr val="accent5"/>
+            </a:solidFill>
+            <a:ln>
+              <a:noFill/>
+            </a:ln>
+            <a:effectLst/>
+          </c:spPr>
+          <c:invertIfNegative val="0"/>
+          <c:cat>
+            <c:strRef>
+              <c:f>Sheet1!$A$79:$A$83</c:f>
+              <c:strCache>
+                <c:ptCount val="4"/>
+                <c:pt idx="0">
+                  <c:v>800</c:v>
+                </c:pt>
+                <c:pt idx="1">
+                  <c:v>1600</c:v>
+                </c:pt>
+                <c:pt idx="2">
+                  <c:v>3200</c:v>
+                </c:pt>
+                <c:pt idx="3">
+                  <c:v>6400</c:v>
+                </c:pt>
+              </c:strCache>
+            </c:strRef>
+          </c:cat>
+          <c:val>
+            <c:numRef>
+              <c:f>Sheet1!$F$79:$F$83</c:f>
+              <c:numCache>
+                <c:formatCode>General</c:formatCode>
+                <c:ptCount val="4"/>
+                <c:pt idx="0">
+                  <c:v>1.1695459132732585E-6</c:v>
+                </c:pt>
+                <c:pt idx="1">
+                  <c:v>1.8116898225297372E-6</c:v>
+                </c:pt>
+                <c:pt idx="2">
+                  <c:v>1.3901729646251722E-6</c:v>
+                </c:pt>
+                <c:pt idx="3">
+                  <c:v>1.8776405240976795E-6</c:v>
+                </c:pt>
+              </c:numCache>
+            </c:numRef>
+          </c:val>
+          <c:extLst>
+            <c:ext xmlns:c16="http://schemas.microsoft.com/office/drawing/2014/chart" uri="{C3380CC4-5D6E-409C-BE32-E72D297353CC}">
+              <c16:uniqueId val="{00000002-12E3-5847-94B7-1E4FD1201F13}"/>
+            </c:ext>
+          </c:extLst>
+        </c:ser>
+        <c:dLbls>
+          <c:showLegendKey val="0"/>
+          <c:showVal val="0"/>
+          <c:showCatName val="0"/>
+          <c:showSerName val="0"/>
+          <c:showPercent val="0"/>
+          <c:showBubbleSize val="0"/>
+        </c:dLbls>
+        <c:gapWidth val="219"/>
+        <c:overlap val="-27"/>
+        <c:axId val="156040063"/>
+        <c:axId val="156041759"/>
+      </c:barChart>
+      <c:lineChart>
+        <c:grouping val="standard"/>
+        <c:varyColors val="0"/>
+        <c:ser>
+          <c:idx val="1"/>
+          <c:order val="1"/>
+          <c:tx>
+            <c:strRef>
+              <c:f>Sheet1!$C$76:$C$78</c:f>
+              <c:strCache>
+                <c:ptCount val="1"/>
+                <c:pt idx="0">
+                  <c:v>out_case1 - Sum of  LLC-loads</c:v>
+                </c:pt>
+              </c:strCache>
+            </c:strRef>
+          </c:tx>
+          <c:spPr>
+            <a:ln w="28575" cap="rnd">
+              <a:solidFill>
+                <a:schemeClr val="accent2"/>
+              </a:solidFill>
+              <a:round/>
+            </a:ln>
+            <a:effectLst/>
+          </c:spPr>
+          <c:marker>
+            <c:symbol val="none"/>
+          </c:marker>
+          <c:cat>
+            <c:strRef>
+              <c:f>Sheet1!$A$79:$A$83</c:f>
+              <c:strCache>
+                <c:ptCount val="4"/>
+                <c:pt idx="0">
+                  <c:v>800</c:v>
+                </c:pt>
+                <c:pt idx="1">
+                  <c:v>1600</c:v>
+                </c:pt>
+                <c:pt idx="2">
+                  <c:v>3200</c:v>
+                </c:pt>
+                <c:pt idx="3">
+                  <c:v>6400</c:v>
+                </c:pt>
+              </c:strCache>
+            </c:strRef>
+          </c:cat>
+          <c:val>
+            <c:numRef>
+              <c:f>Sheet1!$C$79:$C$83</c:f>
+              <c:numCache>
+                <c:formatCode>General</c:formatCode>
+                <c:ptCount val="4"/>
+                <c:pt idx="0">
+                  <c:v>6175824</c:v>
+                </c:pt>
+                <c:pt idx="1">
+                  <c:v>12521227</c:v>
+                </c:pt>
+                <c:pt idx="2">
+                  <c:v>73215294</c:v>
+                </c:pt>
+                <c:pt idx="3">
+                  <c:v>153169022</c:v>
+                </c:pt>
+              </c:numCache>
+            </c:numRef>
+          </c:val>
+          <c:smooth val="0"/>
+          <c:extLst>
+            <c:ext xmlns:c16="http://schemas.microsoft.com/office/drawing/2014/chart" uri="{C3380CC4-5D6E-409C-BE32-E72D297353CC}">
+              <c16:uniqueId val="{00000003-12E3-5847-94B7-1E4FD1201F13}"/>
+            </c:ext>
+          </c:extLst>
+        </c:ser>
+        <c:ser>
+          <c:idx val="3"/>
+          <c:order val="3"/>
+          <c:tx>
+            <c:strRef>
+              <c:f>Sheet1!$E$76:$E$78</c:f>
+              <c:strCache>
+                <c:ptCount val="1"/>
+                <c:pt idx="0">
+                  <c:v>out_case2 - Sum of  LLC-loads</c:v>
+                </c:pt>
+              </c:strCache>
+            </c:strRef>
+          </c:tx>
+          <c:spPr>
+            <a:ln w="28575" cap="rnd">
+              <a:solidFill>
+                <a:schemeClr val="accent4"/>
+              </a:solidFill>
+              <a:round/>
+            </a:ln>
+            <a:effectLst/>
+          </c:spPr>
+          <c:marker>
+            <c:symbol val="none"/>
+          </c:marker>
+          <c:cat>
+            <c:strRef>
+              <c:f>Sheet1!$A$79:$A$83</c:f>
+              <c:strCache>
+                <c:ptCount val="4"/>
+                <c:pt idx="0">
+                  <c:v>800</c:v>
+                </c:pt>
+                <c:pt idx="1">
+                  <c:v>1600</c:v>
+                </c:pt>
+                <c:pt idx="2">
+                  <c:v>3200</c:v>
+                </c:pt>
+                <c:pt idx="3">
+                  <c:v>6400</c:v>
+                </c:pt>
+              </c:strCache>
+            </c:strRef>
+          </c:cat>
+          <c:val>
+            <c:numRef>
+              <c:f>Sheet1!$E$79:$E$83</c:f>
+              <c:numCache>
+                <c:formatCode>General</c:formatCode>
+                <c:ptCount val="4"/>
+                <c:pt idx="0">
+                  <c:v>8426342</c:v>
+                </c:pt>
+                <c:pt idx="1">
+                  <c:v>24370674</c:v>
+                </c:pt>
+                <c:pt idx="2">
+                  <c:v>98490098</c:v>
+                </c:pt>
+                <c:pt idx="3">
+                  <c:v>307816670</c:v>
+                </c:pt>
+              </c:numCache>
+            </c:numRef>
+          </c:val>
+          <c:smooth val="0"/>
+          <c:extLst>
+            <c:ext xmlns:c16="http://schemas.microsoft.com/office/drawing/2014/chart" uri="{C3380CC4-5D6E-409C-BE32-E72D297353CC}">
+              <c16:uniqueId val="{00000004-12E3-5847-94B7-1E4FD1201F13}"/>
+            </c:ext>
+          </c:extLst>
+        </c:ser>
+        <c:ser>
+          <c:idx val="5"/>
+          <c:order val="5"/>
+          <c:tx>
+            <c:strRef>
+              <c:f>Sheet1!$G$76:$G$78</c:f>
+              <c:strCache>
+                <c:ptCount val="1"/>
+                <c:pt idx="0">
+                  <c:v>out_case3 - Sum of  LLC-loads</c:v>
+                </c:pt>
+              </c:strCache>
+            </c:strRef>
+          </c:tx>
+          <c:spPr>
+            <a:ln w="28575" cap="rnd">
+              <a:solidFill>
+                <a:schemeClr val="accent6"/>
+              </a:solidFill>
+              <a:round/>
+            </a:ln>
+            <a:effectLst/>
+          </c:spPr>
+          <c:marker>
+            <c:symbol val="none"/>
+          </c:marker>
+          <c:cat>
+            <c:strRef>
+              <c:f>Sheet1!$A$79:$A$83</c:f>
+              <c:strCache>
+                <c:ptCount val="4"/>
+                <c:pt idx="0">
+                  <c:v>800</c:v>
+                </c:pt>
+                <c:pt idx="1">
+                  <c:v>1600</c:v>
+                </c:pt>
+                <c:pt idx="2">
+                  <c:v>3200</c:v>
+                </c:pt>
+                <c:pt idx="3">
+                  <c:v>6400</c:v>
+                </c:pt>
+              </c:strCache>
+            </c:strRef>
+          </c:cat>
+          <c:val>
+            <c:numRef>
+              <c:f>Sheet1!$G$79:$G$83</c:f>
+              <c:numCache>
+                <c:formatCode>General</c:formatCode>
+                <c:ptCount val="4"/>
+                <c:pt idx="0">
+                  <c:v>17100654</c:v>
+                </c:pt>
+                <c:pt idx="1">
+                  <c:v>45261611</c:v>
+                </c:pt>
+                <c:pt idx="2">
+                  <c:v>230187184</c:v>
+                </c:pt>
+                <c:pt idx="3">
+                  <c:v>705672882</c:v>
+                </c:pt>
+              </c:numCache>
+            </c:numRef>
+          </c:val>
+          <c:smooth val="0"/>
+          <c:extLst>
+            <c:ext xmlns:c16="http://schemas.microsoft.com/office/drawing/2014/chart" uri="{C3380CC4-5D6E-409C-BE32-E72D297353CC}">
+              <c16:uniqueId val="{00000005-12E3-5847-94B7-1E4FD1201F13}"/>
+            </c:ext>
+          </c:extLst>
+        </c:ser>
+        <c:dLbls>
+          <c:showLegendKey val="0"/>
+          <c:showVal val="0"/>
+          <c:showCatName val="0"/>
+          <c:showSerName val="0"/>
+          <c:showPercent val="0"/>
+          <c:showBubbleSize val="0"/>
+        </c:dLbls>
+        <c:marker val="1"/>
+        <c:smooth val="0"/>
+        <c:axId val="218332975"/>
+        <c:axId val="218533135"/>
+      </c:lineChart>
+      <c:catAx>
+        <c:axId val="156040063"/>
+        <c:scaling>
+          <c:orientation val="minMax"/>
+        </c:scaling>
+        <c:delete val="0"/>
+        <c:axPos val="b"/>
+        <c:numFmt formatCode="General" sourceLinked="1"/>
+        <c:majorTickMark val="none"/>
+        <c:minorTickMark val="none"/>
+        <c:tickLblPos val="nextTo"/>
+        <c:spPr>
+          <a:noFill/>
+          <a:ln w="9525" cap="flat" cmpd="sng" algn="ctr">
+            <a:solidFill>
+              <a:schemeClr val="tx1">
+                <a:lumMod val="15000"/>
+                <a:lumOff val="85000"/>
+              </a:schemeClr>
+            </a:solidFill>
+            <a:round/>
+          </a:ln>
+          <a:effectLst/>
+        </c:spPr>
+        <c:txPr>
+          <a:bodyPr rot="-60000000" spcFirstLastPara="1" vertOverflow="ellipsis" vert="horz" wrap="square" anchor="ctr" anchorCtr="1"/>
+          <a:lstStyle/>
+          <a:p>
+            <a:pPr>
+              <a:defRPr sz="900" b="0" i="0" u="none" strike="noStrike" kern="1200" baseline="0">
+                <a:solidFill>
+                  <a:schemeClr val="tx1">
+                    <a:lumMod val="65000"/>
+                    <a:lumOff val="35000"/>
+                  </a:schemeClr>
+                </a:solidFill>
+                <a:latin typeface="+mn-lt"/>
+                <a:ea typeface="+mn-ea"/>
+                <a:cs typeface="+mn-cs"/>
+              </a:defRPr>
+            </a:pPr>
+            <a:endParaRPr lang="en-US"/>
+          </a:p>
+        </c:txPr>
+        <c:crossAx val="156041759"/>
+        <c:crosses val="autoZero"/>
+        <c:auto val="1"/>
+        <c:lblAlgn val="ctr"/>
+        <c:lblOffset val="100"/>
+        <c:noMultiLvlLbl val="0"/>
+      </c:catAx>
+      <c:valAx>
+        <c:axId val="156041759"/>
+        <c:scaling>
+          <c:orientation val="minMax"/>
+        </c:scaling>
+        <c:delete val="0"/>
+        <c:axPos val="l"/>
+        <c:majorGridlines>
+          <c:spPr>
+            <a:ln w="9525" cap="flat" cmpd="sng" algn="ctr">
+              <a:solidFill>
+                <a:schemeClr val="tx1">
+                  <a:lumMod val="15000"/>
+                  <a:lumOff val="85000"/>
+                </a:schemeClr>
+              </a:solidFill>
+              <a:round/>
+            </a:ln>
+            <a:effectLst/>
+          </c:spPr>
+        </c:majorGridlines>
+        <c:numFmt formatCode="General" sourceLinked="1"/>
+        <c:majorTickMark val="none"/>
+        <c:minorTickMark val="none"/>
+        <c:tickLblPos val="nextTo"/>
+        <c:spPr>
+          <a:noFill/>
+          <a:ln>
+            <a:noFill/>
+          </a:ln>
+          <a:effectLst/>
+        </c:spPr>
+        <c:txPr>
+          <a:bodyPr rot="-60000000" spcFirstLastPara="1" vertOverflow="ellipsis" vert="horz" wrap="square" anchor="ctr" anchorCtr="1"/>
+          <a:lstStyle/>
+          <a:p>
+            <a:pPr>
+              <a:defRPr sz="900" b="0" i="0" u="none" strike="noStrike" kern="1200" baseline="0">
+                <a:solidFill>
+                  <a:schemeClr val="tx1">
+                    <a:lumMod val="65000"/>
+                    <a:lumOff val="35000"/>
+                  </a:schemeClr>
+                </a:solidFill>
+                <a:latin typeface="+mn-lt"/>
+                <a:ea typeface="+mn-ea"/>
+                <a:cs typeface="+mn-cs"/>
+              </a:defRPr>
+            </a:pPr>
+            <a:endParaRPr lang="en-US"/>
+          </a:p>
+        </c:txPr>
+        <c:crossAx val="156040063"/>
+        <c:crosses val="autoZero"/>
+        <c:crossBetween val="between"/>
+      </c:valAx>
+      <c:valAx>
+        <c:axId val="218533135"/>
+        <c:scaling>
+          <c:orientation val="minMax"/>
+        </c:scaling>
+        <c:delete val="0"/>
+        <c:axPos val="r"/>
+        <c:numFmt formatCode="General" sourceLinked="1"/>
+        <c:majorTickMark val="out"/>
+        <c:minorTickMark val="none"/>
+        <c:tickLblPos val="nextTo"/>
+        <c:spPr>
+          <a:noFill/>
+          <a:ln>
+            <a:noFill/>
+          </a:ln>
+          <a:effectLst/>
+        </c:spPr>
+        <c:txPr>
+          <a:bodyPr rot="-60000000" spcFirstLastPara="1" vertOverflow="ellipsis" vert="horz" wrap="square" anchor="ctr" anchorCtr="1"/>
+          <a:lstStyle/>
+          <a:p>
+            <a:pPr>
+              <a:defRPr sz="900" b="0" i="0" u="none" strike="noStrike" kern="1200" baseline="0">
+                <a:solidFill>
+                  <a:schemeClr val="tx1">
+                    <a:lumMod val="65000"/>
+                    <a:lumOff val="35000"/>
+                  </a:schemeClr>
+                </a:solidFill>
+                <a:latin typeface="+mn-lt"/>
+                <a:ea typeface="+mn-ea"/>
+                <a:cs typeface="+mn-cs"/>
+              </a:defRPr>
+            </a:pPr>
+            <a:endParaRPr lang="en-US"/>
+          </a:p>
+        </c:txPr>
+        <c:crossAx val="218332975"/>
+        <c:crosses val="max"/>
+        <c:crossBetween val="between"/>
+      </c:valAx>
+      <c:catAx>
+        <c:axId val="218332975"/>
+        <c:scaling>
+          <c:orientation val="minMax"/>
+        </c:scaling>
+        <c:delete val="1"/>
+        <c:axPos val="b"/>
+        <c:numFmt formatCode="General" sourceLinked="1"/>
+        <c:majorTickMark val="out"/>
+        <c:minorTickMark val="none"/>
+        <c:tickLblPos val="nextTo"/>
+        <c:crossAx val="218533135"/>
+        <c:crosses val="autoZero"/>
+        <c:auto val="1"/>
+        <c:lblAlgn val="ctr"/>
+        <c:lblOffset val="100"/>
+        <c:noMultiLvlLbl val="0"/>
+      </c:catAx>
+      <c:spPr>
+        <a:noFill/>
+        <a:ln>
+          <a:noFill/>
+        </a:ln>
+        <a:effectLst/>
+      </c:spPr>
+    </c:plotArea>
+    <c:legend>
+      <c:legendPos val="r"/>
+      <c:overlay val="0"/>
+      <c:spPr>
+        <a:noFill/>
+        <a:ln>
+          <a:noFill/>
+        </a:ln>
+        <a:effectLst/>
+      </c:spPr>
+      <c:txPr>
+        <a:bodyPr rot="0" spcFirstLastPara="1" vertOverflow="ellipsis" vert="horz" wrap="square" anchor="ctr" anchorCtr="1"/>
+        <a:lstStyle/>
+        <a:p>
+          <a:pPr>
+            <a:defRPr sz="900" b="0" i="0" u="none" strike="noStrike" kern="1200" baseline="0">
+              <a:solidFill>
+                <a:schemeClr val="tx1">
+                  <a:lumMod val="65000"/>
+                  <a:lumOff val="35000"/>
+                </a:schemeClr>
+              </a:solidFill>
+              <a:latin typeface="+mn-lt"/>
+              <a:ea typeface="+mn-ea"/>
+              <a:cs typeface="+mn-cs"/>
+            </a:defRPr>
+          </a:pPr>
+          <a:endParaRPr lang="en-US"/>
+        </a:p>
+      </c:txPr>
+    </c:legend>
+    <c:plotVisOnly val="1"/>
+    <c:dispBlanksAs val="gap"/>
+    <c:extLst>
+      <c:ext xmlns:c16r3="http://schemas.microsoft.com/office/drawing/2017/03/chart" uri="{56B9EC1D-385E-4148-901F-78D8002777C0}">
+        <c16r3:dataDisplayOptions16>
+          <c16r3:dispNaAsBlank val="1"/>
+        </c16r3:dataDisplayOptions16>
+      </c:ext>
+    </c:extLst>
+    <c:showDLblsOverMax val="0"/>
+  </c:chart>
+  <c:spPr>
+    <a:noFill/>
+    <a:ln>
+      <a:noFill/>
+    </a:ln>
+    <a:effectLst/>
+  </c:spPr>
+  <c:txPr>
+    <a:bodyPr/>
+    <a:lstStyle/>
+    <a:p>
+      <a:pPr>
+        <a:defRPr/>
+      </a:pPr>
+      <a:endParaRPr lang="en-US"/>
+    </a:p>
+  </c:txPr>
+  <c:externalData r:id="rId3">
+    <c:autoUpdate val="0"/>
+  </c:externalData>
+  <c:extLst>
+    <c:ext xmlns:c14="http://schemas.microsoft.com/office/drawing/2007/8/2/chart" uri="{781A3756-C4B2-4CAC-9D66-4F8BD8637D16}">
+      <c14:pivotOptions>
+        <c14:dropZoneFilter val="1"/>
+        <c14:dropZoneCategories val="1"/>
+        <c14:dropZoneData val="1"/>
+        <c14:dropZoneSeries val="1"/>
+        <c14:dropZonesVisible val="1"/>
+      </c14:pivotOptions>
+    </c:ext>
+    <c:ext xmlns:c16="http://schemas.microsoft.com/office/drawing/2014/chart" uri="{E28EC0CA-F0BB-4C9C-879D-F8772B89E7AC}">
+      <c16:pivotOptions16>
+        <c16:showExpandCollapseFieldButtons val="1"/>
+      </c16:pivotOptions16>
+    </c:ext>
+  </c:extLst>
+</c:chartSpace>
+</file>
+
+<file path=ppt/charts/colors1.xml><?xml version="1.0" encoding="utf-8"?>
+<cs:colorStyle xmlns:cs="http://schemas.microsoft.com/office/drawing/2012/chartStyle" xmlns:a="http://schemas.openxmlformats.org/drawingml/2006/main" meth="cycle" id="10">
+  <a:schemeClr val="accent1"/>
+  <a:schemeClr val="accent2"/>
+  <a:schemeClr val="accent3"/>
+  <a:schemeClr val="accent4"/>
+  <a:schemeClr val="accent5"/>
+  <a:schemeClr val="accent6"/>
+  <cs:variation/>
+  <cs:variation>
+    <a:lumMod val="60000"/>
+  </cs:variation>
+  <cs:variation>
+    <a:lumMod val="80000"/>
+    <a:lumOff val="20000"/>
+  </cs:variation>
+  <cs:variation>
+    <a:lumMod val="80000"/>
+  </cs:variation>
+  <cs:variation>
+    <a:lumMod val="60000"/>
+    <a:lumOff val="40000"/>
+  </cs:variation>
+  <cs:variation>
+    <a:lumMod val="50000"/>
+  </cs:variation>
+  <cs:variation>
+    <a:lumMod val="70000"/>
+    <a:lumOff val="30000"/>
+  </cs:variation>
+  <cs:variation>
+    <a:lumMod val="70000"/>
+  </cs:variation>
+  <cs:variation>
+    <a:lumMod val="50000"/>
+    <a:lumOff val="50000"/>
+  </cs:variation>
+</cs:colorStyle>
+</file>
+
+<file path=ppt/charts/colors2.xml><?xml version="1.0" encoding="utf-8"?>
+<cs:colorStyle xmlns:cs="http://schemas.microsoft.com/office/drawing/2012/chartStyle" xmlns:a="http://schemas.openxmlformats.org/drawingml/2006/main" meth="cycle" id="10">
+  <a:schemeClr val="accent1"/>
+  <a:schemeClr val="accent2"/>
+  <a:schemeClr val="accent3"/>
+  <a:schemeClr val="accent4"/>
+  <a:schemeClr val="accent5"/>
+  <a:schemeClr val="accent6"/>
+  <cs:variation/>
+  <cs:variation>
+    <a:lumMod val="60000"/>
+  </cs:variation>
+  <cs:variation>
+    <a:lumMod val="80000"/>
+    <a:lumOff val="20000"/>
+  </cs:variation>
+  <cs:variation>
+    <a:lumMod val="80000"/>
+  </cs:variation>
+  <cs:variation>
+    <a:lumMod val="60000"/>
+    <a:lumOff val="40000"/>
+  </cs:variation>
+  <cs:variation>
+    <a:lumMod val="50000"/>
+  </cs:variation>
+  <cs:variation>
+    <a:lumMod val="70000"/>
+    <a:lumOff val="30000"/>
+  </cs:variation>
+  <cs:variation>
+    <a:lumMod val="70000"/>
+  </cs:variation>
+  <cs:variation>
+    <a:lumMod val="50000"/>
+    <a:lumOff val="50000"/>
+  </cs:variation>
+</cs:colorStyle>
+</file>
+
+<file path=ppt/charts/style1.xml><?xml version="1.0" encoding="utf-8"?>
+<cs:chartStyle xmlns:cs="http://schemas.microsoft.com/office/drawing/2012/chartStyle" xmlns:a="http://schemas.openxmlformats.org/drawingml/2006/main" id="201">
+  <cs:axisTitle>
+    <cs:lnRef idx="0"/>
+    <cs:fillRef idx="0"/>
+    <cs:effectRef idx="0"/>
+    <cs:fontRef idx="minor">
+      <a:schemeClr val="tx1">
+        <a:lumMod val="65000"/>
+        <a:lumOff val="35000"/>
+      </a:schemeClr>
+    </cs:fontRef>
+    <cs:defRPr sz="1000" kern="1200"/>
+  </cs:axisTitle>
+  <cs:categoryAxis>
+    <cs:lnRef idx="0"/>
+    <cs:fillRef idx="0"/>
+    <cs:effectRef idx="0"/>
+    <cs:fontRef idx="minor">
+      <a:schemeClr val="tx1">
+        <a:lumMod val="65000"/>
+        <a:lumOff val="35000"/>
+      </a:schemeClr>
+    </cs:fontRef>
+    <cs:spPr>
+      <a:ln w="9525" cap="flat" cmpd="sng" algn="ctr">
+        <a:solidFill>
+          <a:schemeClr val="tx1">
+            <a:lumMod val="15000"/>
+            <a:lumOff val="85000"/>
+          </a:schemeClr>
+        </a:solidFill>
+        <a:round/>
+      </a:ln>
+    </cs:spPr>
+    <cs:defRPr sz="900" kern="1200"/>
+  </cs:categoryAxis>
+  <cs:chartArea mods="allowNoFillOverride allowNoLineOverride">
+    <cs:lnRef idx="0"/>
+    <cs:fillRef idx="0"/>
+    <cs:effectRef idx="0"/>
+    <cs:fontRef idx="minor">
+      <a:schemeClr val="tx1"/>
+    </cs:fontRef>
+    <cs:spPr>
+      <a:solidFill>
+        <a:schemeClr val="bg1"/>
+      </a:solidFill>
+      <a:ln w="9525" cap="flat" cmpd="sng" algn="ctr">
+        <a:solidFill>
+          <a:schemeClr val="tx1">
+            <a:lumMod val="15000"/>
+            <a:lumOff val="85000"/>
+          </a:schemeClr>
+        </a:solidFill>
+        <a:round/>
+      </a:ln>
+    </cs:spPr>
+    <cs:defRPr sz="1000" kern="1200"/>
+  </cs:chartArea>
+  <cs:dataLabel>
+    <cs:lnRef idx="0"/>
+    <cs:fillRef idx="0"/>
+    <cs:effectRef idx="0"/>
+    <cs:fontRef idx="minor">
+      <a:schemeClr val="tx1">
+        <a:lumMod val="75000"/>
+        <a:lumOff val="25000"/>
+      </a:schemeClr>
+    </cs:fontRef>
+    <cs:defRPr sz="900" kern="1200"/>
+  </cs:dataLabel>
+  <cs:dataLabelCallout>
+    <cs:lnRef idx="0"/>
+    <cs:fillRef idx="0"/>
+    <cs:effectRef idx="0"/>
+    <cs:fontRef idx="minor">
+      <a:schemeClr val="dk1">
+        <a:lumMod val="65000"/>
+        <a:lumOff val="35000"/>
+      </a:schemeClr>
+    </cs:fontRef>
+    <cs:spPr>
+      <a:solidFill>
+        <a:schemeClr val="lt1"/>
+      </a:solidFill>
+      <a:ln>
+        <a:solidFill>
+          <a:schemeClr val="dk1">
+            <a:lumMod val="25000"/>
+            <a:lumOff val="75000"/>
+          </a:schemeClr>
+        </a:solidFill>
+      </a:ln>
+    </cs:spPr>
+    <cs:defRPr sz="900" kern="1200"/>
+    <cs:bodyPr rot="0" spcFirstLastPara="1" vertOverflow="clip" horzOverflow="clip" vert="horz" wrap="square" lIns="36576" tIns="18288" rIns="36576" bIns="18288" anchor="ctr" anchorCtr="1">
+      <a:spAutoFit/>
+    </cs:bodyPr>
+  </cs:dataLabelCallout>
+  <cs:dataPoint>
+    <cs:lnRef idx="0"/>
+    <cs:fillRef idx="1">
+      <cs:styleClr val="auto"/>
+    </cs:fillRef>
+    <cs:effectRef idx="0"/>
+    <cs:fontRef idx="minor">
+      <a:schemeClr val="tx1"/>
+    </cs:fontRef>
+  </cs:dataPoint>
+  <cs:dataPoint3D>
+    <cs:lnRef idx="0"/>
+    <cs:fillRef idx="1">
+      <cs:styleClr val="auto"/>
+    </cs:fillRef>
+    <cs:effectRef idx="0"/>
+    <cs:fontRef idx="minor">
+      <a:schemeClr val="tx1"/>
+    </cs:fontRef>
+  </cs:dataPoint3D>
+  <cs:dataPointLine>
+    <cs:lnRef idx="0">
+      <cs:styleClr val="auto"/>
+    </cs:lnRef>
+    <cs:fillRef idx="1"/>
+    <cs:effectRef idx="0"/>
+    <cs:fontRef idx="minor">
+      <a:schemeClr val="tx1"/>
+    </cs:fontRef>
+    <cs:spPr>
+      <a:ln w="28575" cap="rnd">
+        <a:solidFill>
+          <a:schemeClr val="phClr"/>
+        </a:solidFill>
+        <a:round/>
+      </a:ln>
+    </cs:spPr>
+  </cs:dataPointLine>
+  <cs:dataPointMarker>
+    <cs:lnRef idx="0">
+      <cs:styleClr val="auto"/>
+    </cs:lnRef>
+    <cs:fillRef idx="1">
+      <cs:styleClr val="auto"/>
+    </cs:fillRef>
+    <cs:effectRef idx="0"/>
+    <cs:fontRef idx="minor">
+      <a:schemeClr val="tx1"/>
+    </cs:fontRef>
+    <cs:spPr>
+      <a:ln w="9525">
+        <a:solidFill>
+          <a:schemeClr val="phClr"/>
+        </a:solidFill>
+      </a:ln>
+    </cs:spPr>
+  </cs:dataPointMarker>
+  <cs:dataPointMarkerLayout symbol="circle" size="5"/>
+  <cs:dataPointWireframe>
+    <cs:lnRef idx="0">
+      <cs:styleClr val="auto"/>
+    </cs:lnRef>
+    <cs:fillRef idx="1"/>
+    <cs:effectRef idx="0"/>
+    <cs:fontRef idx="minor">
+      <a:schemeClr val="tx1"/>
+    </cs:fontRef>
+    <cs:spPr>
+      <a:ln w="9525" cap="rnd">
+        <a:solidFill>
+          <a:schemeClr val="phClr"/>
+        </a:solidFill>
+        <a:round/>
+      </a:ln>
+    </cs:spPr>
+  </cs:dataPointWireframe>
+  <cs:dataTable>
+    <cs:lnRef idx="0"/>
+    <cs:fillRef idx="0"/>
+    <cs:effectRef idx="0"/>
+    <cs:fontRef idx="minor">
+      <a:schemeClr val="tx1">
+        <a:lumMod val="65000"/>
+        <a:lumOff val="35000"/>
+      </a:schemeClr>
+    </cs:fontRef>
+    <cs:spPr>
+      <a:noFill/>
+      <a:ln w="9525" cap="flat" cmpd="sng" algn="ctr">
+        <a:solidFill>
+          <a:schemeClr val="tx1">
+            <a:lumMod val="15000"/>
+            <a:lumOff val="85000"/>
+          </a:schemeClr>
+        </a:solidFill>
+        <a:round/>
+      </a:ln>
+    </cs:spPr>
+    <cs:defRPr sz="900" kern="1200"/>
+  </cs:dataTable>
+  <cs:downBar>
+    <cs:lnRef idx="0"/>
+    <cs:fillRef idx="0"/>
+    <cs:effectRef idx="0"/>
+    <cs:fontRef idx="minor">
+      <a:schemeClr val="dk1"/>
+    </cs:fontRef>
+    <cs:spPr>
+      <a:solidFill>
+        <a:schemeClr val="dk1">
+          <a:lumMod val="65000"/>
+          <a:lumOff val="35000"/>
+        </a:schemeClr>
+      </a:solidFill>
+      <a:ln w="9525">
+        <a:solidFill>
+          <a:schemeClr val="tx1">
+            <a:lumMod val="65000"/>
+            <a:lumOff val="35000"/>
+          </a:schemeClr>
+        </a:solidFill>
+      </a:ln>
+    </cs:spPr>
+  </cs:downBar>
+  <cs:dropLine>
+    <cs:lnRef idx="0"/>
+    <cs:fillRef idx="0"/>
+    <cs:effectRef idx="0"/>
+    <cs:fontRef idx="minor">
+      <a:schemeClr val="tx1"/>
+    </cs:fontRef>
+    <cs:spPr>
+      <a:ln w="9525" cap="flat" cmpd="sng" algn="ctr">
+        <a:solidFill>
+          <a:schemeClr val="tx1">
+            <a:lumMod val="35000"/>
+            <a:lumOff val="65000"/>
+          </a:schemeClr>
+        </a:solidFill>
+        <a:round/>
+      </a:ln>
+    </cs:spPr>
+  </cs:dropLine>
+  <cs:errorBar>
+    <cs:lnRef idx="0"/>
+    <cs:fillRef idx="0"/>
+    <cs:effectRef idx="0"/>
+    <cs:fontRef idx="minor">
+      <a:schemeClr val="tx1"/>
+    </cs:fontRef>
+    <cs:spPr>
+      <a:ln w="9525" cap="flat" cmpd="sng" algn="ctr">
+        <a:solidFill>
+          <a:schemeClr val="tx1">
+            <a:lumMod val="65000"/>
+            <a:lumOff val="35000"/>
+          </a:schemeClr>
+        </a:solidFill>
+        <a:round/>
+      </a:ln>
+    </cs:spPr>
+  </cs:errorBar>
+  <cs:floor>
+    <cs:lnRef idx="0"/>
+    <cs:fillRef idx="0"/>
+    <cs:effectRef idx="0"/>
+    <cs:fontRef idx="minor">
+      <a:schemeClr val="tx1"/>
+    </cs:fontRef>
+    <cs:spPr>
+      <a:noFill/>
+      <a:ln>
+        <a:noFill/>
+      </a:ln>
+    </cs:spPr>
+  </cs:floor>
+  <cs:gridlineMajor>
+    <cs:lnRef idx="0"/>
+    <cs:fillRef idx="0"/>
+    <cs:effectRef idx="0"/>
+    <cs:fontRef idx="minor">
+      <a:schemeClr val="tx1"/>
+    </cs:fontRef>
+    <cs:spPr>
+      <a:ln w="9525" cap="flat" cmpd="sng" algn="ctr">
+        <a:solidFill>
+          <a:schemeClr val="tx1">
+            <a:lumMod val="15000"/>
+            <a:lumOff val="85000"/>
+          </a:schemeClr>
+        </a:solidFill>
+        <a:round/>
+      </a:ln>
+    </cs:spPr>
+  </cs:gridlineMajor>
+  <cs:gridlineMinor>
+    <cs:lnRef idx="0"/>
+    <cs:fillRef idx="0"/>
+    <cs:effectRef idx="0"/>
+    <cs:fontRef idx="minor">
+      <a:schemeClr val="tx1"/>
+    </cs:fontRef>
+    <cs:spPr>
+      <a:ln w="9525" cap="flat" cmpd="sng" algn="ctr">
+        <a:solidFill>
+          <a:schemeClr val="tx1">
+            <a:lumMod val="5000"/>
+            <a:lumOff val="95000"/>
+          </a:schemeClr>
+        </a:solidFill>
+        <a:round/>
+      </a:ln>
+    </cs:spPr>
+  </cs:gridlineMinor>
+  <cs:hiLoLine>
+    <cs:lnRef idx="0"/>
+    <cs:fillRef idx="0"/>
+    <cs:effectRef idx="0"/>
+    <cs:fontRef idx="minor">
+      <a:schemeClr val="tx1"/>
+    </cs:fontRef>
+    <cs:spPr>
+      <a:ln w="9525" cap="flat" cmpd="sng" algn="ctr">
+        <a:solidFill>
+          <a:schemeClr val="tx1">
+            <a:lumMod val="75000"/>
+            <a:lumOff val="25000"/>
+          </a:schemeClr>
+        </a:solidFill>
+        <a:round/>
+      </a:ln>
+    </cs:spPr>
+  </cs:hiLoLine>
+  <cs:leaderLine>
+    <cs:lnRef idx="0"/>
+    <cs:fillRef idx="0"/>
+    <cs:effectRef idx="0"/>
+    <cs:fontRef idx="minor">
+      <a:schemeClr val="tx1"/>
+    </cs:fontRef>
+    <cs:spPr>
+      <a:ln w="9525" cap="flat" cmpd="sng" algn="ctr">
+        <a:solidFill>
+          <a:schemeClr val="tx1">
+            <a:lumMod val="35000"/>
+            <a:lumOff val="65000"/>
+          </a:schemeClr>
+        </a:solidFill>
+        <a:round/>
+      </a:ln>
+    </cs:spPr>
+  </cs:leaderLine>
+  <cs:legend>
+    <cs:lnRef idx="0"/>
+    <cs:fillRef idx="0"/>
+    <cs:effectRef idx="0"/>
+    <cs:fontRef idx="minor">
+      <a:schemeClr val="tx1">
+        <a:lumMod val="65000"/>
+        <a:lumOff val="35000"/>
+      </a:schemeClr>
+    </cs:fontRef>
+    <cs:defRPr sz="900" kern="1200"/>
+  </cs:legend>
+  <cs:plotArea mods="allowNoFillOverride allowNoLineOverride">
+    <cs:lnRef idx="0"/>
+    <cs:fillRef idx="0"/>
+    <cs:effectRef idx="0"/>
+    <cs:fontRef idx="minor">
+      <a:schemeClr val="tx1"/>
+    </cs:fontRef>
+  </cs:plotArea>
+  <cs:plotArea3D mods="allowNoFillOverride allowNoLineOverride">
+    <cs:lnRef idx="0"/>
+    <cs:fillRef idx="0"/>
+    <cs:effectRef idx="0"/>
+    <cs:fontRef idx="minor">
+      <a:schemeClr val="tx1"/>
+    </cs:fontRef>
+  </cs:plotArea3D>
+  <cs:seriesAxis>
+    <cs:lnRef idx="0"/>
+    <cs:fillRef idx="0"/>
+    <cs:effectRef idx="0"/>
+    <cs:fontRef idx="minor">
+      <a:schemeClr val="tx1">
+        <a:lumMod val="65000"/>
+        <a:lumOff val="35000"/>
+      </a:schemeClr>
+    </cs:fontRef>
+    <cs:defRPr sz="900" kern="1200"/>
+  </cs:seriesAxis>
+  <cs:seriesLine>
+    <cs:lnRef idx="0"/>
+    <cs:fillRef idx="0"/>
+    <cs:effectRef idx="0"/>
+    <cs:fontRef idx="minor">
+      <a:schemeClr val="tx1"/>
+    </cs:fontRef>
+    <cs:spPr>
+      <a:ln w="9525" cap="flat" cmpd="sng" algn="ctr">
+        <a:solidFill>
+          <a:schemeClr val="tx1">
+            <a:lumMod val="35000"/>
+            <a:lumOff val="65000"/>
+          </a:schemeClr>
+        </a:solidFill>
+        <a:round/>
+      </a:ln>
+    </cs:spPr>
+  </cs:seriesLine>
+  <cs:title>
+    <cs:lnRef idx="0"/>
+    <cs:fillRef idx="0"/>
+    <cs:effectRef idx="0"/>
+    <cs:fontRef idx="minor">
+      <a:schemeClr val="tx1">
+        <a:lumMod val="65000"/>
+        <a:lumOff val="35000"/>
+      </a:schemeClr>
+    </cs:fontRef>
+    <cs:defRPr sz="1400" b="0" kern="1200" spc="0" baseline="0"/>
+  </cs:title>
+  <cs:trendline>
+    <cs:lnRef idx="0">
+      <cs:styleClr val="auto"/>
+    </cs:lnRef>
+    <cs:fillRef idx="0"/>
+    <cs:effectRef idx="0"/>
+    <cs:fontRef idx="minor">
+      <a:schemeClr val="tx1"/>
+    </cs:fontRef>
+    <cs:spPr>
+      <a:ln w="19050" cap="rnd">
+        <a:solidFill>
+          <a:schemeClr val="phClr"/>
+        </a:solidFill>
+        <a:prstDash val="sysDot"/>
+      </a:ln>
+    </cs:spPr>
+  </cs:trendline>
+  <cs:trendlineLabel>
+    <cs:lnRef idx="0"/>
+    <cs:fillRef idx="0"/>
+    <cs:effectRef idx="0"/>
+    <cs:fontRef idx="minor">
+      <a:schemeClr val="tx1">
+        <a:lumMod val="65000"/>
+        <a:lumOff val="35000"/>
+      </a:schemeClr>
+    </cs:fontRef>
+    <cs:defRPr sz="900" kern="1200"/>
+  </cs:trendlineLabel>
+  <cs:upBar>
+    <cs:lnRef idx="0"/>
+    <cs:fillRef idx="0"/>
+    <cs:effectRef idx="0"/>
+    <cs:fontRef idx="minor">
+      <a:schemeClr val="dk1"/>
+    </cs:fontRef>
+    <cs:spPr>
+      <a:solidFill>
+        <a:schemeClr val="lt1"/>
+      </a:solidFill>
+      <a:ln w="9525">
+        <a:solidFill>
+          <a:schemeClr val="tx1">
+            <a:lumMod val="15000"/>
+            <a:lumOff val="85000"/>
+          </a:schemeClr>
+        </a:solidFill>
+      </a:ln>
+    </cs:spPr>
+  </cs:upBar>
+  <cs:valueAxis>
+    <cs:lnRef idx="0"/>
+    <cs:fillRef idx="0"/>
+    <cs:effectRef idx="0"/>
+    <cs:fontRef idx="minor">
+      <a:schemeClr val="tx1">
+        <a:lumMod val="65000"/>
+        <a:lumOff val="35000"/>
+      </a:schemeClr>
+    </cs:fontRef>
+    <cs:defRPr sz="900" kern="1200"/>
+  </cs:valueAxis>
+  <cs:wall>
+    <cs:lnRef idx="0"/>
+    <cs:fillRef idx="0"/>
+    <cs:effectRef idx="0"/>
+    <cs:fontRef idx="minor">
+      <a:schemeClr val="tx1"/>
+    </cs:fontRef>
+    <cs:spPr>
+      <a:noFill/>
+      <a:ln>
+        <a:noFill/>
+      </a:ln>
+    </cs:spPr>
+  </cs:wall>
+</cs:chartStyle>
+</file>
+
+<file path=ppt/charts/style2.xml><?xml version="1.0" encoding="utf-8"?>
+<cs:chartStyle xmlns:cs="http://schemas.microsoft.com/office/drawing/2012/chartStyle" xmlns:a="http://schemas.openxmlformats.org/drawingml/2006/main" id="201">
+  <cs:axisTitle>
+    <cs:lnRef idx="0"/>
+    <cs:fillRef idx="0"/>
+    <cs:effectRef idx="0"/>
+    <cs:fontRef idx="minor">
+      <a:schemeClr val="tx1">
+        <a:lumMod val="65000"/>
+        <a:lumOff val="35000"/>
+      </a:schemeClr>
+    </cs:fontRef>
+    <cs:defRPr sz="1000" kern="1200"/>
+  </cs:axisTitle>
+  <cs:categoryAxis>
+    <cs:lnRef idx="0"/>
+    <cs:fillRef idx="0"/>
+    <cs:effectRef idx="0"/>
+    <cs:fontRef idx="minor">
+      <a:schemeClr val="tx1">
+        <a:lumMod val="65000"/>
+        <a:lumOff val="35000"/>
+      </a:schemeClr>
+    </cs:fontRef>
+    <cs:spPr>
+      <a:ln w="9525" cap="flat" cmpd="sng" algn="ctr">
+        <a:solidFill>
+          <a:schemeClr val="tx1">
+            <a:lumMod val="15000"/>
+            <a:lumOff val="85000"/>
+          </a:schemeClr>
+        </a:solidFill>
+        <a:round/>
+      </a:ln>
+    </cs:spPr>
+    <cs:defRPr sz="900" kern="1200"/>
+  </cs:categoryAxis>
+  <cs:chartArea mods="allowNoFillOverride allowNoLineOverride">
+    <cs:lnRef idx="0"/>
+    <cs:fillRef idx="0"/>
+    <cs:effectRef idx="0"/>
+    <cs:fontRef idx="minor">
+      <a:schemeClr val="tx1"/>
+    </cs:fontRef>
+    <cs:spPr>
+      <a:solidFill>
+        <a:schemeClr val="bg1"/>
+      </a:solidFill>
+      <a:ln w="9525" cap="flat" cmpd="sng" algn="ctr">
+        <a:solidFill>
+          <a:schemeClr val="tx1">
+            <a:lumMod val="15000"/>
+            <a:lumOff val="85000"/>
+          </a:schemeClr>
+        </a:solidFill>
+        <a:round/>
+      </a:ln>
+    </cs:spPr>
+    <cs:defRPr sz="1000" kern="1200"/>
+  </cs:chartArea>
+  <cs:dataLabel>
+    <cs:lnRef idx="0"/>
+    <cs:fillRef idx="0"/>
+    <cs:effectRef idx="0"/>
+    <cs:fontRef idx="minor">
+      <a:schemeClr val="tx1">
+        <a:lumMod val="75000"/>
+        <a:lumOff val="25000"/>
+      </a:schemeClr>
+    </cs:fontRef>
+    <cs:defRPr sz="900" kern="1200"/>
+  </cs:dataLabel>
+  <cs:dataLabelCallout>
+    <cs:lnRef idx="0"/>
+    <cs:fillRef idx="0"/>
+    <cs:effectRef idx="0"/>
+    <cs:fontRef idx="minor">
+      <a:schemeClr val="dk1">
+        <a:lumMod val="65000"/>
+        <a:lumOff val="35000"/>
+      </a:schemeClr>
+    </cs:fontRef>
+    <cs:spPr>
+      <a:solidFill>
+        <a:schemeClr val="lt1"/>
+      </a:solidFill>
+      <a:ln>
+        <a:solidFill>
+          <a:schemeClr val="dk1">
+            <a:lumMod val="25000"/>
+            <a:lumOff val="75000"/>
+          </a:schemeClr>
+        </a:solidFill>
+      </a:ln>
+    </cs:spPr>
+    <cs:defRPr sz="900" kern="1200"/>
+    <cs:bodyPr rot="0" spcFirstLastPara="1" vertOverflow="clip" horzOverflow="clip" vert="horz" wrap="square" lIns="36576" tIns="18288" rIns="36576" bIns="18288" anchor="ctr" anchorCtr="1">
+      <a:spAutoFit/>
+    </cs:bodyPr>
+  </cs:dataLabelCallout>
+  <cs:dataPoint>
+    <cs:lnRef idx="0"/>
+    <cs:fillRef idx="1">
+      <cs:styleClr val="auto"/>
+    </cs:fillRef>
+    <cs:effectRef idx="0"/>
+    <cs:fontRef idx="minor">
+      <a:schemeClr val="tx1"/>
+    </cs:fontRef>
+  </cs:dataPoint>
+  <cs:dataPoint3D>
+    <cs:lnRef idx="0"/>
+    <cs:fillRef idx="1">
+      <cs:styleClr val="auto"/>
+    </cs:fillRef>
+    <cs:effectRef idx="0"/>
+    <cs:fontRef idx="minor">
+      <a:schemeClr val="tx1"/>
+    </cs:fontRef>
+  </cs:dataPoint3D>
+  <cs:dataPointLine>
+    <cs:lnRef idx="0">
+      <cs:styleClr val="auto"/>
+    </cs:lnRef>
+    <cs:fillRef idx="1"/>
+    <cs:effectRef idx="0"/>
+    <cs:fontRef idx="minor">
+      <a:schemeClr val="tx1"/>
+    </cs:fontRef>
+    <cs:spPr>
+      <a:ln w="28575" cap="rnd">
+        <a:solidFill>
+          <a:schemeClr val="phClr"/>
+        </a:solidFill>
+        <a:round/>
+      </a:ln>
+    </cs:spPr>
+  </cs:dataPointLine>
+  <cs:dataPointMarker>
+    <cs:lnRef idx="0">
+      <cs:styleClr val="auto"/>
+    </cs:lnRef>
+    <cs:fillRef idx="1">
+      <cs:styleClr val="auto"/>
+    </cs:fillRef>
+    <cs:effectRef idx="0"/>
+    <cs:fontRef idx="minor">
+      <a:schemeClr val="tx1"/>
+    </cs:fontRef>
+    <cs:spPr>
+      <a:ln w="9525">
+        <a:solidFill>
+          <a:schemeClr val="phClr"/>
+        </a:solidFill>
+      </a:ln>
+    </cs:spPr>
+  </cs:dataPointMarker>
+  <cs:dataPointMarkerLayout symbol="circle" size="5"/>
+  <cs:dataPointWireframe>
+    <cs:lnRef idx="0">
+      <cs:styleClr val="auto"/>
+    </cs:lnRef>
+    <cs:fillRef idx="1"/>
+    <cs:effectRef idx="0"/>
+    <cs:fontRef idx="minor">
+      <a:schemeClr val="tx1"/>
+    </cs:fontRef>
+    <cs:spPr>
+      <a:ln w="9525" cap="rnd">
+        <a:solidFill>
+          <a:schemeClr val="phClr"/>
+        </a:solidFill>
+        <a:round/>
+      </a:ln>
+    </cs:spPr>
+  </cs:dataPointWireframe>
+  <cs:dataTable>
+    <cs:lnRef idx="0"/>
+    <cs:fillRef idx="0"/>
+    <cs:effectRef idx="0"/>
+    <cs:fontRef idx="minor">
+      <a:schemeClr val="tx1">
+        <a:lumMod val="65000"/>
+        <a:lumOff val="35000"/>
+      </a:schemeClr>
+    </cs:fontRef>
+    <cs:spPr>
+      <a:noFill/>
+      <a:ln w="9525" cap="flat" cmpd="sng" algn="ctr">
+        <a:solidFill>
+          <a:schemeClr val="tx1">
+            <a:lumMod val="15000"/>
+            <a:lumOff val="85000"/>
+          </a:schemeClr>
+        </a:solidFill>
+        <a:round/>
+      </a:ln>
+    </cs:spPr>
+    <cs:defRPr sz="900" kern="1200"/>
+  </cs:dataTable>
+  <cs:downBar>
+    <cs:lnRef idx="0"/>
+    <cs:fillRef idx="0"/>
+    <cs:effectRef idx="0"/>
+    <cs:fontRef idx="minor">
+      <a:schemeClr val="dk1"/>
+    </cs:fontRef>
+    <cs:spPr>
+      <a:solidFill>
+        <a:schemeClr val="dk1">
+          <a:lumMod val="65000"/>
+          <a:lumOff val="35000"/>
+        </a:schemeClr>
+      </a:solidFill>
+      <a:ln w="9525">
+        <a:solidFill>
+          <a:schemeClr val="tx1">
+            <a:lumMod val="65000"/>
+            <a:lumOff val="35000"/>
+          </a:schemeClr>
+        </a:solidFill>
+      </a:ln>
+    </cs:spPr>
+  </cs:downBar>
+  <cs:dropLine>
+    <cs:lnRef idx="0"/>
+    <cs:fillRef idx="0"/>
+    <cs:effectRef idx="0"/>
+    <cs:fontRef idx="minor">
+      <a:schemeClr val="tx1"/>
+    </cs:fontRef>
+    <cs:spPr>
+      <a:ln w="9525" cap="flat" cmpd="sng" algn="ctr">
+        <a:solidFill>
+          <a:schemeClr val="tx1">
+            <a:lumMod val="35000"/>
+            <a:lumOff val="65000"/>
+          </a:schemeClr>
+        </a:solidFill>
+        <a:round/>
+      </a:ln>
+    </cs:spPr>
+  </cs:dropLine>
+  <cs:errorBar>
+    <cs:lnRef idx="0"/>
+    <cs:fillRef idx="0"/>
+    <cs:effectRef idx="0"/>
+    <cs:fontRef idx="minor">
+      <a:schemeClr val="tx1"/>
+    </cs:fontRef>
+    <cs:spPr>
+      <a:ln w="9525" cap="flat" cmpd="sng" algn="ctr">
+        <a:solidFill>
+          <a:schemeClr val="tx1">
+            <a:lumMod val="65000"/>
+            <a:lumOff val="35000"/>
+          </a:schemeClr>
+        </a:solidFill>
+        <a:round/>
+      </a:ln>
+    </cs:spPr>
+  </cs:errorBar>
+  <cs:floor>
+    <cs:lnRef idx="0"/>
+    <cs:fillRef idx="0"/>
+    <cs:effectRef idx="0"/>
+    <cs:fontRef idx="minor">
+      <a:schemeClr val="tx1"/>
+    </cs:fontRef>
+    <cs:spPr>
+      <a:noFill/>
+      <a:ln>
+        <a:noFill/>
+      </a:ln>
+    </cs:spPr>
+  </cs:floor>
+  <cs:gridlineMajor>
+    <cs:lnRef idx="0"/>
+    <cs:fillRef idx="0"/>
+    <cs:effectRef idx="0"/>
+    <cs:fontRef idx="minor">
+      <a:schemeClr val="tx1"/>
+    </cs:fontRef>
+    <cs:spPr>
+      <a:ln w="9525" cap="flat" cmpd="sng" algn="ctr">
+        <a:solidFill>
+          <a:schemeClr val="tx1">
+            <a:lumMod val="15000"/>
+            <a:lumOff val="85000"/>
+          </a:schemeClr>
+        </a:solidFill>
+        <a:round/>
+      </a:ln>
+    </cs:spPr>
+  </cs:gridlineMajor>
+  <cs:gridlineMinor>
+    <cs:lnRef idx="0"/>
+    <cs:fillRef idx="0"/>
+    <cs:effectRef idx="0"/>
+    <cs:fontRef idx="minor">
+      <a:schemeClr val="tx1"/>
+    </cs:fontRef>
+    <cs:spPr>
+      <a:ln w="9525" cap="flat" cmpd="sng" algn="ctr">
+        <a:solidFill>
+          <a:schemeClr val="tx1">
+            <a:lumMod val="5000"/>
+            <a:lumOff val="95000"/>
+          </a:schemeClr>
+        </a:solidFill>
+        <a:round/>
+      </a:ln>
+    </cs:spPr>
+  </cs:gridlineMinor>
+  <cs:hiLoLine>
+    <cs:lnRef idx="0"/>
+    <cs:fillRef idx="0"/>
+    <cs:effectRef idx="0"/>
+    <cs:fontRef idx="minor">
+      <a:schemeClr val="tx1"/>
+    </cs:fontRef>
+    <cs:spPr>
+      <a:ln w="9525" cap="flat" cmpd="sng" algn="ctr">
+        <a:solidFill>
+          <a:schemeClr val="tx1">
+            <a:lumMod val="75000"/>
+            <a:lumOff val="25000"/>
+          </a:schemeClr>
+        </a:solidFill>
+        <a:round/>
+      </a:ln>
+    </cs:spPr>
+  </cs:hiLoLine>
+  <cs:leaderLine>
+    <cs:lnRef idx="0"/>
+    <cs:fillRef idx="0"/>
+    <cs:effectRef idx="0"/>
+    <cs:fontRef idx="minor">
+      <a:schemeClr val="tx1"/>
+    </cs:fontRef>
+    <cs:spPr>
+      <a:ln w="9525" cap="flat" cmpd="sng" algn="ctr">
+        <a:solidFill>
+          <a:schemeClr val="tx1">
+            <a:lumMod val="35000"/>
+            <a:lumOff val="65000"/>
+          </a:schemeClr>
+        </a:solidFill>
+        <a:round/>
+      </a:ln>
+    </cs:spPr>
+  </cs:leaderLine>
+  <cs:legend>
+    <cs:lnRef idx="0"/>
+    <cs:fillRef idx="0"/>
+    <cs:effectRef idx="0"/>
+    <cs:fontRef idx="minor">
+      <a:schemeClr val="tx1">
+        <a:lumMod val="65000"/>
+        <a:lumOff val="35000"/>
+      </a:schemeClr>
+    </cs:fontRef>
+    <cs:defRPr sz="900" kern="1200"/>
+  </cs:legend>
+  <cs:plotArea mods="allowNoFillOverride allowNoLineOverride">
+    <cs:lnRef idx="0"/>
+    <cs:fillRef idx="0"/>
+    <cs:effectRef idx="0"/>
+    <cs:fontRef idx="minor">
+      <a:schemeClr val="tx1"/>
+    </cs:fontRef>
+  </cs:plotArea>
+  <cs:plotArea3D mods="allowNoFillOverride allowNoLineOverride">
+    <cs:lnRef idx="0"/>
+    <cs:fillRef idx="0"/>
+    <cs:effectRef idx="0"/>
+    <cs:fontRef idx="minor">
+      <a:schemeClr val="tx1"/>
+    </cs:fontRef>
+  </cs:plotArea3D>
+  <cs:seriesAxis>
+    <cs:lnRef idx="0"/>
+    <cs:fillRef idx="0"/>
+    <cs:effectRef idx="0"/>
+    <cs:fontRef idx="minor">
+      <a:schemeClr val="tx1">
+        <a:lumMod val="65000"/>
+        <a:lumOff val="35000"/>
+      </a:schemeClr>
+    </cs:fontRef>
+    <cs:defRPr sz="900" kern="1200"/>
+  </cs:seriesAxis>
+  <cs:seriesLine>
+    <cs:lnRef idx="0"/>
+    <cs:fillRef idx="0"/>
+    <cs:effectRef idx="0"/>
+    <cs:fontRef idx="minor">
+      <a:schemeClr val="tx1"/>
+    </cs:fontRef>
+    <cs:spPr>
+      <a:ln w="9525" cap="flat" cmpd="sng" algn="ctr">
+        <a:solidFill>
+          <a:schemeClr val="tx1">
+            <a:lumMod val="35000"/>
+            <a:lumOff val="65000"/>
+          </a:schemeClr>
+        </a:solidFill>
+        <a:round/>
+      </a:ln>
+    </cs:spPr>
+  </cs:seriesLine>
+  <cs:title>
+    <cs:lnRef idx="0"/>
+    <cs:fillRef idx="0"/>
+    <cs:effectRef idx="0"/>
+    <cs:fontRef idx="minor">
+      <a:schemeClr val="tx1">
+        <a:lumMod val="65000"/>
+        <a:lumOff val="35000"/>
+      </a:schemeClr>
+    </cs:fontRef>
+    <cs:defRPr sz="1400" b="0" kern="1200" spc="0" baseline="0"/>
+  </cs:title>
+  <cs:trendline>
+    <cs:lnRef idx="0">
+      <cs:styleClr val="auto"/>
+    </cs:lnRef>
+    <cs:fillRef idx="0"/>
+    <cs:effectRef idx="0"/>
+    <cs:fontRef idx="minor">
+      <a:schemeClr val="tx1"/>
+    </cs:fontRef>
+    <cs:spPr>
+      <a:ln w="19050" cap="rnd">
+        <a:solidFill>
+          <a:schemeClr val="phClr"/>
+        </a:solidFill>
+        <a:prstDash val="sysDot"/>
+      </a:ln>
+    </cs:spPr>
+  </cs:trendline>
+  <cs:trendlineLabel>
+    <cs:lnRef idx="0"/>
+    <cs:fillRef idx="0"/>
+    <cs:effectRef idx="0"/>
+    <cs:fontRef idx="minor">
+      <a:schemeClr val="tx1">
+        <a:lumMod val="65000"/>
+        <a:lumOff val="35000"/>
+      </a:schemeClr>
+    </cs:fontRef>
+    <cs:defRPr sz="900" kern="1200"/>
+  </cs:trendlineLabel>
+  <cs:upBar>
+    <cs:lnRef idx="0"/>
+    <cs:fillRef idx="0"/>
+    <cs:effectRef idx="0"/>
+    <cs:fontRef idx="minor">
+      <a:schemeClr val="dk1"/>
+    </cs:fontRef>
+    <cs:spPr>
+      <a:solidFill>
+        <a:schemeClr val="lt1"/>
+      </a:solidFill>
+      <a:ln w="9525">
+        <a:solidFill>
+          <a:schemeClr val="tx1">
+            <a:lumMod val="15000"/>
+            <a:lumOff val="85000"/>
+          </a:schemeClr>
+        </a:solidFill>
+      </a:ln>
+    </cs:spPr>
+  </cs:upBar>
+  <cs:valueAxis>
+    <cs:lnRef idx="0"/>
+    <cs:fillRef idx="0"/>
+    <cs:effectRef idx="0"/>
+    <cs:fontRef idx="minor">
+      <a:schemeClr val="tx1">
+        <a:lumMod val="65000"/>
+        <a:lumOff val="35000"/>
+      </a:schemeClr>
+    </cs:fontRef>
+    <cs:defRPr sz="900" kern="1200"/>
+  </cs:valueAxis>
+  <cs:wall>
+    <cs:lnRef idx="0"/>
+    <cs:fillRef idx="0"/>
+    <cs:effectRef idx="0"/>
+    <cs:fontRef idx="minor">
+      <a:schemeClr val="tx1"/>
+    </cs:fontRef>
+    <cs:spPr>
+      <a:noFill/>
+      <a:ln>
+        <a:noFill/>
+      </a:ln>
+    </cs:spPr>
+  </cs:wall>
+</cs:chartStyle>
 </file>
 
 <file path=ppt/notesMasters/notesMaster1.xml><?xml version="1.0" encoding="utf-8"?>
@@ -659,7 +4024,7 @@
           <a:p>
             <a:fld id="{94D3E167-3ED7-47DE-A306-F708F42BD9C6}" type="slidenum">
               <a:rPr lang="en-US" smtClean="0"/>
-              <a:t>8</a:t>
+              <a:t>9</a:t>
             </a:fld>
             <a:endParaRPr lang="en-US"/>
           </a:p>
@@ -743,7 +4108,7 @@
           <a:p>
             <a:fld id="{94D3E167-3ED7-47DE-A306-F708F42BD9C6}" type="slidenum">
               <a:rPr lang="en-US" smtClean="0"/>
-              <a:t>13</a:t>
+              <a:t>14</a:t>
             </a:fld>
             <a:endParaRPr lang="en-US"/>
           </a:p>
@@ -6878,7 +10243,7 @@
           <p:cNvPr id="2" name="Title 1">
             <a:extLst>
               <a:ext uri="{FF2B5EF4-FFF2-40B4-BE49-F238E27FC236}">
-                <a16:creationId xmlns:a16="http://schemas.microsoft.com/office/drawing/2014/main" id="{77F98F58-E0D1-4AD3-9626-E30353D4B784}"/>
+                <a16:creationId xmlns:a16="http://schemas.microsoft.com/office/drawing/2014/main" id="{8E2FD5C6-711D-4EEC-BE2F-9935D4DEAB89}"/>
               </a:ext>
             </a:extLst>
           </p:cNvPr>
@@ -6896,7 +10261,7 @@
           <a:p>
             <a:r>
               <a:rPr lang="en-US" dirty="0"/>
-              <a:t>Conclusion</a:t>
+              <a:t>Results</a:t>
             </a:r>
           </a:p>
         </p:txBody>
@@ -6906,7 +10271,7 @@
           <p:cNvPr id="3" name="Content Placeholder 2">
             <a:extLst>
               <a:ext uri="{FF2B5EF4-FFF2-40B4-BE49-F238E27FC236}">
-                <a16:creationId xmlns:a16="http://schemas.microsoft.com/office/drawing/2014/main" id="{88CB811B-EA06-44A0-BEDB-BCCDB444C249}"/>
+                <a16:creationId xmlns:a16="http://schemas.microsoft.com/office/drawing/2014/main" id="{391D3D49-2E7E-447D-A007-5C9B0CA40439}"/>
               </a:ext>
             </a:extLst>
           </p:cNvPr>
@@ -6924,7 +10289,7 @@
           <a:p>
             <a:r>
               <a:rPr lang="en-US" dirty="0"/>
-              <a:t>Explain Result</a:t>
+              <a:t>Add Graphs</a:t>
             </a:r>
           </a:p>
         </p:txBody>
@@ -6932,7 +10297,7 @@
     </p:spTree>
     <p:extLst>
       <p:ext uri="{BB962C8B-B14F-4D97-AF65-F5344CB8AC3E}">
-        <p14:creationId xmlns:p14="http://schemas.microsoft.com/office/powerpoint/2010/main" val="3179600600"/>
+        <p14:creationId xmlns:p14="http://schemas.microsoft.com/office/powerpoint/2010/main" val="776807509"/>
       </p:ext>
     </p:extLst>
   </p:cSld>
@@ -6964,7 +10329,7 @@
           <p:cNvPr id="2" name="Title 1">
             <a:extLst>
               <a:ext uri="{FF2B5EF4-FFF2-40B4-BE49-F238E27FC236}">
-                <a16:creationId xmlns:a16="http://schemas.microsoft.com/office/drawing/2014/main" id="{8403BB05-16D1-4B53-9C8E-708F33C19591}"/>
+                <a16:creationId xmlns:a16="http://schemas.microsoft.com/office/drawing/2014/main" id="{77F98F58-E0D1-4AD3-9626-E30353D4B784}"/>
               </a:ext>
             </a:extLst>
           </p:cNvPr>
@@ -6982,7 +10347,7 @@
           <a:p>
             <a:r>
               <a:rPr lang="en-US" dirty="0"/>
-              <a:t>References</a:t>
+              <a:t>Conclusion</a:t>
             </a:r>
           </a:p>
         </p:txBody>
@@ -6992,7 +10357,7 @@
           <p:cNvPr id="3" name="Content Placeholder 2">
             <a:extLst>
               <a:ext uri="{FF2B5EF4-FFF2-40B4-BE49-F238E27FC236}">
-                <a16:creationId xmlns:a16="http://schemas.microsoft.com/office/drawing/2014/main" id="{287294D4-F698-451F-9BC1-A975DD0FAA41}"/>
+                <a16:creationId xmlns:a16="http://schemas.microsoft.com/office/drawing/2014/main" id="{88CB811B-EA06-44A0-BEDB-BCCDB444C249}"/>
               </a:ext>
             </a:extLst>
           </p:cNvPr>
@@ -7008,14 +10373,17 @@
           <a:bodyPr/>
           <a:lstStyle/>
           <a:p>
-            <a:endParaRPr lang="en-US"/>
+            <a:r>
+              <a:rPr lang="en-US" dirty="0"/>
+              <a:t>Explain Result</a:t>
+            </a:r>
           </a:p>
         </p:txBody>
       </p:sp>
     </p:spTree>
     <p:extLst>
       <p:ext uri="{BB962C8B-B14F-4D97-AF65-F5344CB8AC3E}">
-        <p14:creationId xmlns:p14="http://schemas.microsoft.com/office/powerpoint/2010/main" val="2795992489"/>
+        <p14:creationId xmlns:p14="http://schemas.microsoft.com/office/powerpoint/2010/main" val="3179600600"/>
       </p:ext>
     </p:extLst>
   </p:cSld>
@@ -7047,6 +10415,89 @@
           <p:cNvPr id="2" name="Title 1">
             <a:extLst>
               <a:ext uri="{FF2B5EF4-FFF2-40B4-BE49-F238E27FC236}">
+                <a16:creationId xmlns:a16="http://schemas.microsoft.com/office/drawing/2014/main" id="{8403BB05-16D1-4B53-9C8E-708F33C19591}"/>
+              </a:ext>
+            </a:extLst>
+          </p:cNvPr>
+          <p:cNvSpPr>
+            <a:spLocks noGrp="1"/>
+          </p:cNvSpPr>
+          <p:nvPr>
+            <p:ph type="title"/>
+          </p:nvPr>
+        </p:nvSpPr>
+        <p:spPr/>
+        <p:txBody>
+          <a:bodyPr/>
+          <a:lstStyle/>
+          <a:p>
+            <a:r>
+              <a:rPr lang="en-US" dirty="0"/>
+              <a:t>References</a:t>
+            </a:r>
+          </a:p>
+        </p:txBody>
+      </p:sp>
+      <p:sp>
+        <p:nvSpPr>
+          <p:cNvPr id="3" name="Content Placeholder 2">
+            <a:extLst>
+              <a:ext uri="{FF2B5EF4-FFF2-40B4-BE49-F238E27FC236}">
+                <a16:creationId xmlns:a16="http://schemas.microsoft.com/office/drawing/2014/main" id="{287294D4-F698-451F-9BC1-A975DD0FAA41}"/>
+              </a:ext>
+            </a:extLst>
+          </p:cNvPr>
+          <p:cNvSpPr>
+            <a:spLocks noGrp="1"/>
+          </p:cNvSpPr>
+          <p:nvPr>
+            <p:ph idx="1"/>
+          </p:nvPr>
+        </p:nvSpPr>
+        <p:spPr/>
+        <p:txBody>
+          <a:bodyPr/>
+          <a:lstStyle/>
+          <a:p>
+            <a:endParaRPr lang="en-US"/>
+          </a:p>
+        </p:txBody>
+      </p:sp>
+    </p:spTree>
+    <p:extLst>
+      <p:ext uri="{BB962C8B-B14F-4D97-AF65-F5344CB8AC3E}">
+        <p14:creationId xmlns:p14="http://schemas.microsoft.com/office/powerpoint/2010/main" val="2795992489"/>
+      </p:ext>
+    </p:extLst>
+  </p:cSld>
+  <p:clrMapOvr>
+    <a:masterClrMapping/>
+  </p:clrMapOvr>
+</p:sld>
+</file>
+
+<file path=ppt/slides/slide13.xml><?xml version="1.0" encoding="utf-8"?>
+<p:sld xmlns:a="http://schemas.openxmlformats.org/drawingml/2006/main" xmlns:r="http://schemas.openxmlformats.org/officeDocument/2006/relationships" xmlns:p="http://schemas.openxmlformats.org/presentationml/2006/main">
+  <p:cSld>
+    <p:spTree>
+      <p:nvGrpSpPr>
+        <p:cNvPr id="1" name=""/>
+        <p:cNvGrpSpPr/>
+        <p:nvPr/>
+      </p:nvGrpSpPr>
+      <p:grpSpPr>
+        <a:xfrm>
+          <a:off x="0" y="0"/>
+          <a:ext cx="0" cy="0"/>
+          <a:chOff x="0" y="0"/>
+          <a:chExt cx="0" cy="0"/>
+        </a:xfrm>
+      </p:grpSpPr>
+      <p:sp>
+        <p:nvSpPr>
+          <p:cNvPr id="2" name="Title 1">
+            <a:extLst>
+              <a:ext uri="{FF2B5EF4-FFF2-40B4-BE49-F238E27FC236}">
                 <a16:creationId xmlns:a16="http://schemas.microsoft.com/office/drawing/2014/main" id="{A0430DB5-B319-634D-9829-F3B2DAE623E5}"/>
               </a:ext>
             </a:extLst>
@@ -7083,7 +10534,7 @@
 </p:sld>
 </file>
 
-<file path=ppt/slides/slide13.xml><?xml version="1.0" encoding="utf-8"?>
+<file path=ppt/slides/slide14.xml><?xml version="1.0" encoding="utf-8"?>
 <p:sld xmlns:a="http://schemas.openxmlformats.org/drawingml/2006/main" xmlns:r="http://schemas.openxmlformats.org/officeDocument/2006/relationships" xmlns:p="http://schemas.openxmlformats.org/presentationml/2006/main">
   <p:cSld>
     <p:spTree>
@@ -8068,8 +11519,8 @@
         </p:blipFill>
         <p:spPr>
           <a:xfrm>
-            <a:off x="3783105" y="582706"/>
-            <a:ext cx="7888941" cy="5916706"/>
+            <a:off x="4499429" y="582706"/>
+            <a:ext cx="7172617" cy="5379463"/>
           </a:xfrm>
           <a:prstGeom prst="rect">
             <a:avLst/>
@@ -8090,8 +11541,8 @@
         </p:nvSpPr>
         <p:spPr>
           <a:xfrm>
-            <a:off x="367879" y="1763601"/>
-            <a:ext cx="3209366" cy="4832092"/>
+            <a:off x="367878" y="1763601"/>
+            <a:ext cx="3812235" cy="4401205"/>
           </a:xfrm>
           <a:prstGeom prst="rect">
             <a:avLst/>
@@ -8118,10 +11569,24 @@
               <a:buFont typeface="Arial" panose="020B0604020202020204" pitchFamily="34" charset="0"/>
               <a:buChar char="•"/>
             </a:pPr>
+            <a:endParaRPr lang="en-US" sz="2800" dirty="0"/>
+          </a:p>
+          <a:p>
+            <a:pPr marL="285750" indent="-285750">
+              <a:buFont typeface="Arial" panose="020B0604020202020204" pitchFamily="34" charset="0"/>
+              <a:buChar char="•"/>
+            </a:pPr>
             <a:r>
               <a:rPr lang="en-US" sz="2800" dirty="0"/>
               <a:t>Took photo of power meter in between each run</a:t>
             </a:r>
+          </a:p>
+          <a:p>
+            <a:pPr marL="285750" indent="-285750">
+              <a:buFont typeface="Arial" panose="020B0604020202020204" pitchFamily="34" charset="0"/>
+              <a:buChar char="•"/>
+            </a:pPr>
+            <a:endParaRPr lang="en-US" sz="2800" dirty="0"/>
           </a:p>
           <a:p>
             <a:pPr marL="285750" indent="-285750">
@@ -8181,15 +11646,53 @@
             <p:ph type="title"/>
           </p:nvPr>
         </p:nvSpPr>
-        <p:spPr/>
+        <p:spPr>
+          <a:xfrm>
+            <a:off x="646112" y="452718"/>
+            <a:ext cx="7539946" cy="868082"/>
+          </a:xfrm>
+        </p:spPr>
         <p:txBody>
           <a:bodyPr/>
           <a:lstStyle/>
           <a:p>
-            <a:endParaRPr lang="en-US"/>
-          </a:p>
-        </p:txBody>
-      </p:sp>
+            <a:r>
+              <a:rPr lang="en-US" dirty="0"/>
+              <a:t>Power per L1 Cache Load</a:t>
+            </a:r>
+          </a:p>
+        </p:txBody>
+      </p:sp>
+      <p:graphicFrame>
+        <p:nvGraphicFramePr>
+          <p:cNvPr id="3" name="Chart 2">
+            <a:extLst>
+              <a:ext uri="{FF2B5EF4-FFF2-40B4-BE49-F238E27FC236}">
+                <a16:creationId xmlns:a16="http://schemas.microsoft.com/office/drawing/2014/main" id="{33F67E0D-4845-DF48-8F2C-FC33FF0620FB}"/>
+              </a:ext>
+            </a:extLst>
+          </p:cNvPr>
+          <p:cNvGraphicFramePr>
+            <a:graphicFrameLocks/>
+          </p:cNvGraphicFramePr>
+          <p:nvPr>
+            <p:extLst>
+              <p:ext uri="{D42A27DB-BD31-4B8C-83A1-F6EECF244321}">
+                <p14:modId xmlns:p14="http://schemas.microsoft.com/office/powerpoint/2010/main" val="3027358772"/>
+              </p:ext>
+            </p:extLst>
+          </p:nvPr>
+        </p:nvGraphicFramePr>
+        <p:xfrm>
+          <a:off x="646112" y="1161142"/>
+          <a:ext cx="10398579" cy="5447393"/>
+        </p:xfrm>
+        <a:graphic>
+          <a:graphicData uri="http://schemas.openxmlformats.org/drawingml/2006/chart">
+            <c:chart xmlns:c="http://schemas.openxmlformats.org/drawingml/2006/chart" xmlns:r="http://schemas.openxmlformats.org/officeDocument/2006/relationships" r:id="rId2"/>
+          </a:graphicData>
+        </a:graphic>
+      </p:graphicFrame>
     </p:spTree>
     <p:extLst>
       <p:ext uri="{BB962C8B-B14F-4D97-AF65-F5344CB8AC3E}">
@@ -8225,7 +11728,7 @@
           <p:cNvPr id="2" name="Title 1">
             <a:extLst>
               <a:ext uri="{FF2B5EF4-FFF2-40B4-BE49-F238E27FC236}">
-                <a16:creationId xmlns:a16="http://schemas.microsoft.com/office/drawing/2014/main" id="{EC0D0CEE-305A-4FCC-BD64-21CBC497648A}"/>
+                <a16:creationId xmlns:a16="http://schemas.microsoft.com/office/drawing/2014/main" id="{01F87A1F-5C8A-3748-A0E8-BF76EE4442D9}"/>
               </a:ext>
             </a:extLst>
           </p:cNvPr>
@@ -8236,85 +11739,52 @@
             <p:ph type="title"/>
           </p:nvPr>
         </p:nvSpPr>
-        <p:spPr>
-          <a:xfrm>
-            <a:off x="416338" y="452717"/>
-            <a:ext cx="12085151" cy="2079467"/>
-          </a:xfrm>
-        </p:spPr>
+        <p:spPr/>
         <p:txBody>
           <a:bodyPr/>
           <a:lstStyle/>
           <a:p>
             <a:r>
               <a:rPr lang="en-US" dirty="0"/>
-              <a:t>Map / Reduce &amp; Markov Model </a:t>
-            </a:r>
-            <a:br>
-              <a:rPr lang="en-US" dirty="0"/>
-            </a:br>
-            <a:r>
-              <a:rPr lang="en-US" dirty="0"/>
-              <a:t>(Application – Core to Core Data Movement)</a:t>
-            </a:r>
-            <a:br>
-              <a:rPr lang="en-US" dirty="0"/>
-            </a:br>
-            <a:endParaRPr lang="en-US" dirty="0"/>
-          </a:p>
-        </p:txBody>
-      </p:sp>
-      <p:sp>
-        <p:nvSpPr>
-          <p:cNvPr id="3" name="Content Placeholder 2">
+              <a:t>Power per LLC Cache Load</a:t>
+            </a:r>
+          </a:p>
+        </p:txBody>
+      </p:sp>
+      <p:graphicFrame>
+        <p:nvGraphicFramePr>
+          <p:cNvPr id="4" name="Chart 3">
             <a:extLst>
               <a:ext uri="{FF2B5EF4-FFF2-40B4-BE49-F238E27FC236}">
-                <a16:creationId xmlns:a16="http://schemas.microsoft.com/office/drawing/2014/main" id="{FC2C7A73-AE4D-4B6A-B8B2-94682D77EB0F}"/>
+                <a16:creationId xmlns:a16="http://schemas.microsoft.com/office/drawing/2014/main" id="{C7A39F0E-C232-FB4D-9AFE-248A062EB156}"/>
               </a:ext>
             </a:extLst>
           </p:cNvPr>
-          <p:cNvSpPr>
-            <a:spLocks noGrp="1"/>
-          </p:cNvSpPr>
-          <p:nvPr>
-            <p:ph idx="1"/>
-          </p:nvPr>
-        </p:nvSpPr>
-        <p:spPr>
-          <a:xfrm>
-            <a:off x="287385" y="2095121"/>
-            <a:ext cx="8946541" cy="4195481"/>
-          </a:xfrm>
-        </p:spPr>
-        <p:txBody>
-          <a:bodyPr>
-            <a:normAutofit/>
-          </a:bodyPr>
-          <a:lstStyle/>
-          <a:p>
-            <a:r>
-              <a:rPr lang="en-US" dirty="0"/>
-              <a:t>Baseline</a:t>
-            </a:r>
-          </a:p>
-          <a:p>
-            <a:r>
-              <a:rPr lang="en-US" dirty="0"/>
-              <a:t>Split Data</a:t>
-            </a:r>
-          </a:p>
-          <a:p>
-            <a:r>
-              <a:rPr lang="en-US" dirty="0"/>
-              <a:t>Core to Core </a:t>
-            </a:r>
-          </a:p>
-        </p:txBody>
-      </p:sp>
+          <p:cNvGraphicFramePr>
+            <a:graphicFrameLocks/>
+          </p:cNvGraphicFramePr>
+          <p:nvPr>
+            <p:extLst>
+              <p:ext uri="{D42A27DB-BD31-4B8C-83A1-F6EECF244321}">
+                <p14:modId xmlns:p14="http://schemas.microsoft.com/office/powerpoint/2010/main" val="4061938688"/>
+              </p:ext>
+            </p:extLst>
+          </p:nvPr>
+        </p:nvGraphicFramePr>
+        <p:xfrm>
+          <a:off x="646111" y="1177924"/>
+          <a:ext cx="9666289" cy="5237389"/>
+        </p:xfrm>
+        <a:graphic>
+          <a:graphicData uri="http://schemas.openxmlformats.org/drawingml/2006/chart">
+            <c:chart xmlns:c="http://schemas.openxmlformats.org/drawingml/2006/chart" xmlns:r="http://schemas.openxmlformats.org/officeDocument/2006/relationships" r:id="rId2"/>
+          </a:graphicData>
+        </a:graphic>
+      </p:graphicFrame>
     </p:spTree>
     <p:extLst>
       <p:ext uri="{BB962C8B-B14F-4D97-AF65-F5344CB8AC3E}">
-        <p14:creationId xmlns:p14="http://schemas.microsoft.com/office/powerpoint/2010/main" val="542569813"/>
+        <p14:creationId xmlns:p14="http://schemas.microsoft.com/office/powerpoint/2010/main" val="3092273647"/>
       </p:ext>
     </p:extLst>
   </p:cSld>
@@ -8346,7 +11816,7 @@
           <p:cNvPr id="2" name="Title 1">
             <a:extLst>
               <a:ext uri="{FF2B5EF4-FFF2-40B4-BE49-F238E27FC236}">
-                <a16:creationId xmlns:a16="http://schemas.microsoft.com/office/drawing/2014/main" id="{8E2FD5C6-711D-4EEC-BE2F-9935D4DEAB89}"/>
+                <a16:creationId xmlns:a16="http://schemas.microsoft.com/office/drawing/2014/main" id="{EC0D0CEE-305A-4FCC-BD64-21CBC497648A}"/>
               </a:ext>
             </a:extLst>
           </p:cNvPr>
@@ -8357,15 +11827,31 @@
             <p:ph type="title"/>
           </p:nvPr>
         </p:nvSpPr>
-        <p:spPr/>
+        <p:spPr>
+          <a:xfrm>
+            <a:off x="416338" y="452717"/>
+            <a:ext cx="12085151" cy="2079467"/>
+          </a:xfrm>
+        </p:spPr>
         <p:txBody>
           <a:bodyPr/>
           <a:lstStyle/>
           <a:p>
             <a:r>
               <a:rPr lang="en-US" dirty="0"/>
-              <a:t>Results</a:t>
-            </a:r>
+              <a:t>Map / Reduce &amp; Markov Model </a:t>
+            </a:r>
+            <a:br>
+              <a:rPr lang="en-US" dirty="0"/>
+            </a:br>
+            <a:r>
+              <a:rPr lang="en-US" dirty="0"/>
+              <a:t>(Application – Core to Core Data Movement)</a:t>
+            </a:r>
+            <a:br>
+              <a:rPr lang="en-US" dirty="0"/>
+            </a:br>
+            <a:endParaRPr lang="en-US" dirty="0"/>
           </a:p>
         </p:txBody>
       </p:sp>
@@ -8374,7 +11860,7 @@
           <p:cNvPr id="3" name="Content Placeholder 2">
             <a:extLst>
               <a:ext uri="{FF2B5EF4-FFF2-40B4-BE49-F238E27FC236}">
-                <a16:creationId xmlns:a16="http://schemas.microsoft.com/office/drawing/2014/main" id="{391D3D49-2E7E-447D-A007-5C9B0CA40439}"/>
+                <a16:creationId xmlns:a16="http://schemas.microsoft.com/office/drawing/2014/main" id="{FC2C7A73-AE4D-4B6A-B8B2-94682D77EB0F}"/>
               </a:ext>
             </a:extLst>
           </p:cNvPr>
@@ -8385,14 +11871,33 @@
             <p:ph idx="1"/>
           </p:nvPr>
         </p:nvSpPr>
-        <p:spPr/>
-        <p:txBody>
-          <a:bodyPr/>
+        <p:spPr>
+          <a:xfrm>
+            <a:off x="287385" y="2095121"/>
+            <a:ext cx="8946541" cy="4195481"/>
+          </a:xfrm>
+        </p:spPr>
+        <p:txBody>
+          <a:bodyPr>
+            <a:normAutofit/>
+          </a:bodyPr>
           <a:lstStyle/>
           <a:p>
             <a:r>
               <a:rPr lang="en-US" dirty="0"/>
-              <a:t>Add Graphs</a:t>
+              <a:t>Baseline</a:t>
+            </a:r>
+          </a:p>
+          <a:p>
+            <a:r>
+              <a:rPr lang="en-US" dirty="0"/>
+              <a:t>Split Data</a:t>
+            </a:r>
+          </a:p>
+          <a:p>
+            <a:r>
+              <a:rPr lang="en-US" dirty="0"/>
+              <a:t>Core to Core </a:t>
             </a:r>
           </a:p>
         </p:txBody>
@@ -8400,7 +11905,7 @@
     </p:spTree>
     <p:extLst>
       <p:ext uri="{BB962C8B-B14F-4D97-AF65-F5344CB8AC3E}">
-        <p14:creationId xmlns:p14="http://schemas.microsoft.com/office/powerpoint/2010/main" val="776807509"/>
+        <p14:creationId xmlns:p14="http://schemas.microsoft.com/office/powerpoint/2010/main" val="542569813"/>
       </p:ext>
     </p:extLst>
   </p:cSld>

</xml_diff>